<commit_message>
ca hs enroll ipeds
</commit_message>
<xml_diff>
--- a/usf_presentation_0220_gdubrow.pptx
+++ b/usf_presentation_0220_gdubrow.pptx
@@ -7,6 +7,18 @@
   <p:sldIdLst>
     <p:sldId id="256" r:id="rId2"/>
     <p:sldId id="257" r:id="rId3"/>
+    <p:sldId id="262" r:id="rId4"/>
+    <p:sldId id="267" r:id="rId5"/>
+    <p:sldId id="260" r:id="rId6"/>
+    <p:sldId id="261" r:id="rId7"/>
+    <p:sldId id="271" r:id="rId8"/>
+    <p:sldId id="259" r:id="rId9"/>
+    <p:sldId id="268" r:id="rId10"/>
+    <p:sldId id="263" r:id="rId11"/>
+    <p:sldId id="269" r:id="rId12"/>
+    <p:sldId id="270" r:id="rId13"/>
+    <p:sldId id="264" r:id="rId14"/>
+    <p:sldId id="266" r:id="rId15"/>
   </p:sldIdLst>
   <p:sldSz cx="12192000" cy="6858000"/>
   <p:notesSz cx="6858000" cy="9144000"/>
@@ -105,6 +117,11 @@
       </a:defRPr>
     </a:lvl9pPr>
   </p:defaultTextStyle>
+  <p:extLst>
+    <p:ext uri="{EFAFB233-063F-42B5-8137-9DF3F51BA10A}">
+      <p15:sldGuideLst xmlns:p15="http://schemas.microsoft.com/office/powerpoint/2012/main"/>
+    </p:ext>
+  </p:extLst>
 </p:presentation>
 </file>
 
@@ -239,7 +256,7 @@
           <a:p>
             <a:fld id="{4E83AA21-0DC2-40CE-923B-A76D48AC771F}" type="datetimeFigureOut">
               <a:rPr lang="en-US" smtClean="0"/>
-              <a:t>2/21/2020</a:t>
+              <a:t>2/24/2020</a:t>
             </a:fld>
             <a:endParaRPr lang="en-US"/>
           </a:p>
@@ -409,7 +426,7 @@
           <a:p>
             <a:fld id="{4E83AA21-0DC2-40CE-923B-A76D48AC771F}" type="datetimeFigureOut">
               <a:rPr lang="en-US" smtClean="0"/>
-              <a:t>2/21/2020</a:t>
+              <a:t>2/24/2020</a:t>
             </a:fld>
             <a:endParaRPr lang="en-US"/>
           </a:p>
@@ -589,7 +606,7 @@
           <a:p>
             <a:fld id="{4E83AA21-0DC2-40CE-923B-A76D48AC771F}" type="datetimeFigureOut">
               <a:rPr lang="en-US" smtClean="0"/>
-              <a:t>2/21/2020</a:t>
+              <a:t>2/24/2020</a:t>
             </a:fld>
             <a:endParaRPr lang="en-US"/>
           </a:p>
@@ -759,7 +776,7 @@
           <a:p>
             <a:fld id="{4E83AA21-0DC2-40CE-923B-A76D48AC771F}" type="datetimeFigureOut">
               <a:rPr lang="en-US" smtClean="0"/>
-              <a:t>2/21/2020</a:t>
+              <a:t>2/24/2020</a:t>
             </a:fld>
             <a:endParaRPr lang="en-US"/>
           </a:p>
@@ -1005,7 +1022,7 @@
           <a:p>
             <a:fld id="{4E83AA21-0DC2-40CE-923B-A76D48AC771F}" type="datetimeFigureOut">
               <a:rPr lang="en-US" smtClean="0"/>
-              <a:t>2/21/2020</a:t>
+              <a:t>2/24/2020</a:t>
             </a:fld>
             <a:endParaRPr lang="en-US"/>
           </a:p>
@@ -1237,7 +1254,7 @@
           <a:p>
             <a:fld id="{4E83AA21-0DC2-40CE-923B-A76D48AC771F}" type="datetimeFigureOut">
               <a:rPr lang="en-US" smtClean="0"/>
-              <a:t>2/21/2020</a:t>
+              <a:t>2/24/2020</a:t>
             </a:fld>
             <a:endParaRPr lang="en-US"/>
           </a:p>
@@ -1604,7 +1621,7 @@
           <a:p>
             <a:fld id="{4E83AA21-0DC2-40CE-923B-A76D48AC771F}" type="datetimeFigureOut">
               <a:rPr lang="en-US" smtClean="0"/>
-              <a:t>2/21/2020</a:t>
+              <a:t>2/24/2020</a:t>
             </a:fld>
             <a:endParaRPr lang="en-US"/>
           </a:p>
@@ -1722,7 +1739,7 @@
           <a:p>
             <a:fld id="{4E83AA21-0DC2-40CE-923B-A76D48AC771F}" type="datetimeFigureOut">
               <a:rPr lang="en-US" smtClean="0"/>
-              <a:t>2/21/2020</a:t>
+              <a:t>2/24/2020</a:t>
             </a:fld>
             <a:endParaRPr lang="en-US"/>
           </a:p>
@@ -1817,7 +1834,7 @@
           <a:p>
             <a:fld id="{4E83AA21-0DC2-40CE-923B-A76D48AC771F}" type="datetimeFigureOut">
               <a:rPr lang="en-US" smtClean="0"/>
-              <a:t>2/21/2020</a:t>
+              <a:t>2/24/2020</a:t>
             </a:fld>
             <a:endParaRPr lang="en-US"/>
           </a:p>
@@ -2094,7 +2111,7 @@
           <a:p>
             <a:fld id="{4E83AA21-0DC2-40CE-923B-A76D48AC771F}" type="datetimeFigureOut">
               <a:rPr lang="en-US" smtClean="0"/>
-              <a:t>2/21/2020</a:t>
+              <a:t>2/24/2020</a:t>
             </a:fld>
             <a:endParaRPr lang="en-US"/>
           </a:p>
@@ -2347,7 +2364,7 @@
           <a:p>
             <a:fld id="{4E83AA21-0DC2-40CE-923B-A76D48AC771F}" type="datetimeFigureOut">
               <a:rPr lang="en-US" smtClean="0"/>
-              <a:t>2/21/2020</a:t>
+              <a:t>2/24/2020</a:t>
             </a:fld>
             <a:endParaRPr lang="en-US"/>
           </a:p>
@@ -2560,7 +2577,7 @@
           <a:p>
             <a:fld id="{4E83AA21-0DC2-40CE-923B-A76D48AC771F}" type="datetimeFigureOut">
               <a:rPr lang="en-US" smtClean="0"/>
-              <a:t>2/21/2020</a:t>
+              <a:t>2/24/2020</a:t>
             </a:fld>
             <a:endParaRPr lang="en-US"/>
           </a:p>
@@ -2975,14 +2992,29 @@
             <p:ph type="ctrTitle"/>
           </p:nvPr>
         </p:nvSpPr>
-        <p:spPr/>
-        <p:txBody>
-          <a:bodyPr/>
+        <p:spPr>
+          <a:xfrm>
+            <a:off x="1412032" y="273277"/>
+            <a:ext cx="9144000" cy="1732804"/>
+          </a:xfrm>
+        </p:spPr>
+        <p:txBody>
+          <a:bodyPr>
+            <a:normAutofit fontScale="90000"/>
+          </a:bodyPr>
           <a:lstStyle/>
           <a:p>
             <a:r>
               <a:rPr lang="en-US" dirty="0" smtClean="0"/>
-              <a:t>Higher Education Landscape	</a:t>
+              <a:t>The Higher </a:t>
+            </a:r>
+            <a:r>
+              <a:rPr lang="en-US" dirty="0" smtClean="0"/>
+              <a:t>Education </a:t>
+            </a:r>
+            <a:r>
+              <a:rPr lang="en-US" dirty="0" smtClean="0"/>
+              <a:t>Landscape</a:t>
             </a:r>
             <a:endParaRPr lang="en-US" dirty="0"/>
           </a:p>
@@ -2998,11 +3030,37 @@
             <p:ph type="subTitle" idx="1"/>
           </p:nvPr>
         </p:nvSpPr>
-        <p:spPr/>
-        <p:txBody>
-          <a:bodyPr/>
-          <a:lstStyle/>
-          <a:p>
+        <p:spPr>
+          <a:xfrm>
+            <a:off x="1346718" y="2603663"/>
+            <a:ext cx="9144000" cy="1655762"/>
+          </a:xfrm>
+        </p:spPr>
+        <p:txBody>
+          <a:bodyPr>
+            <a:normAutofit lnSpcReduction="10000"/>
+          </a:bodyPr>
+          <a:lstStyle/>
+          <a:p>
+            <a:r>
+              <a:rPr lang="en-US" dirty="0" smtClean="0"/>
+              <a:t>A presentation to the USF Community, February 2020 Town Halls</a:t>
+            </a:r>
+          </a:p>
+          <a:p>
+            <a:endParaRPr lang="en-US" dirty="0"/>
+          </a:p>
+          <a:p>
+            <a:r>
+              <a:rPr lang="en-US" dirty="0" smtClean="0"/>
+              <a:t>Greg Dubrow, Director of Institutional Research, </a:t>
+            </a:r>
+          </a:p>
+          <a:p>
+            <a:r>
+              <a:rPr lang="en-US" dirty="0" smtClean="0"/>
+              <a:t>San Francisco State University</a:t>
+            </a:r>
             <a:endParaRPr lang="en-US" dirty="0"/>
           </a:p>
         </p:txBody>
@@ -3107,6 +3165,1235 @@
     <p:extLst>
       <p:ext uri="{BB962C8B-B14F-4D97-AF65-F5344CB8AC3E}">
         <p14:creationId xmlns:p14="http://schemas.microsoft.com/office/powerpoint/2010/main" val="2022180854"/>
+      </p:ext>
+    </p:extLst>
+  </p:cSld>
+  <p:clrMapOvr>
+    <a:masterClrMapping/>
+  </p:clrMapOvr>
+  <p:timing>
+    <p:tnLst>
+      <p:par>
+        <p:cTn id="1" dur="indefinite" restart="never" nodeType="tmRoot"/>
+      </p:par>
+    </p:tnLst>
+  </p:timing>
+</p:sld>
+</file>
+
+<file path=ppt/slides/slide10.xml><?xml version="1.0" encoding="utf-8"?>
+<p:sld xmlns:a="http://schemas.openxmlformats.org/drawingml/2006/main" xmlns:r="http://schemas.openxmlformats.org/officeDocument/2006/relationships" xmlns:p="http://schemas.openxmlformats.org/presentationml/2006/main">
+  <p:cSld>
+    <p:spTree>
+      <p:nvGrpSpPr>
+        <p:cNvPr id="1" name=""/>
+        <p:cNvGrpSpPr/>
+        <p:nvPr/>
+      </p:nvGrpSpPr>
+      <p:grpSpPr>
+        <a:xfrm>
+          <a:off x="0" y="0"/>
+          <a:ext cx="0" cy="0"/>
+          <a:chOff x="0" y="0"/>
+          <a:chExt cx="0" cy="0"/>
+        </a:xfrm>
+      </p:grpSpPr>
+      <p:sp>
+        <p:nvSpPr>
+          <p:cNvPr id="2" name="Title 1"/>
+          <p:cNvSpPr>
+            <a:spLocks noGrp="1"/>
+          </p:cNvSpPr>
+          <p:nvPr>
+            <p:ph type="ctrTitle"/>
+          </p:nvPr>
+        </p:nvSpPr>
+        <p:spPr/>
+        <p:txBody>
+          <a:bodyPr/>
+          <a:lstStyle/>
+          <a:p>
+            <a:r>
+              <a:rPr lang="en-US" dirty="0" smtClean="0"/>
+              <a:t>	</a:t>
+            </a:r>
+            <a:endParaRPr lang="en-US" dirty="0"/>
+          </a:p>
+        </p:txBody>
+      </p:sp>
+      <p:sp>
+        <p:nvSpPr>
+          <p:cNvPr id="4" name="Rectangle 3"/>
+          <p:cNvSpPr/>
+          <p:nvPr/>
+        </p:nvSpPr>
+        <p:spPr>
+          <a:xfrm>
+            <a:off x="0" y="6428792"/>
+            <a:ext cx="12192000" cy="419878"/>
+          </a:xfrm>
+          <a:prstGeom prst="rect">
+            <a:avLst/>
+          </a:prstGeom>
+          <a:solidFill>
+            <a:srgbClr val="FDBB30"/>
+          </a:solidFill>
+          <a:ln>
+            <a:solidFill>
+              <a:schemeClr val="tx1"/>
+            </a:solidFill>
+          </a:ln>
+        </p:spPr>
+        <p:style>
+          <a:lnRef idx="2">
+            <a:schemeClr val="accent1">
+              <a:shade val="50000"/>
+            </a:schemeClr>
+          </a:lnRef>
+          <a:fillRef idx="1">
+            <a:schemeClr val="accent1"/>
+          </a:fillRef>
+          <a:effectRef idx="0">
+            <a:schemeClr val="accent1"/>
+          </a:effectRef>
+          <a:fontRef idx="minor">
+            <a:schemeClr val="lt1"/>
+          </a:fontRef>
+        </p:style>
+        <p:txBody>
+          <a:bodyPr rtlCol="0" anchor="ctr"/>
+          <a:lstStyle/>
+          <a:p>
+            <a:pPr algn="ctr"/>
+            <a:endParaRPr lang="en-US"/>
+          </a:p>
+        </p:txBody>
+      </p:sp>
+      <p:sp>
+        <p:nvSpPr>
+          <p:cNvPr id="6" name="Rectangle 5"/>
+          <p:cNvSpPr/>
+          <p:nvPr/>
+        </p:nvSpPr>
+        <p:spPr>
+          <a:xfrm>
+            <a:off x="0" y="6218853"/>
+            <a:ext cx="12192000" cy="303245"/>
+          </a:xfrm>
+          <a:prstGeom prst="rect">
+            <a:avLst/>
+          </a:prstGeom>
+          <a:solidFill>
+            <a:srgbClr val="00543C"/>
+          </a:solidFill>
+          <a:ln>
+            <a:solidFill>
+              <a:schemeClr val="tx1"/>
+            </a:solidFill>
+          </a:ln>
+        </p:spPr>
+        <p:style>
+          <a:lnRef idx="2">
+            <a:schemeClr val="accent1">
+              <a:shade val="50000"/>
+            </a:schemeClr>
+          </a:lnRef>
+          <a:fillRef idx="1">
+            <a:schemeClr val="accent1"/>
+          </a:fillRef>
+          <a:effectRef idx="0">
+            <a:schemeClr val="accent1"/>
+          </a:effectRef>
+          <a:fontRef idx="minor">
+            <a:schemeClr val="lt1"/>
+          </a:fontRef>
+        </p:style>
+        <p:txBody>
+          <a:bodyPr rtlCol="0" anchor="ctr"/>
+          <a:lstStyle/>
+          <a:p>
+            <a:pPr algn="ctr"/>
+            <a:endParaRPr lang="en-US"/>
+          </a:p>
+        </p:txBody>
+      </p:sp>
+      <p:pic>
+        <p:nvPicPr>
+          <p:cNvPr id="8" name="Picture 7"/>
+          <p:cNvPicPr>
+            <a:picLocks noChangeAspect="1"/>
+          </p:cNvPicPr>
+          <p:nvPr/>
+        </p:nvPicPr>
+        <p:blipFill>
+          <a:blip r:embed="rId2"/>
+          <a:stretch>
+            <a:fillRect/>
+          </a:stretch>
+        </p:blipFill>
+        <p:spPr>
+          <a:xfrm>
+            <a:off x="173729" y="1045961"/>
+            <a:ext cx="11844541" cy="4846320"/>
+          </a:xfrm>
+          <a:prstGeom prst="rect">
+            <a:avLst/>
+          </a:prstGeom>
+        </p:spPr>
+      </p:pic>
+      <p:sp>
+        <p:nvSpPr>
+          <p:cNvPr id="9" name="TextBox 8"/>
+          <p:cNvSpPr txBox="1"/>
+          <p:nvPr/>
+        </p:nvSpPr>
+        <p:spPr>
+          <a:xfrm>
+            <a:off x="1524000" y="45145"/>
+            <a:ext cx="9467461" cy="1077218"/>
+          </a:xfrm>
+          <a:prstGeom prst="rect">
+            <a:avLst/>
+          </a:prstGeom>
+          <a:noFill/>
+        </p:spPr>
+        <p:txBody>
+          <a:bodyPr wrap="square" rtlCol="0">
+            <a:spAutoFit/>
+          </a:bodyPr>
+          <a:lstStyle/>
+          <a:p>
+            <a:pPr algn="ctr"/>
+            <a:r>
+              <a:rPr lang="en-US" sz="3200" dirty="0"/>
+              <a:t>Average Estimated Full-Time Undergraduate Budgets (Enrollment-Weighted) by Sector, </a:t>
+            </a:r>
+            <a:r>
+              <a:rPr lang="en-US" sz="3200" dirty="0" smtClean="0"/>
+              <a:t>2019-20</a:t>
+            </a:r>
+            <a:endParaRPr lang="en-US" sz="3200" dirty="0"/>
+          </a:p>
+        </p:txBody>
+      </p:sp>
+      <p:sp>
+        <p:nvSpPr>
+          <p:cNvPr id="10" name="TextBox 9"/>
+          <p:cNvSpPr txBox="1"/>
+          <p:nvPr/>
+        </p:nvSpPr>
+        <p:spPr>
+          <a:xfrm>
+            <a:off x="9235751" y="5870901"/>
+            <a:ext cx="2864498" cy="369332"/>
+          </a:xfrm>
+          <a:prstGeom prst="rect">
+            <a:avLst/>
+          </a:prstGeom>
+          <a:noFill/>
+        </p:spPr>
+        <p:txBody>
+          <a:bodyPr wrap="square" rtlCol="0">
+            <a:spAutoFit/>
+          </a:bodyPr>
+          <a:lstStyle/>
+          <a:p>
+            <a:r>
+              <a:rPr lang="en-US" i="1" dirty="0" smtClean="0">
+                <a:solidFill>
+                  <a:schemeClr val="bg1">
+                    <a:lumMod val="50000"/>
+                  </a:schemeClr>
+                </a:solidFill>
+              </a:rPr>
+              <a:t>Source: College Board, NCES</a:t>
+            </a:r>
+            <a:endParaRPr lang="en-US" i="1" dirty="0">
+              <a:solidFill>
+                <a:schemeClr val="bg1">
+                  <a:lumMod val="50000"/>
+                </a:schemeClr>
+              </a:solidFill>
+            </a:endParaRPr>
+          </a:p>
+        </p:txBody>
+      </p:sp>
+    </p:spTree>
+    <p:extLst>
+      <p:ext uri="{BB962C8B-B14F-4D97-AF65-F5344CB8AC3E}">
+        <p14:creationId xmlns:p14="http://schemas.microsoft.com/office/powerpoint/2010/main" val="1589501896"/>
+      </p:ext>
+    </p:extLst>
+  </p:cSld>
+  <p:clrMapOvr>
+    <a:masterClrMapping/>
+  </p:clrMapOvr>
+  <p:timing>
+    <p:tnLst>
+      <p:par>
+        <p:cTn id="1" dur="indefinite" restart="never" nodeType="tmRoot"/>
+      </p:par>
+    </p:tnLst>
+  </p:timing>
+</p:sld>
+</file>
+
+<file path=ppt/slides/slide11.xml><?xml version="1.0" encoding="utf-8"?>
+<p:sld xmlns:a="http://schemas.openxmlformats.org/drawingml/2006/main" xmlns:r="http://schemas.openxmlformats.org/officeDocument/2006/relationships" xmlns:p="http://schemas.openxmlformats.org/presentationml/2006/main">
+  <p:cSld>
+    <p:spTree>
+      <p:nvGrpSpPr>
+        <p:cNvPr id="1" name=""/>
+        <p:cNvGrpSpPr/>
+        <p:nvPr/>
+      </p:nvGrpSpPr>
+      <p:grpSpPr>
+        <a:xfrm>
+          <a:off x="0" y="0"/>
+          <a:ext cx="0" cy="0"/>
+          <a:chOff x="0" y="0"/>
+          <a:chExt cx="0" cy="0"/>
+        </a:xfrm>
+      </p:grpSpPr>
+      <p:sp>
+        <p:nvSpPr>
+          <p:cNvPr id="2" name="Title 1"/>
+          <p:cNvSpPr>
+            <a:spLocks noGrp="1"/>
+          </p:cNvSpPr>
+          <p:nvPr>
+            <p:ph type="ctrTitle"/>
+          </p:nvPr>
+        </p:nvSpPr>
+        <p:spPr/>
+        <p:txBody>
+          <a:bodyPr/>
+          <a:lstStyle/>
+          <a:p>
+            <a:r>
+              <a:rPr lang="en-US" dirty="0" smtClean="0"/>
+              <a:t>	</a:t>
+            </a:r>
+            <a:endParaRPr lang="en-US" dirty="0"/>
+          </a:p>
+        </p:txBody>
+      </p:sp>
+      <p:sp>
+        <p:nvSpPr>
+          <p:cNvPr id="4" name="Rectangle 3"/>
+          <p:cNvSpPr/>
+          <p:nvPr/>
+        </p:nvSpPr>
+        <p:spPr>
+          <a:xfrm>
+            <a:off x="0" y="6428792"/>
+            <a:ext cx="12192000" cy="419878"/>
+          </a:xfrm>
+          <a:prstGeom prst="rect">
+            <a:avLst/>
+          </a:prstGeom>
+          <a:solidFill>
+            <a:srgbClr val="FDBB30"/>
+          </a:solidFill>
+          <a:ln>
+            <a:solidFill>
+              <a:schemeClr val="tx1"/>
+            </a:solidFill>
+          </a:ln>
+        </p:spPr>
+        <p:style>
+          <a:lnRef idx="2">
+            <a:schemeClr val="accent1">
+              <a:shade val="50000"/>
+            </a:schemeClr>
+          </a:lnRef>
+          <a:fillRef idx="1">
+            <a:schemeClr val="accent1"/>
+          </a:fillRef>
+          <a:effectRef idx="0">
+            <a:schemeClr val="accent1"/>
+          </a:effectRef>
+          <a:fontRef idx="minor">
+            <a:schemeClr val="lt1"/>
+          </a:fontRef>
+        </p:style>
+        <p:txBody>
+          <a:bodyPr rtlCol="0" anchor="ctr"/>
+          <a:lstStyle/>
+          <a:p>
+            <a:pPr algn="ctr"/>
+            <a:endParaRPr lang="en-US"/>
+          </a:p>
+        </p:txBody>
+      </p:sp>
+      <p:sp>
+        <p:nvSpPr>
+          <p:cNvPr id="6" name="Rectangle 5"/>
+          <p:cNvSpPr/>
+          <p:nvPr/>
+        </p:nvSpPr>
+        <p:spPr>
+          <a:xfrm>
+            <a:off x="0" y="6218853"/>
+            <a:ext cx="12192000" cy="303245"/>
+          </a:xfrm>
+          <a:prstGeom prst="rect">
+            <a:avLst/>
+          </a:prstGeom>
+          <a:solidFill>
+            <a:srgbClr val="00543C"/>
+          </a:solidFill>
+          <a:ln>
+            <a:solidFill>
+              <a:schemeClr val="tx1"/>
+            </a:solidFill>
+          </a:ln>
+        </p:spPr>
+        <p:style>
+          <a:lnRef idx="2">
+            <a:schemeClr val="accent1">
+              <a:shade val="50000"/>
+            </a:schemeClr>
+          </a:lnRef>
+          <a:fillRef idx="1">
+            <a:schemeClr val="accent1"/>
+          </a:fillRef>
+          <a:effectRef idx="0">
+            <a:schemeClr val="accent1"/>
+          </a:effectRef>
+          <a:fontRef idx="minor">
+            <a:schemeClr val="lt1"/>
+          </a:fontRef>
+        </p:style>
+        <p:txBody>
+          <a:bodyPr rtlCol="0" anchor="ctr"/>
+          <a:lstStyle/>
+          <a:p>
+            <a:pPr algn="ctr"/>
+            <a:endParaRPr lang="en-US"/>
+          </a:p>
+        </p:txBody>
+      </p:sp>
+      <p:sp>
+        <p:nvSpPr>
+          <p:cNvPr id="10" name="TextBox 9"/>
+          <p:cNvSpPr txBox="1"/>
+          <p:nvPr/>
+        </p:nvSpPr>
+        <p:spPr>
+          <a:xfrm>
+            <a:off x="8308910" y="5892281"/>
+            <a:ext cx="2864498" cy="369332"/>
+          </a:xfrm>
+          <a:prstGeom prst="rect">
+            <a:avLst/>
+          </a:prstGeom>
+          <a:noFill/>
+        </p:spPr>
+        <p:txBody>
+          <a:bodyPr wrap="square" rtlCol="0">
+            <a:spAutoFit/>
+          </a:bodyPr>
+          <a:lstStyle/>
+          <a:p>
+            <a:r>
+              <a:rPr lang="en-US" i="1" dirty="0" smtClean="0">
+                <a:solidFill>
+                  <a:schemeClr val="bg1">
+                    <a:lumMod val="50000"/>
+                  </a:schemeClr>
+                </a:solidFill>
+              </a:rPr>
+              <a:t>Source: College Board, NCES</a:t>
+            </a:r>
+            <a:endParaRPr lang="en-US" i="1" dirty="0">
+              <a:solidFill>
+                <a:schemeClr val="bg1">
+                  <a:lumMod val="50000"/>
+                </a:schemeClr>
+              </a:solidFill>
+            </a:endParaRPr>
+          </a:p>
+        </p:txBody>
+      </p:sp>
+      <p:sp>
+        <p:nvSpPr>
+          <p:cNvPr id="9" name="TextBox 8"/>
+          <p:cNvSpPr txBox="1"/>
+          <p:nvPr/>
+        </p:nvSpPr>
+        <p:spPr>
+          <a:xfrm>
+            <a:off x="1362269" y="-31589"/>
+            <a:ext cx="9467461" cy="1077218"/>
+          </a:xfrm>
+          <a:prstGeom prst="rect">
+            <a:avLst/>
+          </a:prstGeom>
+          <a:noFill/>
+        </p:spPr>
+        <p:txBody>
+          <a:bodyPr wrap="square" rtlCol="0">
+            <a:spAutoFit/>
+          </a:bodyPr>
+          <a:lstStyle/>
+          <a:p>
+            <a:pPr algn="ctr"/>
+            <a:r>
+              <a:rPr lang="en-US" sz="3200" dirty="0"/>
+              <a:t>Inflation-Adjusted Published Tuition and Fees Relative to 1989-90, 1989-90 to 2019-20 (1989-90 = 1.0)</a:t>
+            </a:r>
+            <a:endParaRPr lang="en-US" sz="3200" dirty="0"/>
+          </a:p>
+        </p:txBody>
+      </p:sp>
+      <p:pic>
+        <p:nvPicPr>
+          <p:cNvPr id="7" name="Picture 6"/>
+          <p:cNvPicPr>
+            <a:picLocks noChangeAspect="1"/>
+          </p:cNvPicPr>
+          <p:nvPr/>
+        </p:nvPicPr>
+        <p:blipFill>
+          <a:blip r:embed="rId2"/>
+          <a:stretch>
+            <a:fillRect/>
+          </a:stretch>
+        </p:blipFill>
+        <p:spPr>
+          <a:xfrm>
+            <a:off x="175238" y="1045629"/>
+            <a:ext cx="11841522" cy="4846320"/>
+          </a:xfrm>
+          <a:prstGeom prst="rect">
+            <a:avLst/>
+          </a:prstGeom>
+        </p:spPr>
+      </p:pic>
+    </p:spTree>
+    <p:extLst>
+      <p:ext uri="{BB962C8B-B14F-4D97-AF65-F5344CB8AC3E}">
+        <p14:creationId xmlns:p14="http://schemas.microsoft.com/office/powerpoint/2010/main" val="3999256961"/>
+      </p:ext>
+    </p:extLst>
+  </p:cSld>
+  <p:clrMapOvr>
+    <a:masterClrMapping/>
+  </p:clrMapOvr>
+  <p:timing>
+    <p:tnLst>
+      <p:par>
+        <p:cTn id="1" dur="indefinite" restart="never" nodeType="tmRoot"/>
+      </p:par>
+    </p:tnLst>
+  </p:timing>
+</p:sld>
+</file>
+
+<file path=ppt/slides/slide12.xml><?xml version="1.0" encoding="utf-8"?>
+<p:sld xmlns:a="http://schemas.openxmlformats.org/drawingml/2006/main" xmlns:r="http://schemas.openxmlformats.org/officeDocument/2006/relationships" xmlns:p="http://schemas.openxmlformats.org/presentationml/2006/main">
+  <p:cSld>
+    <p:spTree>
+      <p:nvGrpSpPr>
+        <p:cNvPr id="1" name=""/>
+        <p:cNvGrpSpPr/>
+        <p:nvPr/>
+      </p:nvGrpSpPr>
+      <p:grpSpPr>
+        <a:xfrm>
+          <a:off x="0" y="0"/>
+          <a:ext cx="0" cy="0"/>
+          <a:chOff x="0" y="0"/>
+          <a:chExt cx="0" cy="0"/>
+        </a:xfrm>
+      </p:grpSpPr>
+      <p:sp>
+        <p:nvSpPr>
+          <p:cNvPr id="2" name="Title 1"/>
+          <p:cNvSpPr>
+            <a:spLocks noGrp="1"/>
+          </p:cNvSpPr>
+          <p:nvPr>
+            <p:ph type="ctrTitle"/>
+          </p:nvPr>
+        </p:nvSpPr>
+        <p:spPr/>
+        <p:txBody>
+          <a:bodyPr/>
+          <a:lstStyle/>
+          <a:p>
+            <a:r>
+              <a:rPr lang="en-US" dirty="0" smtClean="0"/>
+              <a:t>	</a:t>
+            </a:r>
+            <a:endParaRPr lang="en-US" dirty="0"/>
+          </a:p>
+        </p:txBody>
+      </p:sp>
+      <p:sp>
+        <p:nvSpPr>
+          <p:cNvPr id="4" name="Rectangle 3"/>
+          <p:cNvSpPr/>
+          <p:nvPr/>
+        </p:nvSpPr>
+        <p:spPr>
+          <a:xfrm>
+            <a:off x="0" y="6428792"/>
+            <a:ext cx="12192000" cy="419878"/>
+          </a:xfrm>
+          <a:prstGeom prst="rect">
+            <a:avLst/>
+          </a:prstGeom>
+          <a:solidFill>
+            <a:srgbClr val="FDBB30"/>
+          </a:solidFill>
+          <a:ln>
+            <a:solidFill>
+              <a:schemeClr val="tx1"/>
+            </a:solidFill>
+          </a:ln>
+        </p:spPr>
+        <p:style>
+          <a:lnRef idx="2">
+            <a:schemeClr val="accent1">
+              <a:shade val="50000"/>
+            </a:schemeClr>
+          </a:lnRef>
+          <a:fillRef idx="1">
+            <a:schemeClr val="accent1"/>
+          </a:fillRef>
+          <a:effectRef idx="0">
+            <a:schemeClr val="accent1"/>
+          </a:effectRef>
+          <a:fontRef idx="minor">
+            <a:schemeClr val="lt1"/>
+          </a:fontRef>
+        </p:style>
+        <p:txBody>
+          <a:bodyPr rtlCol="0" anchor="ctr"/>
+          <a:lstStyle/>
+          <a:p>
+            <a:pPr algn="ctr"/>
+            <a:endParaRPr lang="en-US"/>
+          </a:p>
+        </p:txBody>
+      </p:sp>
+      <p:sp>
+        <p:nvSpPr>
+          <p:cNvPr id="6" name="Rectangle 5"/>
+          <p:cNvSpPr/>
+          <p:nvPr/>
+        </p:nvSpPr>
+        <p:spPr>
+          <a:xfrm>
+            <a:off x="0" y="6218853"/>
+            <a:ext cx="12192000" cy="303245"/>
+          </a:xfrm>
+          <a:prstGeom prst="rect">
+            <a:avLst/>
+          </a:prstGeom>
+          <a:solidFill>
+            <a:srgbClr val="00543C"/>
+          </a:solidFill>
+          <a:ln>
+            <a:solidFill>
+              <a:schemeClr val="tx1"/>
+            </a:solidFill>
+          </a:ln>
+        </p:spPr>
+        <p:style>
+          <a:lnRef idx="2">
+            <a:schemeClr val="accent1">
+              <a:shade val="50000"/>
+            </a:schemeClr>
+          </a:lnRef>
+          <a:fillRef idx="1">
+            <a:schemeClr val="accent1"/>
+          </a:fillRef>
+          <a:effectRef idx="0">
+            <a:schemeClr val="accent1"/>
+          </a:effectRef>
+          <a:fontRef idx="minor">
+            <a:schemeClr val="lt1"/>
+          </a:fontRef>
+        </p:style>
+        <p:txBody>
+          <a:bodyPr rtlCol="0" anchor="ctr"/>
+          <a:lstStyle/>
+          <a:p>
+            <a:pPr algn="ctr"/>
+            <a:endParaRPr lang="en-US"/>
+          </a:p>
+        </p:txBody>
+      </p:sp>
+      <p:sp>
+        <p:nvSpPr>
+          <p:cNvPr id="9" name="TextBox 8"/>
+          <p:cNvSpPr txBox="1"/>
+          <p:nvPr/>
+        </p:nvSpPr>
+        <p:spPr>
+          <a:xfrm>
+            <a:off x="1362269" y="-31589"/>
+            <a:ext cx="9467461" cy="1077218"/>
+          </a:xfrm>
+          <a:prstGeom prst="rect">
+            <a:avLst/>
+          </a:prstGeom>
+          <a:noFill/>
+        </p:spPr>
+        <p:txBody>
+          <a:bodyPr wrap="square" rtlCol="0">
+            <a:spAutoFit/>
+          </a:bodyPr>
+          <a:lstStyle/>
+          <a:p>
+            <a:pPr algn="ctr"/>
+            <a:r>
+              <a:rPr lang="en-US" sz="3200" dirty="0"/>
+              <a:t>Inflation-Adjusted Published Tuition and Fees Relative to 1989-90, 1989-90 to 2019-20 (1989-90 = 1.0)</a:t>
+            </a:r>
+            <a:endParaRPr lang="en-US" sz="3200" dirty="0"/>
+          </a:p>
+        </p:txBody>
+      </p:sp>
+    </p:spTree>
+    <p:extLst>
+      <p:ext uri="{BB962C8B-B14F-4D97-AF65-F5344CB8AC3E}">
+        <p14:creationId xmlns:p14="http://schemas.microsoft.com/office/powerpoint/2010/main" val="476036129"/>
+      </p:ext>
+    </p:extLst>
+  </p:cSld>
+  <p:clrMapOvr>
+    <a:masterClrMapping/>
+  </p:clrMapOvr>
+  <p:timing>
+    <p:tnLst>
+      <p:par>
+        <p:cTn id="1" dur="indefinite" restart="never" nodeType="tmRoot"/>
+      </p:par>
+    </p:tnLst>
+  </p:timing>
+</p:sld>
+</file>
+
+<file path=ppt/slides/slide13.xml><?xml version="1.0" encoding="utf-8"?>
+<p:sld xmlns:a="http://schemas.openxmlformats.org/drawingml/2006/main" xmlns:r="http://schemas.openxmlformats.org/officeDocument/2006/relationships" xmlns:p="http://schemas.openxmlformats.org/presentationml/2006/main">
+  <p:cSld>
+    <p:spTree>
+      <p:nvGrpSpPr>
+        <p:cNvPr id="1" name=""/>
+        <p:cNvGrpSpPr/>
+        <p:nvPr/>
+      </p:nvGrpSpPr>
+      <p:grpSpPr>
+        <a:xfrm>
+          <a:off x="0" y="0"/>
+          <a:ext cx="0" cy="0"/>
+          <a:chOff x="0" y="0"/>
+          <a:chExt cx="0" cy="0"/>
+        </a:xfrm>
+      </p:grpSpPr>
+      <p:sp>
+        <p:nvSpPr>
+          <p:cNvPr id="2" name="Title 1"/>
+          <p:cNvSpPr>
+            <a:spLocks noGrp="1"/>
+          </p:cNvSpPr>
+          <p:nvPr>
+            <p:ph type="ctrTitle"/>
+          </p:nvPr>
+        </p:nvSpPr>
+        <p:spPr>
+          <a:xfrm>
+            <a:off x="606489" y="2146040"/>
+            <a:ext cx="10453396" cy="981367"/>
+          </a:xfrm>
+        </p:spPr>
+        <p:txBody>
+          <a:bodyPr/>
+          <a:lstStyle/>
+          <a:p>
+            <a:r>
+              <a:rPr lang="en-US" dirty="0" smtClean="0"/>
+              <a:t>What questions do you have?</a:t>
+            </a:r>
+            <a:endParaRPr lang="en-US" dirty="0"/>
+          </a:p>
+        </p:txBody>
+      </p:sp>
+      <p:sp>
+        <p:nvSpPr>
+          <p:cNvPr id="4" name="Rectangle 3"/>
+          <p:cNvSpPr/>
+          <p:nvPr/>
+        </p:nvSpPr>
+        <p:spPr>
+          <a:xfrm>
+            <a:off x="0" y="6428792"/>
+            <a:ext cx="12192000" cy="419878"/>
+          </a:xfrm>
+          <a:prstGeom prst="rect">
+            <a:avLst/>
+          </a:prstGeom>
+          <a:solidFill>
+            <a:srgbClr val="FDBB30"/>
+          </a:solidFill>
+          <a:ln>
+            <a:solidFill>
+              <a:schemeClr val="tx1"/>
+            </a:solidFill>
+          </a:ln>
+        </p:spPr>
+        <p:style>
+          <a:lnRef idx="2">
+            <a:schemeClr val="accent1">
+              <a:shade val="50000"/>
+            </a:schemeClr>
+          </a:lnRef>
+          <a:fillRef idx="1">
+            <a:schemeClr val="accent1"/>
+          </a:fillRef>
+          <a:effectRef idx="0">
+            <a:schemeClr val="accent1"/>
+          </a:effectRef>
+          <a:fontRef idx="minor">
+            <a:schemeClr val="lt1"/>
+          </a:fontRef>
+        </p:style>
+        <p:txBody>
+          <a:bodyPr rtlCol="0" anchor="ctr"/>
+          <a:lstStyle/>
+          <a:p>
+            <a:pPr algn="ctr"/>
+            <a:endParaRPr lang="en-US"/>
+          </a:p>
+        </p:txBody>
+      </p:sp>
+      <p:sp>
+        <p:nvSpPr>
+          <p:cNvPr id="6" name="Rectangle 5"/>
+          <p:cNvSpPr/>
+          <p:nvPr/>
+        </p:nvSpPr>
+        <p:spPr>
+          <a:xfrm>
+            <a:off x="0" y="6218853"/>
+            <a:ext cx="12192000" cy="303245"/>
+          </a:xfrm>
+          <a:prstGeom prst="rect">
+            <a:avLst/>
+          </a:prstGeom>
+          <a:solidFill>
+            <a:srgbClr val="00543C"/>
+          </a:solidFill>
+          <a:ln>
+            <a:solidFill>
+              <a:schemeClr val="tx1"/>
+            </a:solidFill>
+          </a:ln>
+        </p:spPr>
+        <p:style>
+          <a:lnRef idx="2">
+            <a:schemeClr val="accent1">
+              <a:shade val="50000"/>
+            </a:schemeClr>
+          </a:lnRef>
+          <a:fillRef idx="1">
+            <a:schemeClr val="accent1"/>
+          </a:fillRef>
+          <a:effectRef idx="0">
+            <a:schemeClr val="accent1"/>
+          </a:effectRef>
+          <a:fontRef idx="minor">
+            <a:schemeClr val="lt1"/>
+          </a:fontRef>
+        </p:style>
+        <p:txBody>
+          <a:bodyPr rtlCol="0" anchor="ctr"/>
+          <a:lstStyle/>
+          <a:p>
+            <a:pPr algn="ctr"/>
+            <a:endParaRPr lang="en-US"/>
+          </a:p>
+        </p:txBody>
+      </p:sp>
+    </p:spTree>
+    <p:extLst>
+      <p:ext uri="{BB962C8B-B14F-4D97-AF65-F5344CB8AC3E}">
+        <p14:creationId xmlns:p14="http://schemas.microsoft.com/office/powerpoint/2010/main" val="367660017"/>
+      </p:ext>
+    </p:extLst>
+  </p:cSld>
+  <p:clrMapOvr>
+    <a:masterClrMapping/>
+  </p:clrMapOvr>
+  <p:timing>
+    <p:tnLst>
+      <p:par>
+        <p:cTn id="1" dur="indefinite" restart="never" nodeType="tmRoot"/>
+      </p:par>
+    </p:tnLst>
+  </p:timing>
+</p:sld>
+</file>
+
+<file path=ppt/slides/slide14.xml><?xml version="1.0" encoding="utf-8"?>
+<p:sld xmlns:a="http://schemas.openxmlformats.org/drawingml/2006/main" xmlns:r="http://schemas.openxmlformats.org/officeDocument/2006/relationships" xmlns:p="http://schemas.openxmlformats.org/presentationml/2006/main">
+  <p:cSld>
+    <p:spTree>
+      <p:nvGrpSpPr>
+        <p:cNvPr id="1" name=""/>
+        <p:cNvGrpSpPr/>
+        <p:nvPr/>
+      </p:nvGrpSpPr>
+      <p:grpSpPr>
+        <a:xfrm>
+          <a:off x="0" y="0"/>
+          <a:ext cx="0" cy="0"/>
+          <a:chOff x="0" y="0"/>
+          <a:chExt cx="0" cy="0"/>
+        </a:xfrm>
+      </p:grpSpPr>
+      <p:sp>
+        <p:nvSpPr>
+          <p:cNvPr id="2" name="Title 1"/>
+          <p:cNvSpPr>
+            <a:spLocks noGrp="1"/>
+          </p:cNvSpPr>
+          <p:nvPr>
+            <p:ph type="ctrTitle"/>
+          </p:nvPr>
+        </p:nvSpPr>
+        <p:spPr/>
+        <p:txBody>
+          <a:bodyPr/>
+          <a:lstStyle/>
+          <a:p>
+            <a:r>
+              <a:rPr lang="en-US" dirty="0" smtClean="0"/>
+              <a:t>	</a:t>
+            </a:r>
+            <a:endParaRPr lang="en-US" dirty="0"/>
+          </a:p>
+        </p:txBody>
+      </p:sp>
+      <p:sp>
+        <p:nvSpPr>
+          <p:cNvPr id="4" name="Rectangle 3"/>
+          <p:cNvSpPr/>
+          <p:nvPr/>
+        </p:nvSpPr>
+        <p:spPr>
+          <a:xfrm>
+            <a:off x="0" y="6428792"/>
+            <a:ext cx="12192000" cy="419878"/>
+          </a:xfrm>
+          <a:prstGeom prst="rect">
+            <a:avLst/>
+          </a:prstGeom>
+          <a:solidFill>
+            <a:srgbClr val="FDBB30"/>
+          </a:solidFill>
+          <a:ln>
+            <a:solidFill>
+              <a:schemeClr val="tx1"/>
+            </a:solidFill>
+          </a:ln>
+        </p:spPr>
+        <p:style>
+          <a:lnRef idx="2">
+            <a:schemeClr val="accent1">
+              <a:shade val="50000"/>
+            </a:schemeClr>
+          </a:lnRef>
+          <a:fillRef idx="1">
+            <a:schemeClr val="accent1"/>
+          </a:fillRef>
+          <a:effectRef idx="0">
+            <a:schemeClr val="accent1"/>
+          </a:effectRef>
+          <a:fontRef idx="minor">
+            <a:schemeClr val="lt1"/>
+          </a:fontRef>
+        </p:style>
+        <p:txBody>
+          <a:bodyPr rtlCol="0" anchor="ctr"/>
+          <a:lstStyle/>
+          <a:p>
+            <a:pPr algn="ctr"/>
+            <a:endParaRPr lang="en-US"/>
+          </a:p>
+        </p:txBody>
+      </p:sp>
+      <p:sp>
+        <p:nvSpPr>
+          <p:cNvPr id="6" name="Rectangle 5"/>
+          <p:cNvSpPr/>
+          <p:nvPr/>
+        </p:nvSpPr>
+        <p:spPr>
+          <a:xfrm>
+            <a:off x="0" y="6218853"/>
+            <a:ext cx="12192000" cy="303245"/>
+          </a:xfrm>
+          <a:prstGeom prst="rect">
+            <a:avLst/>
+          </a:prstGeom>
+          <a:solidFill>
+            <a:srgbClr val="00543C"/>
+          </a:solidFill>
+          <a:ln>
+            <a:solidFill>
+              <a:schemeClr val="tx1"/>
+            </a:solidFill>
+          </a:ln>
+        </p:spPr>
+        <p:style>
+          <a:lnRef idx="2">
+            <a:schemeClr val="accent1">
+              <a:shade val="50000"/>
+            </a:schemeClr>
+          </a:lnRef>
+          <a:fillRef idx="1">
+            <a:schemeClr val="accent1"/>
+          </a:fillRef>
+          <a:effectRef idx="0">
+            <a:schemeClr val="accent1"/>
+          </a:effectRef>
+          <a:fontRef idx="minor">
+            <a:schemeClr val="lt1"/>
+          </a:fontRef>
+        </p:style>
+        <p:txBody>
+          <a:bodyPr rtlCol="0" anchor="ctr"/>
+          <a:lstStyle/>
+          <a:p>
+            <a:pPr algn="ctr"/>
+            <a:endParaRPr lang="en-US"/>
+          </a:p>
+        </p:txBody>
+      </p:sp>
+      <p:sp>
+        <p:nvSpPr>
+          <p:cNvPr id="7" name="TextBox 6"/>
+          <p:cNvSpPr txBox="1"/>
+          <p:nvPr/>
+        </p:nvSpPr>
+        <p:spPr>
+          <a:xfrm>
+            <a:off x="298579" y="2159559"/>
+            <a:ext cx="11038113" cy="923330"/>
+          </a:xfrm>
+          <a:prstGeom prst="rect">
+            <a:avLst/>
+          </a:prstGeom>
+          <a:noFill/>
+        </p:spPr>
+        <p:txBody>
+          <a:bodyPr wrap="square" rtlCol="0">
+            <a:spAutoFit/>
+          </a:bodyPr>
+          <a:lstStyle/>
+          <a:p>
+            <a:pPr algn="ctr"/>
+            <a:r>
+              <a:rPr lang="en-US" sz="5400" dirty="0" smtClean="0"/>
+              <a:t>Thank you!</a:t>
+            </a:r>
+            <a:endParaRPr lang="en-US" sz="5400" dirty="0"/>
+          </a:p>
+        </p:txBody>
+      </p:sp>
+      <p:pic>
+        <p:nvPicPr>
+          <p:cNvPr id="9" name="Picture 8"/>
+          <p:cNvPicPr>
+            <a:picLocks noChangeAspect="1"/>
+          </p:cNvPicPr>
+          <p:nvPr/>
+        </p:nvPicPr>
+        <p:blipFill>
+          <a:blip r:embed="rId2">
+            <a:extLst>
+              <a:ext uri="{28A0092B-C50C-407E-A947-70E740481C1C}">
+                <a14:useLocalDpi xmlns:a14="http://schemas.microsoft.com/office/drawing/2010/main" val="0"/>
+              </a:ext>
+            </a:extLst>
+          </a:blip>
+          <a:stretch>
+            <a:fillRect/>
+          </a:stretch>
+        </p:blipFill>
+        <p:spPr>
+          <a:xfrm>
+            <a:off x="429208" y="4572000"/>
+            <a:ext cx="1193367" cy="866666"/>
+          </a:xfrm>
+          <a:prstGeom prst="rect">
+            <a:avLst/>
+          </a:prstGeom>
+        </p:spPr>
+      </p:pic>
+      <p:sp>
+        <p:nvSpPr>
+          <p:cNvPr id="10" name="TextBox 9"/>
+          <p:cNvSpPr txBox="1"/>
+          <p:nvPr/>
+        </p:nvSpPr>
+        <p:spPr>
+          <a:xfrm>
+            <a:off x="1524000" y="4782711"/>
+            <a:ext cx="1895066" cy="369332"/>
+          </a:xfrm>
+          <a:prstGeom prst="rect">
+            <a:avLst/>
+          </a:prstGeom>
+          <a:noFill/>
+        </p:spPr>
+        <p:txBody>
+          <a:bodyPr wrap="square" rtlCol="0">
+            <a:spAutoFit/>
+          </a:bodyPr>
+          <a:lstStyle/>
+          <a:p>
+            <a:r>
+              <a:rPr lang="en-US" dirty="0" smtClean="0"/>
+              <a:t>@</a:t>
+            </a:r>
+            <a:r>
+              <a:rPr lang="en-US" dirty="0" err="1" smtClean="0"/>
+              <a:t>greg_dubrow</a:t>
+            </a:r>
+            <a:endParaRPr lang="en-US" dirty="0"/>
+          </a:p>
+        </p:txBody>
+      </p:sp>
+      <p:pic>
+        <p:nvPicPr>
+          <p:cNvPr id="11" name="Picture 10"/>
+          <p:cNvPicPr>
+            <a:picLocks noChangeAspect="1"/>
+          </p:cNvPicPr>
+          <p:nvPr/>
+        </p:nvPicPr>
+        <p:blipFill>
+          <a:blip r:embed="rId3" cstate="print">
+            <a:extLst>
+              <a:ext uri="{28A0092B-C50C-407E-A947-70E740481C1C}">
+                <a14:useLocalDpi xmlns:a14="http://schemas.microsoft.com/office/drawing/2010/main" val="0"/>
+              </a:ext>
+            </a:extLst>
+          </a:blip>
+          <a:stretch>
+            <a:fillRect/>
+          </a:stretch>
+        </p:blipFill>
+        <p:spPr>
+          <a:xfrm>
+            <a:off x="3703017" y="4572880"/>
+            <a:ext cx="868680" cy="868680"/>
+          </a:xfrm>
+          <a:prstGeom prst="rect">
+            <a:avLst/>
+          </a:prstGeom>
+        </p:spPr>
+      </p:pic>
+      <p:sp>
+        <p:nvSpPr>
+          <p:cNvPr id="12" name="TextBox 11"/>
+          <p:cNvSpPr txBox="1"/>
+          <p:nvPr/>
+        </p:nvSpPr>
+        <p:spPr>
+          <a:xfrm>
+            <a:off x="4650551" y="4782711"/>
+            <a:ext cx="1895066" cy="369332"/>
+          </a:xfrm>
+          <a:prstGeom prst="rect">
+            <a:avLst/>
+          </a:prstGeom>
+          <a:noFill/>
+        </p:spPr>
+        <p:txBody>
+          <a:bodyPr wrap="square" rtlCol="0">
+            <a:spAutoFit/>
+          </a:bodyPr>
+          <a:lstStyle/>
+          <a:p>
+            <a:r>
+              <a:rPr lang="en-US" dirty="0" smtClean="0"/>
+              <a:t>Greg Dubrow</a:t>
+            </a:r>
+            <a:endParaRPr lang="en-US" dirty="0"/>
+          </a:p>
+        </p:txBody>
+      </p:sp>
+      <p:pic>
+        <p:nvPicPr>
+          <p:cNvPr id="13" name="Picture 12"/>
+          <p:cNvPicPr>
+            <a:picLocks noChangeAspect="1"/>
+          </p:cNvPicPr>
+          <p:nvPr/>
+        </p:nvPicPr>
+        <p:blipFill>
+          <a:blip r:embed="rId4" cstate="print">
+            <a:extLst>
+              <a:ext uri="{28A0092B-C50C-407E-A947-70E740481C1C}">
+                <a14:useLocalDpi xmlns:a14="http://schemas.microsoft.com/office/drawing/2010/main" val="0"/>
+              </a:ext>
+            </a:extLst>
+          </a:blip>
+          <a:stretch>
+            <a:fillRect/>
+          </a:stretch>
+        </p:blipFill>
+        <p:spPr>
+          <a:xfrm>
+            <a:off x="6652139" y="4569986"/>
+            <a:ext cx="962479" cy="868680"/>
+          </a:xfrm>
+          <a:prstGeom prst="rect">
+            <a:avLst/>
+          </a:prstGeom>
+        </p:spPr>
+      </p:pic>
+      <p:sp>
+        <p:nvSpPr>
+          <p:cNvPr id="14" name="TextBox 13"/>
+          <p:cNvSpPr txBox="1"/>
+          <p:nvPr/>
+        </p:nvSpPr>
+        <p:spPr>
+          <a:xfrm>
+            <a:off x="7721140" y="4737603"/>
+            <a:ext cx="1895066" cy="369332"/>
+          </a:xfrm>
+          <a:prstGeom prst="rect">
+            <a:avLst/>
+          </a:prstGeom>
+          <a:noFill/>
+        </p:spPr>
+        <p:txBody>
+          <a:bodyPr wrap="square" rtlCol="0">
+            <a:spAutoFit/>
+          </a:bodyPr>
+          <a:lstStyle/>
+          <a:p>
+            <a:r>
+              <a:rPr lang="en-US" dirty="0" err="1" smtClean="0"/>
+              <a:t>greg-dubrow</a:t>
+            </a:r>
+            <a:endParaRPr lang="en-US" dirty="0"/>
+          </a:p>
+        </p:txBody>
+      </p:sp>
+    </p:spTree>
+    <p:extLst>
+      <p:ext uri="{BB962C8B-B14F-4D97-AF65-F5344CB8AC3E}">
+        <p14:creationId xmlns:p14="http://schemas.microsoft.com/office/powerpoint/2010/main" val="2442654946"/>
       </p:ext>
     </p:extLst>
   </p:cSld>
@@ -3165,25 +4452,6 @@
       </p:sp>
       <p:sp>
         <p:nvSpPr>
-          <p:cNvPr id="3" name="Subtitle 2"/>
-          <p:cNvSpPr>
-            <a:spLocks noGrp="1"/>
-          </p:cNvSpPr>
-          <p:nvPr>
-            <p:ph type="subTitle" idx="1"/>
-          </p:nvPr>
-        </p:nvSpPr>
-        <p:spPr/>
-        <p:txBody>
-          <a:bodyPr/>
-          <a:lstStyle/>
-          <a:p>
-            <a:endParaRPr lang="en-US" dirty="0"/>
-          </a:p>
-        </p:txBody>
-      </p:sp>
-      <p:sp>
-        <p:nvSpPr>
           <p:cNvPr id="4" name="Rectangle 3"/>
           <p:cNvSpPr/>
           <p:nvPr/>
@@ -3278,10 +4546,2318 @@
           </a:p>
         </p:txBody>
       </p:sp>
+      <p:sp>
+        <p:nvSpPr>
+          <p:cNvPr id="7" name="TextBox 6"/>
+          <p:cNvSpPr txBox="1"/>
+          <p:nvPr/>
+        </p:nvSpPr>
+        <p:spPr>
+          <a:xfrm>
+            <a:off x="429208" y="703984"/>
+            <a:ext cx="11038113" cy="3539430"/>
+          </a:xfrm>
+          <a:prstGeom prst="rect">
+            <a:avLst/>
+          </a:prstGeom>
+          <a:noFill/>
+        </p:spPr>
+        <p:txBody>
+          <a:bodyPr wrap="square" rtlCol="0">
+            <a:spAutoFit/>
+          </a:bodyPr>
+          <a:lstStyle/>
+          <a:p>
+            <a:r>
+              <a:rPr lang="en-US" sz="2800" dirty="0" smtClean="0"/>
+              <a:t>About me:</a:t>
+            </a:r>
+          </a:p>
+          <a:p>
+            <a:endParaRPr lang="en-US" sz="1400" dirty="0"/>
+          </a:p>
+          <a:p>
+            <a:r>
+              <a:rPr lang="en-US" sz="2800" dirty="0" smtClean="0"/>
+              <a:t>Since November 2018, Director of IR at SF State</a:t>
+            </a:r>
+          </a:p>
+          <a:p>
+            <a:endParaRPr lang="en-US" sz="1400" dirty="0"/>
+          </a:p>
+          <a:p>
+            <a:r>
+              <a:rPr lang="en-US" sz="2800" dirty="0" smtClean="0"/>
+              <a:t>Director of Research &amp; Policy Analysis/Enrollment Analytics at </a:t>
+            </a:r>
+          </a:p>
+          <a:p>
+            <a:r>
+              <a:rPr lang="en-US" sz="2800" dirty="0" smtClean="0"/>
+              <a:t>UC Berkeley Office of Undergraduate Admissions, 2005 to 2018</a:t>
+            </a:r>
+          </a:p>
+          <a:p>
+            <a:endParaRPr lang="en-US" sz="1400" dirty="0" smtClean="0"/>
+          </a:p>
+          <a:p>
+            <a:r>
+              <a:rPr lang="en-US" sz="2800" dirty="0" smtClean="0"/>
+              <a:t>Asst. Professor, Florida International </a:t>
+            </a:r>
+            <a:r>
+              <a:rPr lang="en-US" sz="2800" dirty="0" err="1" smtClean="0"/>
+              <a:t>Univ</a:t>
+            </a:r>
+            <a:r>
+              <a:rPr lang="en-US" sz="2800" dirty="0" smtClean="0"/>
+              <a:t>, Miami FL 2001 to 2005</a:t>
+            </a:r>
+          </a:p>
+          <a:p>
+            <a:endParaRPr lang="en-US" sz="1400" dirty="0" smtClean="0"/>
+          </a:p>
+          <a:p>
+            <a:r>
+              <a:rPr lang="en-US" sz="2800" dirty="0" smtClean="0"/>
+              <a:t>Ph.D. in Higher Education, University of Pennsylvania</a:t>
+            </a:r>
+            <a:endParaRPr lang="en-US" sz="2800" dirty="0"/>
+          </a:p>
+        </p:txBody>
+      </p:sp>
+      <p:pic>
+        <p:nvPicPr>
+          <p:cNvPr id="9" name="Picture 8"/>
+          <p:cNvPicPr>
+            <a:picLocks noChangeAspect="1"/>
+          </p:cNvPicPr>
+          <p:nvPr/>
+        </p:nvPicPr>
+        <p:blipFill>
+          <a:blip r:embed="rId2">
+            <a:extLst>
+              <a:ext uri="{28A0092B-C50C-407E-A947-70E740481C1C}">
+                <a14:useLocalDpi xmlns:a14="http://schemas.microsoft.com/office/drawing/2010/main" val="0"/>
+              </a:ext>
+            </a:extLst>
+          </a:blip>
+          <a:stretch>
+            <a:fillRect/>
+          </a:stretch>
+        </p:blipFill>
+        <p:spPr>
+          <a:xfrm>
+            <a:off x="429208" y="4572000"/>
+            <a:ext cx="1193367" cy="866666"/>
+          </a:xfrm>
+          <a:prstGeom prst="rect">
+            <a:avLst/>
+          </a:prstGeom>
+        </p:spPr>
+      </p:pic>
+      <p:sp>
+        <p:nvSpPr>
+          <p:cNvPr id="10" name="TextBox 9"/>
+          <p:cNvSpPr txBox="1"/>
+          <p:nvPr/>
+        </p:nvSpPr>
+        <p:spPr>
+          <a:xfrm>
+            <a:off x="1524000" y="4782711"/>
+            <a:ext cx="1895066" cy="369332"/>
+          </a:xfrm>
+          <a:prstGeom prst="rect">
+            <a:avLst/>
+          </a:prstGeom>
+          <a:noFill/>
+        </p:spPr>
+        <p:txBody>
+          <a:bodyPr wrap="square" rtlCol="0">
+            <a:spAutoFit/>
+          </a:bodyPr>
+          <a:lstStyle/>
+          <a:p>
+            <a:r>
+              <a:rPr lang="en-US" dirty="0" smtClean="0"/>
+              <a:t>@</a:t>
+            </a:r>
+            <a:r>
+              <a:rPr lang="en-US" dirty="0" err="1" smtClean="0"/>
+              <a:t>greg_dubrow</a:t>
+            </a:r>
+            <a:endParaRPr lang="en-US" dirty="0"/>
+          </a:p>
+        </p:txBody>
+      </p:sp>
+      <p:pic>
+        <p:nvPicPr>
+          <p:cNvPr id="11" name="Picture 10"/>
+          <p:cNvPicPr>
+            <a:picLocks noChangeAspect="1"/>
+          </p:cNvPicPr>
+          <p:nvPr/>
+        </p:nvPicPr>
+        <p:blipFill>
+          <a:blip r:embed="rId3" cstate="print">
+            <a:extLst>
+              <a:ext uri="{28A0092B-C50C-407E-A947-70E740481C1C}">
+                <a14:useLocalDpi xmlns:a14="http://schemas.microsoft.com/office/drawing/2010/main" val="0"/>
+              </a:ext>
+            </a:extLst>
+          </a:blip>
+          <a:stretch>
+            <a:fillRect/>
+          </a:stretch>
+        </p:blipFill>
+        <p:spPr>
+          <a:xfrm>
+            <a:off x="3703017" y="4572880"/>
+            <a:ext cx="868680" cy="868680"/>
+          </a:xfrm>
+          <a:prstGeom prst="rect">
+            <a:avLst/>
+          </a:prstGeom>
+        </p:spPr>
+      </p:pic>
+      <p:sp>
+        <p:nvSpPr>
+          <p:cNvPr id="12" name="TextBox 11"/>
+          <p:cNvSpPr txBox="1"/>
+          <p:nvPr/>
+        </p:nvSpPr>
+        <p:spPr>
+          <a:xfrm>
+            <a:off x="4650551" y="4782711"/>
+            <a:ext cx="1895066" cy="369332"/>
+          </a:xfrm>
+          <a:prstGeom prst="rect">
+            <a:avLst/>
+          </a:prstGeom>
+          <a:noFill/>
+        </p:spPr>
+        <p:txBody>
+          <a:bodyPr wrap="square" rtlCol="0">
+            <a:spAutoFit/>
+          </a:bodyPr>
+          <a:lstStyle/>
+          <a:p>
+            <a:r>
+              <a:rPr lang="en-US" dirty="0" smtClean="0"/>
+              <a:t>Greg Dubrow</a:t>
+            </a:r>
+            <a:endParaRPr lang="en-US" dirty="0"/>
+          </a:p>
+        </p:txBody>
+      </p:sp>
+      <p:pic>
+        <p:nvPicPr>
+          <p:cNvPr id="13" name="Picture 12"/>
+          <p:cNvPicPr>
+            <a:picLocks noChangeAspect="1"/>
+          </p:cNvPicPr>
+          <p:nvPr/>
+        </p:nvPicPr>
+        <p:blipFill>
+          <a:blip r:embed="rId4" cstate="print">
+            <a:extLst>
+              <a:ext uri="{28A0092B-C50C-407E-A947-70E740481C1C}">
+                <a14:useLocalDpi xmlns:a14="http://schemas.microsoft.com/office/drawing/2010/main" val="0"/>
+              </a:ext>
+            </a:extLst>
+          </a:blip>
+          <a:stretch>
+            <a:fillRect/>
+          </a:stretch>
+        </p:blipFill>
+        <p:spPr>
+          <a:xfrm>
+            <a:off x="6652139" y="4569986"/>
+            <a:ext cx="962479" cy="868680"/>
+          </a:xfrm>
+          <a:prstGeom prst="rect">
+            <a:avLst/>
+          </a:prstGeom>
+        </p:spPr>
+      </p:pic>
+      <p:sp>
+        <p:nvSpPr>
+          <p:cNvPr id="14" name="TextBox 13"/>
+          <p:cNvSpPr txBox="1"/>
+          <p:nvPr/>
+        </p:nvSpPr>
+        <p:spPr>
+          <a:xfrm>
+            <a:off x="7721140" y="4737603"/>
+            <a:ext cx="1895066" cy="369332"/>
+          </a:xfrm>
+          <a:prstGeom prst="rect">
+            <a:avLst/>
+          </a:prstGeom>
+          <a:noFill/>
+        </p:spPr>
+        <p:txBody>
+          <a:bodyPr wrap="square" rtlCol="0">
+            <a:spAutoFit/>
+          </a:bodyPr>
+          <a:lstStyle/>
+          <a:p>
+            <a:r>
+              <a:rPr lang="en-US" dirty="0" err="1" smtClean="0"/>
+              <a:t>greg-dubrow</a:t>
+            </a:r>
+            <a:endParaRPr lang="en-US" dirty="0"/>
+          </a:p>
+        </p:txBody>
+      </p:sp>
     </p:spTree>
     <p:extLst>
       <p:ext uri="{BB962C8B-B14F-4D97-AF65-F5344CB8AC3E}">
         <p14:creationId xmlns:p14="http://schemas.microsoft.com/office/powerpoint/2010/main" val="331557494"/>
+      </p:ext>
+    </p:extLst>
+  </p:cSld>
+  <p:clrMapOvr>
+    <a:masterClrMapping/>
+  </p:clrMapOvr>
+  <p:timing>
+    <p:tnLst>
+      <p:par>
+        <p:cTn id="1" dur="indefinite" restart="never" nodeType="tmRoot"/>
+      </p:par>
+    </p:tnLst>
+  </p:timing>
+</p:sld>
+</file>
+
+<file path=ppt/slides/slide3.xml><?xml version="1.0" encoding="utf-8"?>
+<p:sld xmlns:a="http://schemas.openxmlformats.org/drawingml/2006/main" xmlns:r="http://schemas.openxmlformats.org/officeDocument/2006/relationships" xmlns:p="http://schemas.openxmlformats.org/presentationml/2006/main">
+  <p:cSld>
+    <p:spTree>
+      <p:nvGrpSpPr>
+        <p:cNvPr id="1" name=""/>
+        <p:cNvGrpSpPr/>
+        <p:nvPr/>
+      </p:nvGrpSpPr>
+      <p:grpSpPr>
+        <a:xfrm>
+          <a:off x="0" y="0"/>
+          <a:ext cx="0" cy="0"/>
+          <a:chOff x="0" y="0"/>
+          <a:chExt cx="0" cy="0"/>
+        </a:xfrm>
+      </p:grpSpPr>
+      <p:sp>
+        <p:nvSpPr>
+          <p:cNvPr id="2" name="Title 1"/>
+          <p:cNvSpPr>
+            <a:spLocks noGrp="1"/>
+          </p:cNvSpPr>
+          <p:nvPr>
+            <p:ph type="ctrTitle"/>
+          </p:nvPr>
+        </p:nvSpPr>
+        <p:spPr/>
+        <p:txBody>
+          <a:bodyPr/>
+          <a:lstStyle/>
+          <a:p>
+            <a:r>
+              <a:rPr lang="en-US" dirty="0" smtClean="0"/>
+              <a:t>	</a:t>
+            </a:r>
+            <a:endParaRPr lang="en-US" dirty="0"/>
+          </a:p>
+        </p:txBody>
+      </p:sp>
+      <p:sp>
+        <p:nvSpPr>
+          <p:cNvPr id="4" name="Rectangle 3"/>
+          <p:cNvSpPr/>
+          <p:nvPr/>
+        </p:nvSpPr>
+        <p:spPr>
+          <a:xfrm>
+            <a:off x="0" y="6428792"/>
+            <a:ext cx="12192000" cy="419878"/>
+          </a:xfrm>
+          <a:prstGeom prst="rect">
+            <a:avLst/>
+          </a:prstGeom>
+          <a:solidFill>
+            <a:srgbClr val="FDBB30"/>
+          </a:solidFill>
+          <a:ln>
+            <a:solidFill>
+              <a:schemeClr val="tx1"/>
+            </a:solidFill>
+          </a:ln>
+        </p:spPr>
+        <p:style>
+          <a:lnRef idx="2">
+            <a:schemeClr val="accent1">
+              <a:shade val="50000"/>
+            </a:schemeClr>
+          </a:lnRef>
+          <a:fillRef idx="1">
+            <a:schemeClr val="accent1"/>
+          </a:fillRef>
+          <a:effectRef idx="0">
+            <a:schemeClr val="accent1"/>
+          </a:effectRef>
+          <a:fontRef idx="minor">
+            <a:schemeClr val="lt1"/>
+          </a:fontRef>
+        </p:style>
+        <p:txBody>
+          <a:bodyPr rtlCol="0" anchor="ctr"/>
+          <a:lstStyle/>
+          <a:p>
+            <a:pPr algn="ctr"/>
+            <a:endParaRPr lang="en-US"/>
+          </a:p>
+        </p:txBody>
+      </p:sp>
+      <p:sp>
+        <p:nvSpPr>
+          <p:cNvPr id="6" name="Rectangle 5"/>
+          <p:cNvSpPr/>
+          <p:nvPr/>
+        </p:nvSpPr>
+        <p:spPr>
+          <a:xfrm>
+            <a:off x="0" y="6218853"/>
+            <a:ext cx="12192000" cy="303245"/>
+          </a:xfrm>
+          <a:prstGeom prst="rect">
+            <a:avLst/>
+          </a:prstGeom>
+          <a:solidFill>
+            <a:srgbClr val="00543C"/>
+          </a:solidFill>
+          <a:ln>
+            <a:solidFill>
+              <a:schemeClr val="tx1"/>
+            </a:solidFill>
+          </a:ln>
+        </p:spPr>
+        <p:style>
+          <a:lnRef idx="2">
+            <a:schemeClr val="accent1">
+              <a:shade val="50000"/>
+            </a:schemeClr>
+          </a:lnRef>
+          <a:fillRef idx="1">
+            <a:schemeClr val="accent1"/>
+          </a:fillRef>
+          <a:effectRef idx="0">
+            <a:schemeClr val="accent1"/>
+          </a:effectRef>
+          <a:fontRef idx="minor">
+            <a:schemeClr val="lt1"/>
+          </a:fontRef>
+        </p:style>
+        <p:txBody>
+          <a:bodyPr rtlCol="0" anchor="ctr"/>
+          <a:lstStyle/>
+          <a:p>
+            <a:pPr algn="ctr"/>
+            <a:endParaRPr lang="en-US"/>
+          </a:p>
+        </p:txBody>
+      </p:sp>
+      <p:sp>
+        <p:nvSpPr>
+          <p:cNvPr id="7" name="TextBox 6"/>
+          <p:cNvSpPr txBox="1"/>
+          <p:nvPr/>
+        </p:nvSpPr>
+        <p:spPr>
+          <a:xfrm>
+            <a:off x="429208" y="781537"/>
+            <a:ext cx="11038113" cy="4216539"/>
+          </a:xfrm>
+          <a:prstGeom prst="rect">
+            <a:avLst/>
+          </a:prstGeom>
+          <a:noFill/>
+        </p:spPr>
+        <p:txBody>
+          <a:bodyPr wrap="square" rtlCol="0">
+            <a:spAutoFit/>
+          </a:bodyPr>
+          <a:lstStyle/>
+          <a:p>
+            <a:r>
+              <a:rPr lang="en-US" sz="2800" dirty="0" smtClean="0"/>
+              <a:t>What </a:t>
+            </a:r>
+            <a:r>
+              <a:rPr lang="en-US" sz="2800" dirty="0"/>
+              <a:t>are the major trends affecting the higher </a:t>
+            </a:r>
+            <a:r>
+              <a:rPr lang="en-US" sz="2800" dirty="0" smtClean="0"/>
+              <a:t>education </a:t>
+            </a:r>
+            <a:r>
+              <a:rPr lang="en-US" sz="2800" dirty="0"/>
+              <a:t>landscape in the US today, particularly traditional liberal arts colleges</a:t>
+            </a:r>
+            <a:r>
+              <a:rPr lang="en-US" sz="2800" dirty="0" smtClean="0"/>
+              <a:t>?</a:t>
+            </a:r>
+          </a:p>
+          <a:p>
+            <a:endParaRPr lang="en-US" dirty="0"/>
+          </a:p>
+          <a:p>
+            <a:pPr marL="742950" lvl="1" indent="-285750">
+              <a:buFont typeface="Arial" panose="020B0604020202020204" pitchFamily="34" charset="0"/>
+              <a:buChar char="•"/>
+            </a:pPr>
+            <a:r>
+              <a:rPr lang="en-US" sz="2800" dirty="0" smtClean="0"/>
+              <a:t>Changing </a:t>
+            </a:r>
+            <a:r>
+              <a:rPr lang="en-US" sz="2800" dirty="0"/>
+              <a:t>demographics impacting </a:t>
+            </a:r>
+            <a:r>
+              <a:rPr lang="en-US" sz="2800" dirty="0" smtClean="0"/>
+              <a:t>enrollments</a:t>
+            </a:r>
+          </a:p>
+          <a:p>
+            <a:pPr lvl="1"/>
+            <a:endParaRPr lang="en-US" dirty="0"/>
+          </a:p>
+          <a:p>
+            <a:pPr marL="742950" lvl="1" indent="-285750">
+              <a:buFont typeface="Arial" panose="020B0604020202020204" pitchFamily="34" charset="0"/>
+              <a:buChar char="•"/>
+            </a:pPr>
+            <a:r>
+              <a:rPr lang="en-US" sz="2800" dirty="0" smtClean="0"/>
+              <a:t>How </a:t>
+            </a:r>
+            <a:r>
+              <a:rPr lang="en-US" sz="2800" dirty="0"/>
+              <a:t>much is affordability a factor for liberal arts colleges? </a:t>
+            </a:r>
+            <a:endParaRPr lang="en-US" sz="2800" dirty="0" smtClean="0"/>
+          </a:p>
+          <a:p>
+            <a:pPr lvl="1"/>
+            <a:endParaRPr lang="en-US" dirty="0"/>
+          </a:p>
+          <a:p>
+            <a:pPr marL="742950" lvl="1" indent="-285750">
+              <a:buFont typeface="Arial" panose="020B0604020202020204" pitchFamily="34" charset="0"/>
+              <a:buChar char="•"/>
+            </a:pPr>
+            <a:r>
+              <a:rPr lang="en-US" sz="2800" dirty="0"/>
+              <a:t>The role of endowments in ensuring long-term financial security?</a:t>
+            </a:r>
+          </a:p>
+          <a:p>
+            <a:pPr marL="742950" lvl="1" indent="-285750">
+              <a:buFont typeface="Arial" panose="020B0604020202020204" pitchFamily="34" charset="0"/>
+              <a:buChar char="•"/>
+            </a:pPr>
+            <a:endParaRPr lang="en-US" dirty="0" smtClean="0"/>
+          </a:p>
+          <a:p>
+            <a:pPr marL="742950" lvl="1" indent="-285750">
+              <a:buFont typeface="Arial" panose="020B0604020202020204" pitchFamily="34" charset="0"/>
+              <a:buChar char="•"/>
+            </a:pPr>
+            <a:r>
+              <a:rPr lang="en-US" sz="2800" dirty="0" smtClean="0"/>
+              <a:t>What </a:t>
+            </a:r>
+            <a:r>
+              <a:rPr lang="en-US" sz="2800" dirty="0"/>
+              <a:t>social/political threats are on the horizon that colleges should start addressing</a:t>
+            </a:r>
+            <a:r>
+              <a:rPr lang="en-US" sz="2800" dirty="0" smtClean="0"/>
+              <a:t>?</a:t>
+            </a:r>
+          </a:p>
+        </p:txBody>
+      </p:sp>
+    </p:spTree>
+    <p:extLst>
+      <p:ext uri="{BB962C8B-B14F-4D97-AF65-F5344CB8AC3E}">
+        <p14:creationId xmlns:p14="http://schemas.microsoft.com/office/powerpoint/2010/main" val="1852364308"/>
+      </p:ext>
+    </p:extLst>
+  </p:cSld>
+  <p:clrMapOvr>
+    <a:masterClrMapping/>
+  </p:clrMapOvr>
+  <p:timing>
+    <p:tnLst>
+      <p:par>
+        <p:cTn id="1" dur="indefinite" restart="never" nodeType="tmRoot"/>
+      </p:par>
+    </p:tnLst>
+  </p:timing>
+</p:sld>
+</file>
+
+<file path=ppt/slides/slide4.xml><?xml version="1.0" encoding="utf-8"?>
+<p:sld xmlns:a="http://schemas.openxmlformats.org/drawingml/2006/main" xmlns:r="http://schemas.openxmlformats.org/officeDocument/2006/relationships" xmlns:p="http://schemas.openxmlformats.org/presentationml/2006/main">
+  <p:cSld>
+    <p:spTree>
+      <p:nvGrpSpPr>
+        <p:cNvPr id="1" name=""/>
+        <p:cNvGrpSpPr/>
+        <p:nvPr/>
+      </p:nvGrpSpPr>
+      <p:grpSpPr>
+        <a:xfrm>
+          <a:off x="0" y="0"/>
+          <a:ext cx="0" cy="0"/>
+          <a:chOff x="0" y="0"/>
+          <a:chExt cx="0" cy="0"/>
+        </a:xfrm>
+      </p:grpSpPr>
+      <p:sp>
+        <p:nvSpPr>
+          <p:cNvPr id="2" name="Title 1"/>
+          <p:cNvSpPr>
+            <a:spLocks noGrp="1"/>
+          </p:cNvSpPr>
+          <p:nvPr>
+            <p:ph type="ctrTitle"/>
+          </p:nvPr>
+        </p:nvSpPr>
+        <p:spPr/>
+        <p:txBody>
+          <a:bodyPr/>
+          <a:lstStyle/>
+          <a:p>
+            <a:r>
+              <a:rPr lang="en-US" dirty="0" smtClean="0"/>
+              <a:t>	</a:t>
+            </a:r>
+            <a:endParaRPr lang="en-US" dirty="0"/>
+          </a:p>
+        </p:txBody>
+      </p:sp>
+      <p:sp>
+        <p:nvSpPr>
+          <p:cNvPr id="4" name="Rectangle 3"/>
+          <p:cNvSpPr/>
+          <p:nvPr/>
+        </p:nvSpPr>
+        <p:spPr>
+          <a:xfrm>
+            <a:off x="0" y="6428792"/>
+            <a:ext cx="12192000" cy="419878"/>
+          </a:xfrm>
+          <a:prstGeom prst="rect">
+            <a:avLst/>
+          </a:prstGeom>
+          <a:solidFill>
+            <a:srgbClr val="FDBB30"/>
+          </a:solidFill>
+          <a:ln>
+            <a:solidFill>
+              <a:schemeClr val="tx1"/>
+            </a:solidFill>
+          </a:ln>
+        </p:spPr>
+        <p:style>
+          <a:lnRef idx="2">
+            <a:schemeClr val="accent1">
+              <a:shade val="50000"/>
+            </a:schemeClr>
+          </a:lnRef>
+          <a:fillRef idx="1">
+            <a:schemeClr val="accent1"/>
+          </a:fillRef>
+          <a:effectRef idx="0">
+            <a:schemeClr val="accent1"/>
+          </a:effectRef>
+          <a:fontRef idx="minor">
+            <a:schemeClr val="lt1"/>
+          </a:fontRef>
+        </p:style>
+        <p:txBody>
+          <a:bodyPr rtlCol="0" anchor="ctr"/>
+          <a:lstStyle/>
+          <a:p>
+            <a:pPr algn="ctr"/>
+            <a:endParaRPr lang="en-US"/>
+          </a:p>
+        </p:txBody>
+      </p:sp>
+      <p:sp>
+        <p:nvSpPr>
+          <p:cNvPr id="6" name="Rectangle 5"/>
+          <p:cNvSpPr/>
+          <p:nvPr/>
+        </p:nvSpPr>
+        <p:spPr>
+          <a:xfrm>
+            <a:off x="0" y="6218853"/>
+            <a:ext cx="12192000" cy="303245"/>
+          </a:xfrm>
+          <a:prstGeom prst="rect">
+            <a:avLst/>
+          </a:prstGeom>
+          <a:solidFill>
+            <a:srgbClr val="00543C"/>
+          </a:solidFill>
+          <a:ln>
+            <a:solidFill>
+              <a:schemeClr val="tx1"/>
+            </a:solidFill>
+          </a:ln>
+        </p:spPr>
+        <p:style>
+          <a:lnRef idx="2">
+            <a:schemeClr val="accent1">
+              <a:shade val="50000"/>
+            </a:schemeClr>
+          </a:lnRef>
+          <a:fillRef idx="1">
+            <a:schemeClr val="accent1"/>
+          </a:fillRef>
+          <a:effectRef idx="0">
+            <a:schemeClr val="accent1"/>
+          </a:effectRef>
+          <a:fontRef idx="minor">
+            <a:schemeClr val="lt1"/>
+          </a:fontRef>
+        </p:style>
+        <p:txBody>
+          <a:bodyPr rtlCol="0" anchor="ctr"/>
+          <a:lstStyle/>
+          <a:p>
+            <a:pPr algn="ctr"/>
+            <a:endParaRPr lang="en-US"/>
+          </a:p>
+        </p:txBody>
+      </p:sp>
+      <p:sp>
+        <p:nvSpPr>
+          <p:cNvPr id="7" name="TextBox 6"/>
+          <p:cNvSpPr txBox="1"/>
+          <p:nvPr/>
+        </p:nvSpPr>
+        <p:spPr>
+          <a:xfrm>
+            <a:off x="485192" y="2288254"/>
+            <a:ext cx="11038113" cy="923330"/>
+          </a:xfrm>
+          <a:prstGeom prst="rect">
+            <a:avLst/>
+          </a:prstGeom>
+          <a:noFill/>
+        </p:spPr>
+        <p:txBody>
+          <a:bodyPr wrap="square" rtlCol="0">
+            <a:spAutoFit/>
+          </a:bodyPr>
+          <a:lstStyle/>
+          <a:p>
+            <a:pPr algn="ctr"/>
+            <a:r>
+              <a:rPr lang="en-US" sz="5400" dirty="0" smtClean="0"/>
+              <a:t>California High School Graduates </a:t>
+            </a:r>
+          </a:p>
+        </p:txBody>
+      </p:sp>
+    </p:spTree>
+    <p:extLst>
+      <p:ext uri="{BB962C8B-B14F-4D97-AF65-F5344CB8AC3E}">
+        <p14:creationId xmlns:p14="http://schemas.microsoft.com/office/powerpoint/2010/main" val="4128693825"/>
+      </p:ext>
+    </p:extLst>
+  </p:cSld>
+  <p:clrMapOvr>
+    <a:masterClrMapping/>
+  </p:clrMapOvr>
+  <p:timing>
+    <p:tnLst>
+      <p:par>
+        <p:cTn id="1" dur="indefinite" restart="never" nodeType="tmRoot"/>
+      </p:par>
+    </p:tnLst>
+  </p:timing>
+</p:sld>
+</file>
+
+<file path=ppt/slides/slide5.xml><?xml version="1.0" encoding="utf-8"?>
+<p:sld xmlns:a="http://schemas.openxmlformats.org/drawingml/2006/main" xmlns:r="http://schemas.openxmlformats.org/officeDocument/2006/relationships" xmlns:p="http://schemas.openxmlformats.org/presentationml/2006/main">
+  <p:cSld>
+    <p:spTree>
+      <p:nvGrpSpPr>
+        <p:cNvPr id="1" name=""/>
+        <p:cNvGrpSpPr/>
+        <p:nvPr/>
+      </p:nvGrpSpPr>
+      <p:grpSpPr>
+        <a:xfrm>
+          <a:off x="0" y="0"/>
+          <a:ext cx="0" cy="0"/>
+          <a:chOff x="0" y="0"/>
+          <a:chExt cx="0" cy="0"/>
+        </a:xfrm>
+      </p:grpSpPr>
+      <p:sp>
+        <p:nvSpPr>
+          <p:cNvPr id="2" name="Title 1"/>
+          <p:cNvSpPr>
+            <a:spLocks noGrp="1"/>
+          </p:cNvSpPr>
+          <p:nvPr>
+            <p:ph type="ctrTitle"/>
+          </p:nvPr>
+        </p:nvSpPr>
+        <p:spPr/>
+        <p:txBody>
+          <a:bodyPr/>
+          <a:lstStyle/>
+          <a:p>
+            <a:r>
+              <a:rPr lang="en-US" dirty="0" smtClean="0"/>
+              <a:t>	</a:t>
+            </a:r>
+            <a:endParaRPr lang="en-US" dirty="0"/>
+          </a:p>
+        </p:txBody>
+      </p:sp>
+      <p:sp>
+        <p:nvSpPr>
+          <p:cNvPr id="4" name="Rectangle 3"/>
+          <p:cNvSpPr/>
+          <p:nvPr/>
+        </p:nvSpPr>
+        <p:spPr>
+          <a:xfrm>
+            <a:off x="0" y="6428792"/>
+            <a:ext cx="12192000" cy="419878"/>
+          </a:xfrm>
+          <a:prstGeom prst="rect">
+            <a:avLst/>
+          </a:prstGeom>
+          <a:solidFill>
+            <a:srgbClr val="FDBB30"/>
+          </a:solidFill>
+          <a:ln>
+            <a:solidFill>
+              <a:schemeClr val="tx1"/>
+            </a:solidFill>
+          </a:ln>
+        </p:spPr>
+        <p:style>
+          <a:lnRef idx="2">
+            <a:schemeClr val="accent1">
+              <a:shade val="50000"/>
+            </a:schemeClr>
+          </a:lnRef>
+          <a:fillRef idx="1">
+            <a:schemeClr val="accent1"/>
+          </a:fillRef>
+          <a:effectRef idx="0">
+            <a:schemeClr val="accent1"/>
+          </a:effectRef>
+          <a:fontRef idx="minor">
+            <a:schemeClr val="lt1"/>
+          </a:fontRef>
+        </p:style>
+        <p:txBody>
+          <a:bodyPr rtlCol="0" anchor="ctr"/>
+          <a:lstStyle/>
+          <a:p>
+            <a:pPr algn="ctr"/>
+            <a:endParaRPr lang="en-US"/>
+          </a:p>
+        </p:txBody>
+      </p:sp>
+      <p:sp>
+        <p:nvSpPr>
+          <p:cNvPr id="6" name="Rectangle 5"/>
+          <p:cNvSpPr/>
+          <p:nvPr/>
+        </p:nvSpPr>
+        <p:spPr>
+          <a:xfrm>
+            <a:off x="0" y="6218853"/>
+            <a:ext cx="12192000" cy="303245"/>
+          </a:xfrm>
+          <a:prstGeom prst="rect">
+            <a:avLst/>
+          </a:prstGeom>
+          <a:solidFill>
+            <a:srgbClr val="00543C"/>
+          </a:solidFill>
+          <a:ln>
+            <a:solidFill>
+              <a:schemeClr val="tx1"/>
+            </a:solidFill>
+          </a:ln>
+        </p:spPr>
+        <p:style>
+          <a:lnRef idx="2">
+            <a:schemeClr val="accent1">
+              <a:shade val="50000"/>
+            </a:schemeClr>
+          </a:lnRef>
+          <a:fillRef idx="1">
+            <a:schemeClr val="accent1"/>
+          </a:fillRef>
+          <a:effectRef idx="0">
+            <a:schemeClr val="accent1"/>
+          </a:effectRef>
+          <a:fontRef idx="minor">
+            <a:schemeClr val="lt1"/>
+          </a:fontRef>
+        </p:style>
+        <p:txBody>
+          <a:bodyPr rtlCol="0" anchor="ctr"/>
+          <a:lstStyle/>
+          <a:p>
+            <a:pPr algn="ctr"/>
+            <a:endParaRPr lang="en-US"/>
+          </a:p>
+        </p:txBody>
+      </p:sp>
+      <p:pic>
+        <p:nvPicPr>
+          <p:cNvPr id="7" name="Picture 6"/>
+          <p:cNvPicPr>
+            <a:picLocks noChangeAspect="1"/>
+          </p:cNvPicPr>
+          <p:nvPr/>
+        </p:nvPicPr>
+        <p:blipFill>
+          <a:blip r:embed="rId2">
+            <a:extLst>
+              <a:ext uri="{28A0092B-C50C-407E-A947-70E740481C1C}">
+                <a14:useLocalDpi xmlns:a14="http://schemas.microsoft.com/office/drawing/2010/main" val="0"/>
+              </a:ext>
+            </a:extLst>
+          </a:blip>
+          <a:stretch>
+            <a:fillRect/>
+          </a:stretch>
+        </p:blipFill>
+        <p:spPr>
+          <a:xfrm>
+            <a:off x="365760" y="125044"/>
+            <a:ext cx="11404799" cy="6035040"/>
+          </a:xfrm>
+          <a:prstGeom prst="rect">
+            <a:avLst/>
+          </a:prstGeom>
+          <a:ln>
+            <a:solidFill>
+              <a:schemeClr val="tx1"/>
+            </a:solidFill>
+          </a:ln>
+        </p:spPr>
+      </p:pic>
+      <p:sp>
+        <p:nvSpPr>
+          <p:cNvPr id="3" name="TextBox 2"/>
+          <p:cNvSpPr txBox="1"/>
+          <p:nvPr/>
+        </p:nvSpPr>
+        <p:spPr>
+          <a:xfrm>
+            <a:off x="1119672" y="3919388"/>
+            <a:ext cx="7725748" cy="1384995"/>
+          </a:xfrm>
+          <a:prstGeom prst="rect">
+            <a:avLst/>
+          </a:prstGeom>
+          <a:solidFill>
+            <a:schemeClr val="bg1"/>
+          </a:solidFill>
+        </p:spPr>
+        <p:txBody>
+          <a:bodyPr wrap="square" rtlCol="0">
+            <a:spAutoFit/>
+          </a:bodyPr>
+          <a:lstStyle/>
+          <a:p>
+            <a:r>
+              <a:rPr lang="en-US" dirty="0">
+                <a:solidFill>
+                  <a:schemeClr val="bg1">
+                    <a:lumMod val="50000"/>
+                  </a:schemeClr>
+                </a:solidFill>
+              </a:rPr>
+              <a:t>Projected </a:t>
+            </a:r>
+            <a:r>
+              <a:rPr lang="en-US" dirty="0" smtClean="0">
+                <a:solidFill>
+                  <a:schemeClr val="bg1">
+                    <a:lumMod val="50000"/>
+                  </a:schemeClr>
+                </a:solidFill>
+              </a:rPr>
+              <a:t>total enrollments 2019-20 onward from CA </a:t>
+            </a:r>
+            <a:r>
+              <a:rPr lang="en-US" dirty="0" err="1" smtClean="0">
+                <a:solidFill>
+                  <a:schemeClr val="bg1">
+                    <a:lumMod val="50000"/>
+                  </a:schemeClr>
+                </a:solidFill>
+              </a:rPr>
+              <a:t>Dept</a:t>
+            </a:r>
+            <a:r>
+              <a:rPr lang="en-US" dirty="0" smtClean="0">
+                <a:solidFill>
+                  <a:schemeClr val="bg1">
+                    <a:lumMod val="50000"/>
+                  </a:schemeClr>
+                </a:solidFill>
+              </a:rPr>
+              <a:t> of Finance </a:t>
+            </a:r>
+          </a:p>
+          <a:p>
+            <a:endParaRPr lang="en-US" sz="600" dirty="0" smtClean="0">
+              <a:solidFill>
+                <a:schemeClr val="bg1">
+                  <a:lumMod val="50000"/>
+                </a:schemeClr>
+              </a:solidFill>
+            </a:endParaRPr>
+          </a:p>
+          <a:p>
+            <a:r>
+              <a:rPr lang="en-US" dirty="0" smtClean="0">
+                <a:solidFill>
+                  <a:schemeClr val="bg1">
+                    <a:lumMod val="50000"/>
+                  </a:schemeClr>
+                </a:solidFill>
+              </a:rPr>
+              <a:t>Projections based on migration/immigration &amp; school-continuation rate models</a:t>
+            </a:r>
+          </a:p>
+          <a:p>
+            <a:endParaRPr lang="en-US" sz="600" dirty="0" smtClean="0">
+              <a:solidFill>
+                <a:schemeClr val="bg1">
+                  <a:lumMod val="50000"/>
+                </a:schemeClr>
+              </a:solidFill>
+            </a:endParaRPr>
+          </a:p>
+          <a:p>
+            <a:r>
+              <a:rPr lang="en-US" dirty="0" smtClean="0">
+                <a:solidFill>
+                  <a:schemeClr val="bg1">
+                    <a:lumMod val="50000"/>
+                  </a:schemeClr>
+                </a:solidFill>
+              </a:rPr>
+              <a:t>UC/CSU eligibility projections by author using modest assumptions from most recent three year period</a:t>
+            </a:r>
+          </a:p>
+        </p:txBody>
+      </p:sp>
+      <p:sp>
+        <p:nvSpPr>
+          <p:cNvPr id="8" name="TextBox 7"/>
+          <p:cNvSpPr txBox="1"/>
+          <p:nvPr/>
+        </p:nvSpPr>
+        <p:spPr>
+          <a:xfrm>
+            <a:off x="3163078" y="242596"/>
+            <a:ext cx="4749281" cy="769441"/>
+          </a:xfrm>
+          <a:prstGeom prst="rect">
+            <a:avLst/>
+          </a:prstGeom>
+          <a:noFill/>
+        </p:spPr>
+        <p:txBody>
+          <a:bodyPr wrap="square" rtlCol="0">
+            <a:spAutoFit/>
+          </a:bodyPr>
+          <a:lstStyle/>
+          <a:p>
+            <a:pPr algn="ctr"/>
+            <a:r>
+              <a:rPr lang="en-US" sz="2200" dirty="0" smtClean="0"/>
+              <a:t>California Public High School Graduates</a:t>
+            </a:r>
+          </a:p>
+          <a:p>
+            <a:pPr algn="ctr"/>
+            <a:r>
+              <a:rPr lang="en-US" sz="2200" dirty="0" smtClean="0"/>
+              <a:t>1993 to 2029 (projected)</a:t>
+            </a:r>
+            <a:endParaRPr lang="en-US" sz="2200" dirty="0"/>
+          </a:p>
+        </p:txBody>
+      </p:sp>
+    </p:spTree>
+    <p:extLst>
+      <p:ext uri="{BB962C8B-B14F-4D97-AF65-F5344CB8AC3E}">
+        <p14:creationId xmlns:p14="http://schemas.microsoft.com/office/powerpoint/2010/main" val="1009277333"/>
+      </p:ext>
+    </p:extLst>
+  </p:cSld>
+  <p:clrMapOvr>
+    <a:masterClrMapping/>
+  </p:clrMapOvr>
+  <p:timing>
+    <p:tnLst>
+      <p:par>
+        <p:cTn id="1" dur="indefinite" restart="never" nodeType="tmRoot"/>
+      </p:par>
+    </p:tnLst>
+  </p:timing>
+</p:sld>
+</file>
+
+<file path=ppt/slides/slide6.xml><?xml version="1.0" encoding="utf-8"?>
+<p:sld xmlns:a="http://schemas.openxmlformats.org/drawingml/2006/main" xmlns:r="http://schemas.openxmlformats.org/officeDocument/2006/relationships" xmlns:p="http://schemas.openxmlformats.org/presentationml/2006/main">
+  <p:cSld>
+    <p:spTree>
+      <p:nvGrpSpPr>
+        <p:cNvPr id="1" name=""/>
+        <p:cNvGrpSpPr/>
+        <p:nvPr/>
+      </p:nvGrpSpPr>
+      <p:grpSpPr>
+        <a:xfrm>
+          <a:off x="0" y="0"/>
+          <a:ext cx="0" cy="0"/>
+          <a:chOff x="0" y="0"/>
+          <a:chExt cx="0" cy="0"/>
+        </a:xfrm>
+      </p:grpSpPr>
+      <p:sp>
+        <p:nvSpPr>
+          <p:cNvPr id="2" name="Title 1"/>
+          <p:cNvSpPr>
+            <a:spLocks noGrp="1"/>
+          </p:cNvSpPr>
+          <p:nvPr>
+            <p:ph type="ctrTitle"/>
+          </p:nvPr>
+        </p:nvSpPr>
+        <p:spPr/>
+        <p:txBody>
+          <a:bodyPr/>
+          <a:lstStyle/>
+          <a:p>
+            <a:r>
+              <a:rPr lang="en-US" dirty="0" smtClean="0"/>
+              <a:t>	</a:t>
+            </a:r>
+            <a:endParaRPr lang="en-US" dirty="0"/>
+          </a:p>
+        </p:txBody>
+      </p:sp>
+      <p:sp>
+        <p:nvSpPr>
+          <p:cNvPr id="4" name="Rectangle 3"/>
+          <p:cNvSpPr/>
+          <p:nvPr/>
+        </p:nvSpPr>
+        <p:spPr>
+          <a:xfrm>
+            <a:off x="0" y="6428792"/>
+            <a:ext cx="12192000" cy="419878"/>
+          </a:xfrm>
+          <a:prstGeom prst="rect">
+            <a:avLst/>
+          </a:prstGeom>
+          <a:solidFill>
+            <a:srgbClr val="FDBB30"/>
+          </a:solidFill>
+          <a:ln>
+            <a:solidFill>
+              <a:schemeClr val="tx1"/>
+            </a:solidFill>
+          </a:ln>
+        </p:spPr>
+        <p:style>
+          <a:lnRef idx="2">
+            <a:schemeClr val="accent1">
+              <a:shade val="50000"/>
+            </a:schemeClr>
+          </a:lnRef>
+          <a:fillRef idx="1">
+            <a:schemeClr val="accent1"/>
+          </a:fillRef>
+          <a:effectRef idx="0">
+            <a:schemeClr val="accent1"/>
+          </a:effectRef>
+          <a:fontRef idx="minor">
+            <a:schemeClr val="lt1"/>
+          </a:fontRef>
+        </p:style>
+        <p:txBody>
+          <a:bodyPr rtlCol="0" anchor="ctr"/>
+          <a:lstStyle/>
+          <a:p>
+            <a:pPr algn="ctr"/>
+            <a:endParaRPr lang="en-US"/>
+          </a:p>
+        </p:txBody>
+      </p:sp>
+      <p:sp>
+        <p:nvSpPr>
+          <p:cNvPr id="6" name="Rectangle 5"/>
+          <p:cNvSpPr/>
+          <p:nvPr/>
+        </p:nvSpPr>
+        <p:spPr>
+          <a:xfrm>
+            <a:off x="0" y="6218853"/>
+            <a:ext cx="12192000" cy="303245"/>
+          </a:xfrm>
+          <a:prstGeom prst="rect">
+            <a:avLst/>
+          </a:prstGeom>
+          <a:solidFill>
+            <a:srgbClr val="00543C"/>
+          </a:solidFill>
+          <a:ln>
+            <a:solidFill>
+              <a:schemeClr val="tx1"/>
+            </a:solidFill>
+          </a:ln>
+        </p:spPr>
+        <p:style>
+          <a:lnRef idx="2">
+            <a:schemeClr val="accent1">
+              <a:shade val="50000"/>
+            </a:schemeClr>
+          </a:lnRef>
+          <a:fillRef idx="1">
+            <a:schemeClr val="accent1"/>
+          </a:fillRef>
+          <a:effectRef idx="0">
+            <a:schemeClr val="accent1"/>
+          </a:effectRef>
+          <a:fontRef idx="minor">
+            <a:schemeClr val="lt1"/>
+          </a:fontRef>
+        </p:style>
+        <p:txBody>
+          <a:bodyPr rtlCol="0" anchor="ctr"/>
+          <a:lstStyle/>
+          <a:p>
+            <a:pPr algn="ctr"/>
+            <a:endParaRPr lang="en-US"/>
+          </a:p>
+        </p:txBody>
+      </p:sp>
+      <p:pic>
+        <p:nvPicPr>
+          <p:cNvPr id="7" name="Picture 6"/>
+          <p:cNvPicPr>
+            <a:picLocks noChangeAspect="1"/>
+          </p:cNvPicPr>
+          <p:nvPr/>
+        </p:nvPicPr>
+        <p:blipFill>
+          <a:blip r:embed="rId2">
+            <a:extLst>
+              <a:ext uri="{28A0092B-C50C-407E-A947-70E740481C1C}">
+                <a14:useLocalDpi xmlns:a14="http://schemas.microsoft.com/office/drawing/2010/main" val="0"/>
+              </a:ext>
+            </a:extLst>
+          </a:blip>
+          <a:stretch>
+            <a:fillRect/>
+          </a:stretch>
+        </p:blipFill>
+        <p:spPr>
+          <a:xfrm>
+            <a:off x="365760" y="125044"/>
+            <a:ext cx="11404799" cy="6035040"/>
+          </a:xfrm>
+          <a:prstGeom prst="rect">
+            <a:avLst/>
+          </a:prstGeom>
+          <a:ln>
+            <a:solidFill>
+              <a:schemeClr val="tx1"/>
+            </a:solidFill>
+          </a:ln>
+        </p:spPr>
+      </p:pic>
+      <p:sp>
+        <p:nvSpPr>
+          <p:cNvPr id="3" name="TextBox 2"/>
+          <p:cNvSpPr txBox="1"/>
+          <p:nvPr/>
+        </p:nvSpPr>
+        <p:spPr>
+          <a:xfrm>
+            <a:off x="1026366" y="4572000"/>
+            <a:ext cx="4469365" cy="369332"/>
+          </a:xfrm>
+          <a:prstGeom prst="rect">
+            <a:avLst/>
+          </a:prstGeom>
+          <a:solidFill>
+            <a:schemeClr val="bg1"/>
+          </a:solidFill>
+        </p:spPr>
+        <p:txBody>
+          <a:bodyPr wrap="square" rtlCol="0">
+            <a:spAutoFit/>
+          </a:bodyPr>
+          <a:lstStyle/>
+          <a:p>
+            <a:r>
+              <a:rPr lang="en-US" dirty="0" smtClean="0">
+                <a:solidFill>
+                  <a:schemeClr val="bg1">
+                    <a:lumMod val="50000"/>
+                  </a:schemeClr>
+                </a:solidFill>
+              </a:rPr>
+              <a:t>UC/CSU eligibility 33% in 1993, 50% in 2018</a:t>
+            </a:r>
+          </a:p>
+        </p:txBody>
+      </p:sp>
+      <p:sp>
+        <p:nvSpPr>
+          <p:cNvPr id="8" name="TextBox 7"/>
+          <p:cNvSpPr txBox="1"/>
+          <p:nvPr/>
+        </p:nvSpPr>
+        <p:spPr>
+          <a:xfrm>
+            <a:off x="1026366" y="4114800"/>
+            <a:ext cx="4469365" cy="369332"/>
+          </a:xfrm>
+          <a:prstGeom prst="rect">
+            <a:avLst/>
+          </a:prstGeom>
+          <a:solidFill>
+            <a:schemeClr val="bg1"/>
+          </a:solidFill>
+        </p:spPr>
+        <p:txBody>
+          <a:bodyPr wrap="square" rtlCol="0">
+            <a:spAutoFit/>
+          </a:bodyPr>
+          <a:lstStyle/>
+          <a:p>
+            <a:r>
+              <a:rPr lang="en-US" dirty="0" smtClean="0">
+                <a:solidFill>
+                  <a:schemeClr val="bg1">
+                    <a:lumMod val="50000"/>
+                  </a:schemeClr>
+                </a:solidFill>
+              </a:rPr>
+              <a:t>67% increase in grads from 1993 to 2018</a:t>
+            </a:r>
+          </a:p>
+        </p:txBody>
+      </p:sp>
+      <p:sp>
+        <p:nvSpPr>
+          <p:cNvPr id="9" name="TextBox 8"/>
+          <p:cNvSpPr txBox="1"/>
+          <p:nvPr/>
+        </p:nvSpPr>
+        <p:spPr>
+          <a:xfrm>
+            <a:off x="1026364" y="5029200"/>
+            <a:ext cx="5187823" cy="369332"/>
+          </a:xfrm>
+          <a:prstGeom prst="rect">
+            <a:avLst/>
+          </a:prstGeom>
+          <a:solidFill>
+            <a:schemeClr val="bg1"/>
+          </a:solidFill>
+        </p:spPr>
+        <p:txBody>
+          <a:bodyPr wrap="square" rtlCol="0">
+            <a:spAutoFit/>
+          </a:bodyPr>
+          <a:lstStyle/>
+          <a:p>
+            <a:r>
+              <a:rPr lang="en-US" dirty="0" smtClean="0">
+                <a:solidFill>
+                  <a:schemeClr val="bg1">
+                    <a:lumMod val="50000"/>
+                  </a:schemeClr>
+                </a:solidFill>
+              </a:rPr>
+              <a:t>Grads expected to peak in 2023, then decline slightly</a:t>
+            </a:r>
+          </a:p>
+        </p:txBody>
+      </p:sp>
+      <p:sp>
+        <p:nvSpPr>
+          <p:cNvPr id="5" name="TextBox 4"/>
+          <p:cNvSpPr txBox="1"/>
+          <p:nvPr/>
+        </p:nvSpPr>
+        <p:spPr>
+          <a:xfrm>
+            <a:off x="8901403" y="4659868"/>
+            <a:ext cx="2556588" cy="738664"/>
+          </a:xfrm>
+          <a:prstGeom prst="rect">
+            <a:avLst/>
+          </a:prstGeom>
+          <a:solidFill>
+            <a:schemeClr val="bg1"/>
+          </a:solidFill>
+        </p:spPr>
+        <p:txBody>
+          <a:bodyPr wrap="square" rtlCol="0">
+            <a:spAutoFit/>
+          </a:bodyPr>
+          <a:lstStyle/>
+          <a:p>
+            <a:r>
+              <a:rPr lang="en-US" sz="1400" i="1" dirty="0" smtClean="0">
+                <a:solidFill>
+                  <a:schemeClr val="bg1">
+                    <a:lumMod val="50000"/>
+                  </a:schemeClr>
+                </a:solidFill>
+              </a:rPr>
+              <a:t>Data sources: </a:t>
+            </a:r>
+          </a:p>
+          <a:p>
+            <a:r>
+              <a:rPr lang="en-US" sz="1400" i="1" dirty="0" smtClean="0">
+                <a:solidFill>
+                  <a:schemeClr val="bg1">
+                    <a:lumMod val="50000"/>
+                  </a:schemeClr>
+                </a:solidFill>
+              </a:rPr>
+              <a:t>Actual: CA </a:t>
+            </a:r>
+            <a:r>
+              <a:rPr lang="en-US" sz="1400" i="1" dirty="0" err="1" smtClean="0">
+                <a:solidFill>
+                  <a:schemeClr val="bg1">
+                    <a:lumMod val="50000"/>
+                  </a:schemeClr>
+                </a:solidFill>
+              </a:rPr>
+              <a:t>Dept</a:t>
+            </a:r>
+            <a:r>
+              <a:rPr lang="en-US" sz="1400" i="1" dirty="0">
+                <a:solidFill>
+                  <a:schemeClr val="bg1">
+                    <a:lumMod val="50000"/>
+                  </a:schemeClr>
+                </a:solidFill>
+              </a:rPr>
+              <a:t> </a:t>
+            </a:r>
+            <a:r>
+              <a:rPr lang="en-US" sz="1400" i="1" dirty="0" smtClean="0">
+                <a:solidFill>
+                  <a:schemeClr val="bg1">
+                    <a:lumMod val="50000"/>
+                  </a:schemeClr>
+                </a:solidFill>
+              </a:rPr>
+              <a:t>of Education. </a:t>
+            </a:r>
+          </a:p>
+          <a:p>
+            <a:r>
+              <a:rPr lang="en-US" sz="1400" i="1" dirty="0" smtClean="0">
+                <a:solidFill>
+                  <a:schemeClr val="bg1">
+                    <a:lumMod val="50000"/>
+                  </a:schemeClr>
+                </a:solidFill>
+              </a:rPr>
+              <a:t>Projections: CA </a:t>
+            </a:r>
+            <a:r>
+              <a:rPr lang="en-US" sz="1400" i="1" dirty="0" err="1" smtClean="0">
+                <a:solidFill>
+                  <a:schemeClr val="bg1">
+                    <a:lumMod val="50000"/>
+                  </a:schemeClr>
+                </a:solidFill>
+              </a:rPr>
+              <a:t>Dept</a:t>
+            </a:r>
+            <a:r>
+              <a:rPr lang="en-US" sz="1400" i="1" dirty="0" smtClean="0">
+                <a:solidFill>
+                  <a:schemeClr val="bg1">
+                    <a:lumMod val="50000"/>
+                  </a:schemeClr>
+                </a:solidFill>
+              </a:rPr>
+              <a:t> of Finance</a:t>
+            </a:r>
+            <a:endParaRPr lang="en-US" sz="1400" i="1" dirty="0">
+              <a:solidFill>
+                <a:schemeClr val="bg1">
+                  <a:lumMod val="50000"/>
+                </a:schemeClr>
+              </a:solidFill>
+            </a:endParaRPr>
+          </a:p>
+        </p:txBody>
+      </p:sp>
+      <p:sp>
+        <p:nvSpPr>
+          <p:cNvPr id="10" name="TextBox 9"/>
+          <p:cNvSpPr txBox="1"/>
+          <p:nvPr/>
+        </p:nvSpPr>
+        <p:spPr>
+          <a:xfrm>
+            <a:off x="3163078" y="242596"/>
+            <a:ext cx="4749281" cy="769441"/>
+          </a:xfrm>
+          <a:prstGeom prst="rect">
+            <a:avLst/>
+          </a:prstGeom>
+          <a:noFill/>
+        </p:spPr>
+        <p:txBody>
+          <a:bodyPr wrap="square" rtlCol="0">
+            <a:spAutoFit/>
+          </a:bodyPr>
+          <a:lstStyle/>
+          <a:p>
+            <a:pPr algn="ctr"/>
+            <a:r>
+              <a:rPr lang="en-US" sz="2200" dirty="0" smtClean="0"/>
+              <a:t>California Public High School Graduates</a:t>
+            </a:r>
+          </a:p>
+          <a:p>
+            <a:pPr algn="ctr"/>
+            <a:r>
+              <a:rPr lang="en-US" sz="2200" dirty="0" smtClean="0"/>
+              <a:t>1993 to 2029 (projected)</a:t>
+            </a:r>
+            <a:endParaRPr lang="en-US" sz="2200" dirty="0"/>
+          </a:p>
+        </p:txBody>
+      </p:sp>
+    </p:spTree>
+    <p:extLst>
+      <p:ext uri="{BB962C8B-B14F-4D97-AF65-F5344CB8AC3E}">
+        <p14:creationId xmlns:p14="http://schemas.microsoft.com/office/powerpoint/2010/main" val="2785302501"/>
+      </p:ext>
+    </p:extLst>
+  </p:cSld>
+  <p:clrMapOvr>
+    <a:masterClrMapping/>
+  </p:clrMapOvr>
+  <p:timing>
+    <p:tnLst>
+      <p:par>
+        <p:cTn id="1" dur="indefinite" restart="never" nodeType="tmRoot">
+          <p:childTnLst>
+            <p:seq concurrent="1" nextAc="seek">
+              <p:cTn id="2" dur="indefinite" nodeType="mainSeq">
+                <p:childTnLst>
+                  <p:par>
+                    <p:cTn id="3" fill="hold">
+                      <p:stCondLst>
+                        <p:cond delay="indefinite"/>
+                      </p:stCondLst>
+                      <p:childTnLst>
+                        <p:par>
+                          <p:cTn id="4" fill="hold">
+                            <p:stCondLst>
+                              <p:cond delay="0"/>
+                            </p:stCondLst>
+                            <p:childTnLst>
+                              <p:par>
+                                <p:cTn id="5" presetID="1" presetClass="entr" presetSubtype="0" fill="hold" grpId="0" nodeType="clickEffect">
+                                  <p:stCondLst>
+                                    <p:cond delay="0"/>
+                                  </p:stCondLst>
+                                  <p:childTnLst>
+                                    <p:set>
+                                      <p:cBhvr>
+                                        <p:cTn id="6" dur="1" fill="hold">
+                                          <p:stCondLst>
+                                            <p:cond delay="0"/>
+                                          </p:stCondLst>
+                                        </p:cTn>
+                                        <p:tgtEl>
+                                          <p:spTgt spid="3"/>
+                                        </p:tgtEl>
+                                        <p:attrNameLst>
+                                          <p:attrName>style.visibility</p:attrName>
+                                        </p:attrNameLst>
+                                      </p:cBhvr>
+                                      <p:to>
+                                        <p:strVal val="visible"/>
+                                      </p:to>
+                                    </p:set>
+                                  </p:childTnLst>
+                                </p:cTn>
+                              </p:par>
+                            </p:childTnLst>
+                          </p:cTn>
+                        </p:par>
+                      </p:childTnLst>
+                    </p:cTn>
+                  </p:par>
+                  <p:par>
+                    <p:cTn id="7" fill="hold">
+                      <p:stCondLst>
+                        <p:cond delay="indefinite"/>
+                      </p:stCondLst>
+                      <p:childTnLst>
+                        <p:par>
+                          <p:cTn id="8" fill="hold">
+                            <p:stCondLst>
+                              <p:cond delay="0"/>
+                            </p:stCondLst>
+                            <p:childTnLst>
+                              <p:par>
+                                <p:cTn id="9" presetID="1" presetClass="entr" presetSubtype="0" fill="hold" grpId="0" nodeType="clickEffect">
+                                  <p:stCondLst>
+                                    <p:cond delay="0"/>
+                                  </p:stCondLst>
+                                  <p:childTnLst>
+                                    <p:set>
+                                      <p:cBhvr>
+                                        <p:cTn id="10" dur="1" fill="hold">
+                                          <p:stCondLst>
+                                            <p:cond delay="0"/>
+                                          </p:stCondLst>
+                                        </p:cTn>
+                                        <p:tgtEl>
+                                          <p:spTgt spid="9"/>
+                                        </p:tgtEl>
+                                        <p:attrNameLst>
+                                          <p:attrName>style.visibility</p:attrName>
+                                        </p:attrNameLst>
+                                      </p:cBhvr>
+                                      <p:to>
+                                        <p:strVal val="visible"/>
+                                      </p:to>
+                                    </p:set>
+                                  </p:childTnLst>
+                                </p:cTn>
+                              </p:par>
+                            </p:childTnLst>
+                          </p:cTn>
+                        </p:par>
+                      </p:childTnLst>
+                    </p:cTn>
+                  </p:par>
+                </p:childTnLst>
+              </p:cTn>
+              <p:prevCondLst>
+                <p:cond evt="onPrev" delay="0">
+                  <p:tgtEl>
+                    <p:sldTgt/>
+                  </p:tgtEl>
+                </p:cond>
+              </p:prevCondLst>
+              <p:nextCondLst>
+                <p:cond evt="onNext" delay="0">
+                  <p:tgtEl>
+                    <p:sldTgt/>
+                  </p:tgtEl>
+                </p:cond>
+              </p:nextCondLst>
+            </p:seq>
+          </p:childTnLst>
+        </p:cTn>
+      </p:par>
+    </p:tnLst>
+    <p:bldLst>
+      <p:bldP spid="3" grpId="0" animBg="1"/>
+      <p:bldP spid="9" grpId="0" animBg="1"/>
+    </p:bldLst>
+  </p:timing>
+</p:sld>
+</file>
+
+<file path=ppt/slides/slide7.xml><?xml version="1.0" encoding="utf-8"?>
+<p:sld xmlns:a="http://schemas.openxmlformats.org/drawingml/2006/main" xmlns:r="http://schemas.openxmlformats.org/officeDocument/2006/relationships" xmlns:p="http://schemas.openxmlformats.org/presentationml/2006/main">
+  <p:cSld>
+    <p:spTree>
+      <p:nvGrpSpPr>
+        <p:cNvPr id="1" name=""/>
+        <p:cNvGrpSpPr/>
+        <p:nvPr/>
+      </p:nvGrpSpPr>
+      <p:grpSpPr>
+        <a:xfrm>
+          <a:off x="0" y="0"/>
+          <a:ext cx="0" cy="0"/>
+          <a:chOff x="0" y="0"/>
+          <a:chExt cx="0" cy="0"/>
+        </a:xfrm>
+      </p:grpSpPr>
+      <p:sp>
+        <p:nvSpPr>
+          <p:cNvPr id="2" name="Title 1"/>
+          <p:cNvSpPr>
+            <a:spLocks noGrp="1"/>
+          </p:cNvSpPr>
+          <p:nvPr>
+            <p:ph type="ctrTitle"/>
+          </p:nvPr>
+        </p:nvSpPr>
+        <p:spPr/>
+        <p:txBody>
+          <a:bodyPr/>
+          <a:lstStyle/>
+          <a:p>
+            <a:r>
+              <a:rPr lang="en-US" dirty="0" smtClean="0"/>
+              <a:t>	</a:t>
+            </a:r>
+            <a:endParaRPr lang="en-US" dirty="0"/>
+          </a:p>
+        </p:txBody>
+      </p:sp>
+      <p:sp>
+        <p:nvSpPr>
+          <p:cNvPr id="4" name="Rectangle 3"/>
+          <p:cNvSpPr/>
+          <p:nvPr/>
+        </p:nvSpPr>
+        <p:spPr>
+          <a:xfrm>
+            <a:off x="0" y="6428792"/>
+            <a:ext cx="12192000" cy="419878"/>
+          </a:xfrm>
+          <a:prstGeom prst="rect">
+            <a:avLst/>
+          </a:prstGeom>
+          <a:solidFill>
+            <a:srgbClr val="FDBB30"/>
+          </a:solidFill>
+          <a:ln>
+            <a:solidFill>
+              <a:schemeClr val="tx1"/>
+            </a:solidFill>
+          </a:ln>
+        </p:spPr>
+        <p:style>
+          <a:lnRef idx="2">
+            <a:schemeClr val="accent1">
+              <a:shade val="50000"/>
+            </a:schemeClr>
+          </a:lnRef>
+          <a:fillRef idx="1">
+            <a:schemeClr val="accent1"/>
+          </a:fillRef>
+          <a:effectRef idx="0">
+            <a:schemeClr val="accent1"/>
+          </a:effectRef>
+          <a:fontRef idx="minor">
+            <a:schemeClr val="lt1"/>
+          </a:fontRef>
+        </p:style>
+        <p:txBody>
+          <a:bodyPr rtlCol="0" anchor="ctr"/>
+          <a:lstStyle/>
+          <a:p>
+            <a:pPr algn="ctr"/>
+            <a:endParaRPr lang="en-US"/>
+          </a:p>
+        </p:txBody>
+      </p:sp>
+      <p:sp>
+        <p:nvSpPr>
+          <p:cNvPr id="6" name="Rectangle 5"/>
+          <p:cNvSpPr/>
+          <p:nvPr/>
+        </p:nvSpPr>
+        <p:spPr>
+          <a:xfrm>
+            <a:off x="0" y="6218853"/>
+            <a:ext cx="12192000" cy="303245"/>
+          </a:xfrm>
+          <a:prstGeom prst="rect">
+            <a:avLst/>
+          </a:prstGeom>
+          <a:solidFill>
+            <a:srgbClr val="00543C"/>
+          </a:solidFill>
+          <a:ln>
+            <a:solidFill>
+              <a:schemeClr val="tx1"/>
+            </a:solidFill>
+          </a:ln>
+        </p:spPr>
+        <p:style>
+          <a:lnRef idx="2">
+            <a:schemeClr val="accent1">
+              <a:shade val="50000"/>
+            </a:schemeClr>
+          </a:lnRef>
+          <a:fillRef idx="1">
+            <a:schemeClr val="accent1"/>
+          </a:fillRef>
+          <a:effectRef idx="0">
+            <a:schemeClr val="accent1"/>
+          </a:effectRef>
+          <a:fontRef idx="minor">
+            <a:schemeClr val="lt1"/>
+          </a:fontRef>
+        </p:style>
+        <p:txBody>
+          <a:bodyPr rtlCol="0" anchor="ctr"/>
+          <a:lstStyle/>
+          <a:p>
+            <a:pPr algn="ctr"/>
+            <a:endParaRPr lang="en-US"/>
+          </a:p>
+        </p:txBody>
+      </p:sp>
+    </p:spTree>
+    <p:extLst>
+      <p:ext uri="{BB962C8B-B14F-4D97-AF65-F5344CB8AC3E}">
+        <p14:creationId xmlns:p14="http://schemas.microsoft.com/office/powerpoint/2010/main" val="3282397969"/>
+      </p:ext>
+    </p:extLst>
+  </p:cSld>
+  <p:clrMapOvr>
+    <a:masterClrMapping/>
+  </p:clrMapOvr>
+  <p:timing>
+    <p:tnLst>
+      <p:par>
+        <p:cTn id="1" dur="indefinite" restart="never" nodeType="tmRoot"/>
+      </p:par>
+    </p:tnLst>
+  </p:timing>
+</p:sld>
+</file>
+
+<file path=ppt/slides/slide8.xml><?xml version="1.0" encoding="utf-8"?>
+<p:sld xmlns:a="http://schemas.openxmlformats.org/drawingml/2006/main" xmlns:r="http://schemas.openxmlformats.org/officeDocument/2006/relationships" xmlns:p="http://schemas.openxmlformats.org/presentationml/2006/main">
+  <p:cSld>
+    <p:spTree>
+      <p:nvGrpSpPr>
+        <p:cNvPr id="1" name=""/>
+        <p:cNvGrpSpPr/>
+        <p:nvPr/>
+      </p:nvGrpSpPr>
+      <p:grpSpPr>
+        <a:xfrm>
+          <a:off x="0" y="0"/>
+          <a:ext cx="0" cy="0"/>
+          <a:chOff x="0" y="0"/>
+          <a:chExt cx="0" cy="0"/>
+        </a:xfrm>
+      </p:grpSpPr>
+      <p:sp>
+        <p:nvSpPr>
+          <p:cNvPr id="2" name="Title 1"/>
+          <p:cNvSpPr>
+            <a:spLocks noGrp="1"/>
+          </p:cNvSpPr>
+          <p:nvPr>
+            <p:ph type="ctrTitle"/>
+          </p:nvPr>
+        </p:nvSpPr>
+        <p:spPr/>
+        <p:txBody>
+          <a:bodyPr/>
+          <a:lstStyle/>
+          <a:p>
+            <a:r>
+              <a:rPr lang="en-US" dirty="0" smtClean="0"/>
+              <a:t>	</a:t>
+            </a:r>
+            <a:endParaRPr lang="en-US" dirty="0"/>
+          </a:p>
+        </p:txBody>
+      </p:sp>
+      <p:sp>
+        <p:nvSpPr>
+          <p:cNvPr id="4" name="Rectangle 3"/>
+          <p:cNvSpPr/>
+          <p:nvPr/>
+        </p:nvSpPr>
+        <p:spPr>
+          <a:xfrm>
+            <a:off x="0" y="6428792"/>
+            <a:ext cx="12192000" cy="419878"/>
+          </a:xfrm>
+          <a:prstGeom prst="rect">
+            <a:avLst/>
+          </a:prstGeom>
+          <a:solidFill>
+            <a:srgbClr val="FDBB30"/>
+          </a:solidFill>
+          <a:ln>
+            <a:solidFill>
+              <a:schemeClr val="tx1"/>
+            </a:solidFill>
+          </a:ln>
+        </p:spPr>
+        <p:style>
+          <a:lnRef idx="2">
+            <a:schemeClr val="accent1">
+              <a:shade val="50000"/>
+            </a:schemeClr>
+          </a:lnRef>
+          <a:fillRef idx="1">
+            <a:schemeClr val="accent1"/>
+          </a:fillRef>
+          <a:effectRef idx="0">
+            <a:schemeClr val="accent1"/>
+          </a:effectRef>
+          <a:fontRef idx="minor">
+            <a:schemeClr val="lt1"/>
+          </a:fontRef>
+        </p:style>
+        <p:txBody>
+          <a:bodyPr rtlCol="0" anchor="ctr"/>
+          <a:lstStyle/>
+          <a:p>
+            <a:pPr algn="ctr"/>
+            <a:endParaRPr lang="en-US"/>
+          </a:p>
+        </p:txBody>
+      </p:sp>
+      <p:sp>
+        <p:nvSpPr>
+          <p:cNvPr id="6" name="Rectangle 5"/>
+          <p:cNvSpPr/>
+          <p:nvPr/>
+        </p:nvSpPr>
+        <p:spPr>
+          <a:xfrm>
+            <a:off x="0" y="6218853"/>
+            <a:ext cx="12192000" cy="303245"/>
+          </a:xfrm>
+          <a:prstGeom prst="rect">
+            <a:avLst/>
+          </a:prstGeom>
+          <a:solidFill>
+            <a:srgbClr val="00543C"/>
+          </a:solidFill>
+          <a:ln>
+            <a:solidFill>
+              <a:schemeClr val="tx1"/>
+            </a:solidFill>
+          </a:ln>
+        </p:spPr>
+        <p:style>
+          <a:lnRef idx="2">
+            <a:schemeClr val="accent1">
+              <a:shade val="50000"/>
+            </a:schemeClr>
+          </a:lnRef>
+          <a:fillRef idx="1">
+            <a:schemeClr val="accent1"/>
+          </a:fillRef>
+          <a:effectRef idx="0">
+            <a:schemeClr val="accent1"/>
+          </a:effectRef>
+          <a:fontRef idx="minor">
+            <a:schemeClr val="lt1"/>
+          </a:fontRef>
+        </p:style>
+        <p:txBody>
+          <a:bodyPr rtlCol="0" anchor="ctr"/>
+          <a:lstStyle/>
+          <a:p>
+            <a:pPr algn="ctr"/>
+            <a:endParaRPr lang="en-US"/>
+          </a:p>
+        </p:txBody>
+      </p:sp>
+      <p:sp>
+        <p:nvSpPr>
+          <p:cNvPr id="5" name="TextBox 4"/>
+          <p:cNvSpPr txBox="1"/>
+          <p:nvPr/>
+        </p:nvSpPr>
+        <p:spPr>
+          <a:xfrm>
+            <a:off x="961053" y="503853"/>
+            <a:ext cx="9706947" cy="4647426"/>
+          </a:xfrm>
+          <a:prstGeom prst="rect">
+            <a:avLst/>
+          </a:prstGeom>
+          <a:noFill/>
+        </p:spPr>
+        <p:txBody>
+          <a:bodyPr wrap="square" rtlCol="0">
+            <a:spAutoFit/>
+          </a:bodyPr>
+          <a:lstStyle/>
+          <a:p>
+            <a:r>
+              <a:rPr lang="en-US" sz="3200" dirty="0" smtClean="0"/>
+              <a:t>Factors affecting K-12 enrollment and graduation:</a:t>
+            </a:r>
+          </a:p>
+          <a:p>
+            <a:endParaRPr lang="en-US" dirty="0"/>
+          </a:p>
+          <a:p>
+            <a:pPr marL="800100" lvl="1" indent="-342900">
+              <a:buFont typeface="Arial" panose="020B0604020202020204" pitchFamily="34" charset="0"/>
+              <a:buChar char="•"/>
+            </a:pPr>
+            <a:r>
+              <a:rPr lang="en-US" sz="2400" dirty="0" smtClean="0"/>
+              <a:t>Birth rates</a:t>
+            </a:r>
+          </a:p>
+          <a:p>
+            <a:pPr marL="628650" lvl="1" indent="-171450">
+              <a:buFont typeface="Arial" panose="020B0604020202020204" pitchFamily="34" charset="0"/>
+              <a:buChar char="•"/>
+            </a:pPr>
+            <a:endParaRPr lang="en-US" sz="1200" dirty="0"/>
+          </a:p>
+          <a:p>
+            <a:pPr marL="800100" lvl="1" indent="-342900">
+              <a:buFont typeface="Arial" panose="020B0604020202020204" pitchFamily="34" charset="0"/>
+              <a:buChar char="•"/>
+            </a:pPr>
+            <a:r>
+              <a:rPr lang="en-US" sz="2400" dirty="0" smtClean="0"/>
+              <a:t>Immigration</a:t>
+            </a:r>
+          </a:p>
+          <a:p>
+            <a:pPr marL="628650" lvl="1" indent="-171450">
+              <a:buFont typeface="Arial" panose="020B0604020202020204" pitchFamily="34" charset="0"/>
+              <a:buChar char="•"/>
+            </a:pPr>
+            <a:endParaRPr lang="en-US" sz="1200" dirty="0"/>
+          </a:p>
+          <a:p>
+            <a:pPr marL="800100" lvl="1" indent="-342900">
+              <a:buFont typeface="Arial" panose="020B0604020202020204" pitchFamily="34" charset="0"/>
+              <a:buChar char="•"/>
+            </a:pPr>
+            <a:r>
+              <a:rPr lang="en-US" sz="2400" dirty="0" smtClean="0"/>
+              <a:t>Emigration in/out of state</a:t>
+            </a:r>
+          </a:p>
+          <a:p>
+            <a:pPr marL="628650" lvl="1" indent="-171450">
+              <a:buFont typeface="Arial" panose="020B0604020202020204" pitchFamily="34" charset="0"/>
+              <a:buChar char="•"/>
+            </a:pPr>
+            <a:endParaRPr lang="en-US" sz="1200" dirty="0"/>
+          </a:p>
+          <a:p>
+            <a:pPr marL="800100" lvl="1" indent="-342900">
+              <a:buFont typeface="Arial" panose="020B0604020202020204" pitchFamily="34" charset="0"/>
+              <a:buChar char="•"/>
+            </a:pPr>
+            <a:r>
+              <a:rPr lang="en-US" sz="2400" dirty="0" smtClean="0"/>
+              <a:t>Housing costs</a:t>
+            </a:r>
+          </a:p>
+          <a:p>
+            <a:endParaRPr lang="en-US" dirty="0"/>
+          </a:p>
+          <a:p>
+            <a:r>
+              <a:rPr lang="en-US" sz="2400" u="sng" dirty="0" smtClean="0"/>
+              <a:t>More resources:</a:t>
+            </a:r>
+          </a:p>
+          <a:p>
+            <a:r>
+              <a:rPr lang="en-US" sz="2400" dirty="0" smtClean="0"/>
+              <a:t>CA Department Ed Data &amp; statistics: </a:t>
+            </a:r>
+            <a:r>
+              <a:rPr lang="en-US" sz="2400" dirty="0">
+                <a:hlinkClick r:id="rId2"/>
+              </a:rPr>
+              <a:t>https://www.cde.ca.gov/ds</a:t>
+            </a:r>
+            <a:r>
+              <a:rPr lang="en-US" sz="2400" dirty="0" smtClean="0">
+                <a:hlinkClick r:id="rId2"/>
+              </a:rPr>
+              <a:t>/</a:t>
+            </a:r>
+            <a:endParaRPr lang="en-US" sz="2400" dirty="0" smtClean="0"/>
+          </a:p>
+          <a:p>
+            <a:r>
+              <a:rPr lang="en-US" sz="2400" dirty="0" smtClean="0"/>
+              <a:t>National Center for </a:t>
+            </a:r>
+            <a:r>
+              <a:rPr lang="en-US" sz="2400" dirty="0"/>
+              <a:t>Education Statistics: </a:t>
+            </a:r>
+            <a:r>
+              <a:rPr lang="en-US" sz="2400" dirty="0">
+                <a:hlinkClick r:id="rId3"/>
+              </a:rPr>
+              <a:t>https://nces.ed.gov</a:t>
+            </a:r>
+            <a:r>
+              <a:rPr lang="en-US" sz="2400" dirty="0" smtClean="0">
+                <a:hlinkClick r:id="rId3"/>
+              </a:rPr>
+              <a:t>/</a:t>
+            </a:r>
+            <a:endParaRPr lang="en-US" sz="2400" dirty="0" smtClean="0"/>
+          </a:p>
+          <a:p>
+            <a:r>
+              <a:rPr lang="en-US" sz="2400" dirty="0" smtClean="0"/>
+              <a:t>Public Policy Institute </a:t>
+            </a:r>
+            <a:r>
+              <a:rPr lang="en-US" sz="2400" dirty="0"/>
+              <a:t>of California - </a:t>
+            </a:r>
+            <a:r>
+              <a:rPr lang="en-US" sz="2400" dirty="0">
+                <a:hlinkClick r:id="rId4"/>
+              </a:rPr>
+              <a:t>https://www.ppic.org</a:t>
+            </a:r>
+            <a:r>
+              <a:rPr lang="en-US" sz="2400" dirty="0" smtClean="0">
+                <a:hlinkClick r:id="rId4"/>
+              </a:rPr>
+              <a:t>/</a:t>
+            </a:r>
+            <a:endParaRPr lang="en-US" sz="2400" dirty="0" smtClean="0"/>
+          </a:p>
+        </p:txBody>
+      </p:sp>
+    </p:spTree>
+    <p:extLst>
+      <p:ext uri="{BB962C8B-B14F-4D97-AF65-F5344CB8AC3E}">
+        <p14:creationId xmlns:p14="http://schemas.microsoft.com/office/powerpoint/2010/main" val="4166368634"/>
+      </p:ext>
+    </p:extLst>
+  </p:cSld>
+  <p:clrMapOvr>
+    <a:masterClrMapping/>
+  </p:clrMapOvr>
+  <p:timing>
+    <p:tnLst>
+      <p:par>
+        <p:cTn id="1" dur="indefinite" restart="never" nodeType="tmRoot"/>
+      </p:par>
+    </p:tnLst>
+  </p:timing>
+</p:sld>
+</file>
+
+<file path=ppt/slides/slide9.xml><?xml version="1.0" encoding="utf-8"?>
+<p:sld xmlns:a="http://schemas.openxmlformats.org/drawingml/2006/main" xmlns:r="http://schemas.openxmlformats.org/officeDocument/2006/relationships" xmlns:p="http://schemas.openxmlformats.org/presentationml/2006/main">
+  <p:cSld>
+    <p:spTree>
+      <p:nvGrpSpPr>
+        <p:cNvPr id="1" name=""/>
+        <p:cNvGrpSpPr/>
+        <p:nvPr/>
+      </p:nvGrpSpPr>
+      <p:grpSpPr>
+        <a:xfrm>
+          <a:off x="0" y="0"/>
+          <a:ext cx="0" cy="0"/>
+          <a:chOff x="0" y="0"/>
+          <a:chExt cx="0" cy="0"/>
+        </a:xfrm>
+      </p:grpSpPr>
+      <p:sp>
+        <p:nvSpPr>
+          <p:cNvPr id="2" name="Title 1"/>
+          <p:cNvSpPr>
+            <a:spLocks noGrp="1"/>
+          </p:cNvSpPr>
+          <p:nvPr>
+            <p:ph type="ctrTitle"/>
+          </p:nvPr>
+        </p:nvSpPr>
+        <p:spPr/>
+        <p:txBody>
+          <a:bodyPr/>
+          <a:lstStyle/>
+          <a:p>
+            <a:r>
+              <a:rPr lang="en-US" dirty="0" smtClean="0"/>
+              <a:t>	</a:t>
+            </a:r>
+            <a:endParaRPr lang="en-US" dirty="0"/>
+          </a:p>
+        </p:txBody>
+      </p:sp>
+      <p:sp>
+        <p:nvSpPr>
+          <p:cNvPr id="4" name="Rectangle 3"/>
+          <p:cNvSpPr/>
+          <p:nvPr/>
+        </p:nvSpPr>
+        <p:spPr>
+          <a:xfrm>
+            <a:off x="0" y="6428792"/>
+            <a:ext cx="12192000" cy="419878"/>
+          </a:xfrm>
+          <a:prstGeom prst="rect">
+            <a:avLst/>
+          </a:prstGeom>
+          <a:solidFill>
+            <a:srgbClr val="FDBB30"/>
+          </a:solidFill>
+          <a:ln>
+            <a:solidFill>
+              <a:schemeClr val="tx1"/>
+            </a:solidFill>
+          </a:ln>
+        </p:spPr>
+        <p:style>
+          <a:lnRef idx="2">
+            <a:schemeClr val="accent1">
+              <a:shade val="50000"/>
+            </a:schemeClr>
+          </a:lnRef>
+          <a:fillRef idx="1">
+            <a:schemeClr val="accent1"/>
+          </a:fillRef>
+          <a:effectRef idx="0">
+            <a:schemeClr val="accent1"/>
+          </a:effectRef>
+          <a:fontRef idx="minor">
+            <a:schemeClr val="lt1"/>
+          </a:fontRef>
+        </p:style>
+        <p:txBody>
+          <a:bodyPr rtlCol="0" anchor="ctr"/>
+          <a:lstStyle/>
+          <a:p>
+            <a:pPr algn="ctr"/>
+            <a:endParaRPr lang="en-US"/>
+          </a:p>
+        </p:txBody>
+      </p:sp>
+      <p:sp>
+        <p:nvSpPr>
+          <p:cNvPr id="6" name="Rectangle 5"/>
+          <p:cNvSpPr/>
+          <p:nvPr/>
+        </p:nvSpPr>
+        <p:spPr>
+          <a:xfrm>
+            <a:off x="0" y="6218853"/>
+            <a:ext cx="12192000" cy="303245"/>
+          </a:xfrm>
+          <a:prstGeom prst="rect">
+            <a:avLst/>
+          </a:prstGeom>
+          <a:solidFill>
+            <a:srgbClr val="00543C"/>
+          </a:solidFill>
+          <a:ln>
+            <a:solidFill>
+              <a:schemeClr val="tx1"/>
+            </a:solidFill>
+          </a:ln>
+        </p:spPr>
+        <p:style>
+          <a:lnRef idx="2">
+            <a:schemeClr val="accent1">
+              <a:shade val="50000"/>
+            </a:schemeClr>
+          </a:lnRef>
+          <a:fillRef idx="1">
+            <a:schemeClr val="accent1"/>
+          </a:fillRef>
+          <a:effectRef idx="0">
+            <a:schemeClr val="accent1"/>
+          </a:effectRef>
+          <a:fontRef idx="minor">
+            <a:schemeClr val="lt1"/>
+          </a:fontRef>
+        </p:style>
+        <p:txBody>
+          <a:bodyPr rtlCol="0" anchor="ctr"/>
+          <a:lstStyle/>
+          <a:p>
+            <a:pPr algn="ctr"/>
+            <a:endParaRPr lang="en-US"/>
+          </a:p>
+        </p:txBody>
+      </p:sp>
+      <p:sp>
+        <p:nvSpPr>
+          <p:cNvPr id="7" name="TextBox 6"/>
+          <p:cNvSpPr txBox="1"/>
+          <p:nvPr/>
+        </p:nvSpPr>
+        <p:spPr>
+          <a:xfrm>
+            <a:off x="485192" y="2288254"/>
+            <a:ext cx="11038113" cy="923330"/>
+          </a:xfrm>
+          <a:prstGeom prst="rect">
+            <a:avLst/>
+          </a:prstGeom>
+          <a:noFill/>
+        </p:spPr>
+        <p:txBody>
+          <a:bodyPr wrap="square" rtlCol="0">
+            <a:spAutoFit/>
+          </a:bodyPr>
+          <a:lstStyle/>
+          <a:p>
+            <a:pPr algn="ctr"/>
+            <a:r>
+              <a:rPr lang="en-US" sz="5400" dirty="0" smtClean="0"/>
+              <a:t>College Affordability</a:t>
+            </a:r>
+          </a:p>
+        </p:txBody>
+      </p:sp>
+    </p:spTree>
+    <p:extLst>
+      <p:ext uri="{BB962C8B-B14F-4D97-AF65-F5344CB8AC3E}">
+        <p14:creationId xmlns:p14="http://schemas.microsoft.com/office/powerpoint/2010/main" val="2234532510"/>
       </p:ext>
     </p:extLst>
   </p:cSld>

</xml_diff>

<commit_message>
chart tweaks, ppt finalized
</commit_message>
<xml_diff>
--- a/usf_presentation_0220_gdubrow.pptx
+++ b/usf_presentation_0220_gdubrow.pptx
@@ -14,19 +14,23 @@
     <p:sldId id="259" r:id="rId8"/>
     <p:sldId id="273" r:id="rId9"/>
     <p:sldId id="271" r:id="rId10"/>
-    <p:sldId id="276" r:id="rId11"/>
-    <p:sldId id="274" r:id="rId12"/>
+    <p:sldId id="274" r:id="rId11"/>
+    <p:sldId id="282" r:id="rId12"/>
     <p:sldId id="268" r:id="rId13"/>
     <p:sldId id="263" r:id="rId14"/>
     <p:sldId id="269" r:id="rId15"/>
     <p:sldId id="277" r:id="rId16"/>
     <p:sldId id="270" r:id="rId17"/>
-    <p:sldId id="278" r:id="rId18"/>
-    <p:sldId id="280" r:id="rId19"/>
-    <p:sldId id="279" r:id="rId20"/>
-    <p:sldId id="281" r:id="rId21"/>
-    <p:sldId id="264" r:id="rId22"/>
-    <p:sldId id="266" r:id="rId23"/>
+    <p:sldId id="283" r:id="rId18"/>
+    <p:sldId id="284" r:id="rId19"/>
+    <p:sldId id="285" r:id="rId20"/>
+    <p:sldId id="286" r:id="rId21"/>
+    <p:sldId id="279" r:id="rId22"/>
+    <p:sldId id="281" r:id="rId23"/>
+    <p:sldId id="288" r:id="rId24"/>
+    <p:sldId id="287" r:id="rId25"/>
+    <p:sldId id="264" r:id="rId26"/>
+    <p:sldId id="266" r:id="rId27"/>
   </p:sldIdLst>
   <p:sldSz cx="12192000" cy="6858000"/>
   <p:notesSz cx="6858000" cy="9144000"/>
@@ -262,7 +266,7 @@
           <a:p>
             <a:fld id="{4E83AA21-0DC2-40CE-923B-A76D48AC771F}" type="datetimeFigureOut">
               <a:rPr lang="en-US" smtClean="0"/>
-              <a:t>2/24/20</a:t>
+              <a:t>2/25/2020</a:t>
             </a:fld>
             <a:endParaRPr lang="en-US"/>
           </a:p>
@@ -430,7 +434,7 @@
           <a:p>
             <a:fld id="{4E83AA21-0DC2-40CE-923B-A76D48AC771F}" type="datetimeFigureOut">
               <a:rPr lang="en-US" smtClean="0"/>
-              <a:t>2/24/20</a:t>
+              <a:t>2/25/2020</a:t>
             </a:fld>
             <a:endParaRPr lang="en-US"/>
           </a:p>
@@ -608,7 +612,7 @@
           <a:p>
             <a:fld id="{4E83AA21-0DC2-40CE-923B-A76D48AC771F}" type="datetimeFigureOut">
               <a:rPr lang="en-US" smtClean="0"/>
-              <a:t>2/24/20</a:t>
+              <a:t>2/25/2020</a:t>
             </a:fld>
             <a:endParaRPr lang="en-US"/>
           </a:p>
@@ -776,7 +780,7 @@
           <a:p>
             <a:fld id="{4E83AA21-0DC2-40CE-923B-A76D48AC771F}" type="datetimeFigureOut">
               <a:rPr lang="en-US" smtClean="0"/>
-              <a:t>2/24/20</a:t>
+              <a:t>2/25/2020</a:t>
             </a:fld>
             <a:endParaRPr lang="en-US"/>
           </a:p>
@@ -1021,7 +1025,7 @@
           <a:p>
             <a:fld id="{4E83AA21-0DC2-40CE-923B-A76D48AC771F}" type="datetimeFigureOut">
               <a:rPr lang="en-US" smtClean="0"/>
-              <a:t>2/24/20</a:t>
+              <a:t>2/25/2020</a:t>
             </a:fld>
             <a:endParaRPr lang="en-US"/>
           </a:p>
@@ -1250,7 +1254,7 @@
           <a:p>
             <a:fld id="{4E83AA21-0DC2-40CE-923B-A76D48AC771F}" type="datetimeFigureOut">
               <a:rPr lang="en-US" smtClean="0"/>
-              <a:t>2/24/20</a:t>
+              <a:t>2/25/2020</a:t>
             </a:fld>
             <a:endParaRPr lang="en-US"/>
           </a:p>
@@ -1614,7 +1618,7 @@
           <a:p>
             <a:fld id="{4E83AA21-0DC2-40CE-923B-A76D48AC771F}" type="datetimeFigureOut">
               <a:rPr lang="en-US" smtClean="0"/>
-              <a:t>2/24/20</a:t>
+              <a:t>2/25/2020</a:t>
             </a:fld>
             <a:endParaRPr lang="en-US"/>
           </a:p>
@@ -1731,7 +1735,7 @@
           <a:p>
             <a:fld id="{4E83AA21-0DC2-40CE-923B-A76D48AC771F}" type="datetimeFigureOut">
               <a:rPr lang="en-US" smtClean="0"/>
-              <a:t>2/24/20</a:t>
+              <a:t>2/25/2020</a:t>
             </a:fld>
             <a:endParaRPr lang="en-US"/>
           </a:p>
@@ -1826,7 +1830,7 @@
           <a:p>
             <a:fld id="{4E83AA21-0DC2-40CE-923B-A76D48AC771F}" type="datetimeFigureOut">
               <a:rPr lang="en-US" smtClean="0"/>
-              <a:t>2/24/20</a:t>
+              <a:t>2/25/2020</a:t>
             </a:fld>
             <a:endParaRPr lang="en-US"/>
           </a:p>
@@ -2101,7 +2105,7 @@
           <a:p>
             <a:fld id="{4E83AA21-0DC2-40CE-923B-A76D48AC771F}" type="datetimeFigureOut">
               <a:rPr lang="en-US" smtClean="0"/>
-              <a:t>2/24/20</a:t>
+              <a:t>2/25/2020</a:t>
             </a:fld>
             <a:endParaRPr lang="en-US"/>
           </a:p>
@@ -2353,7 +2357,7 @@
           <a:p>
             <a:fld id="{4E83AA21-0DC2-40CE-923B-A76D48AC771F}" type="datetimeFigureOut">
               <a:rPr lang="en-US" smtClean="0"/>
-              <a:t>2/24/20</a:t>
+              <a:t>2/25/2020</a:t>
             </a:fld>
             <a:endParaRPr lang="en-US"/>
           </a:p>
@@ -2564,7 +2568,7 @@
           <a:p>
             <a:fld id="{4E83AA21-0DC2-40CE-923B-A76D48AC771F}" type="datetimeFigureOut">
               <a:rPr lang="en-US" smtClean="0"/>
-              <a:t>2/24/20</a:t>
+              <a:t>2/25/2020</a:t>
             </a:fld>
             <a:endParaRPr lang="en-US"/>
           </a:p>
@@ -2992,7 +2996,11 @@
           <a:lstStyle/>
           <a:p>
             <a:r>
-              <a:rPr lang="en-US" dirty="0"/>
+              <a:rPr lang="en-US" dirty="0">
+                <a:solidFill>
+                  <a:srgbClr val="00543C"/>
+                </a:solidFill>
+              </a:rPr>
               <a:t>The Higher Education Landscape</a:t>
             </a:r>
           </a:p>
@@ -3010,33 +3018,78 @@
         </p:nvSpPr>
         <p:spPr>
           <a:xfrm>
-            <a:off x="1346718" y="2603663"/>
-            <a:ext cx="9144000" cy="1655762"/>
+            <a:off x="814873" y="2216020"/>
+            <a:ext cx="9741159" cy="1655762"/>
           </a:xfrm>
         </p:spPr>
         <p:txBody>
           <a:bodyPr>
-            <a:normAutofit lnSpcReduction="10000"/>
+            <a:noAutofit/>
           </a:bodyPr>
           <a:lstStyle/>
           <a:p>
             <a:r>
-              <a:rPr lang="en-US" dirty="0"/>
-              <a:t>A presentation to the USF Budget Forum, February 2020</a:t>
-            </a:r>
-          </a:p>
-          <a:p>
-            <a:endParaRPr lang="en-US" dirty="0"/>
-          </a:p>
-          <a:p>
-            <a:r>
-              <a:rPr lang="en-US" dirty="0"/>
+              <a:rPr lang="en-US" sz="3200" dirty="0">
+                <a:solidFill>
+                  <a:srgbClr val="00543C"/>
+                </a:solidFill>
+              </a:rPr>
+              <a:t>A presentation to the </a:t>
+            </a:r>
+            <a:endParaRPr lang="en-US" sz="3200" dirty="0" smtClean="0">
+              <a:solidFill>
+                <a:srgbClr val="00543C"/>
+              </a:solidFill>
+            </a:endParaRPr>
+          </a:p>
+          <a:p>
+            <a:r>
+              <a:rPr lang="en-US" sz="3200" dirty="0" smtClean="0">
+                <a:solidFill>
+                  <a:srgbClr val="00543C"/>
+                </a:solidFill>
+              </a:rPr>
+              <a:t>University of San Francisco Budget </a:t>
+            </a:r>
+            <a:r>
+              <a:rPr lang="en-US" sz="3200" dirty="0">
+                <a:solidFill>
+                  <a:srgbClr val="00543C"/>
+                </a:solidFill>
+              </a:rPr>
+              <a:t>Forum, February 2020</a:t>
+            </a:r>
+          </a:p>
+          <a:p>
+            <a:endParaRPr lang="en-US" sz="3200" dirty="0" smtClean="0"/>
+          </a:p>
+          <a:p>
+            <a:endParaRPr lang="en-US" sz="3200" dirty="0" smtClean="0"/>
+          </a:p>
+          <a:p>
+            <a:endParaRPr lang="en-US" sz="800" dirty="0"/>
+          </a:p>
+          <a:p>
+            <a:r>
+              <a:rPr lang="en-US" sz="3200" dirty="0">
+                <a:solidFill>
+                  <a:schemeClr val="bg2">
+                    <a:lumMod val="50000"/>
+                  </a:schemeClr>
+                </a:solidFill>
+              </a:rPr>
               <a:t>Greg Dubrow, Director of Institutional Research, </a:t>
             </a:r>
           </a:p>
           <a:p>
             <a:r>
-              <a:rPr lang="en-US" dirty="0"/>
+              <a:rPr lang="en-US" sz="3200" dirty="0">
+                <a:solidFill>
+                  <a:schemeClr val="bg2">
+                    <a:lumMod val="50000"/>
+                  </a:schemeClr>
+                </a:solidFill>
+              </a:rPr>
               <a:t>San Francisco State University</a:t>
             </a:r>
           </a:p>
@@ -3148,6 +3201,13 @@
   <p:clrMapOvr>
     <a:masterClrMapping/>
   </p:clrMapOvr>
+  <p:timing>
+    <p:tnLst>
+      <p:par>
+        <p:cTn id="1" dur="indefinite" restart="never" nodeType="tmRoot"/>
+      </p:par>
+    </p:tnLst>
+  </p:timing>
 </p:sld>
 </file>
 
@@ -3288,14 +3348,14 @@
       </p:sp>
       <p:sp>
         <p:nvSpPr>
-          <p:cNvPr id="19" name="TextBox 18"/>
+          <p:cNvPr id="5" name="TextBox 4"/>
           <p:cNvSpPr txBox="1"/>
           <p:nvPr/>
         </p:nvSpPr>
         <p:spPr>
           <a:xfrm>
-            <a:off x="1984443" y="71104"/>
-            <a:ext cx="8608978" cy="738664"/>
+            <a:off x="961053" y="699081"/>
+            <a:ext cx="9706947" cy="5678478"/>
           </a:xfrm>
           <a:prstGeom prst="rect">
             <a:avLst/>
@@ -3308,70 +3368,126 @@
           </a:bodyPr>
           <a:lstStyle/>
           <a:p>
-            <a:pPr algn="ctr"/>
+            <a:pPr marL="342900" indent="-342900">
+              <a:buFont typeface="Arial" panose="020B0604020202020204" pitchFamily="34" charset="0"/>
+              <a:buChar char="•"/>
+            </a:pPr>
             <a:r>
               <a:rPr lang="en-US" sz="2400" dirty="0"/>
-              <a:t>Jesuit College Undergraduate Enrollment (Indexed) – 1987 to 2018</a:t>
-            </a:r>
-          </a:p>
-          <a:p>
-            <a:pPr algn="ctr"/>
-            <a:r>
-              <a:rPr lang="en-US" dirty="0"/>
-              <a:t>(1987  = 1)</a:t>
-            </a:r>
-          </a:p>
-        </p:txBody>
-      </p:sp>
-      <p:pic>
-        <p:nvPicPr>
-          <p:cNvPr id="7" name="Picture 6"/>
-          <p:cNvPicPr>
-            <a:picLocks noChangeAspect="1"/>
-          </p:cNvPicPr>
-          <p:nvPr/>
-        </p:nvPicPr>
-        <p:blipFill>
-          <a:blip r:embed="rId2" cstate="print">
-            <a:extLst>
-              <a:ext uri="{28A0092B-C50C-407E-A947-70E740481C1C}">
-                <a14:useLocalDpi xmlns:a14="http://schemas.microsoft.com/office/drawing/2010/main" val="0"/>
-              </a:ext>
-            </a:extLst>
-          </a:blip>
-          <a:stretch>
-            <a:fillRect/>
-          </a:stretch>
-        </p:blipFill>
-        <p:spPr>
-          <a:xfrm>
-            <a:off x="993711" y="809768"/>
-            <a:ext cx="10058400" cy="5325426"/>
-          </a:xfrm>
-          <a:prstGeom prst="rect">
-            <a:avLst/>
-          </a:prstGeom>
-        </p:spPr>
-      </p:pic>
-      <p:sp>
-        <p:nvSpPr>
-          <p:cNvPr id="20" name="TextBox 19"/>
+              <a:t>Undergraduate enrollment has more than doubled since 1987.</a:t>
+            </a:r>
+          </a:p>
+          <a:p>
+            <a:pPr marL="342900" indent="-342900">
+              <a:buFont typeface="Arial" panose="020B0604020202020204" pitchFamily="34" charset="0"/>
+              <a:buChar char="•"/>
+            </a:pPr>
+            <a:endParaRPr lang="en-US" sz="1200" dirty="0"/>
+          </a:p>
+          <a:p>
+            <a:pPr marL="342900" indent="-342900">
+              <a:buFont typeface="Arial" panose="020B0604020202020204" pitchFamily="34" charset="0"/>
+              <a:buChar char="•"/>
+            </a:pPr>
+            <a:r>
+              <a:rPr lang="en-US" sz="2400" dirty="0"/>
+              <a:t>Graduate enrollments fluctuating over time</a:t>
+            </a:r>
+          </a:p>
+          <a:p>
+            <a:pPr marL="342900" indent="-342900">
+              <a:buFont typeface="Arial" panose="020B0604020202020204" pitchFamily="34" charset="0"/>
+              <a:buChar char="•"/>
+            </a:pPr>
+            <a:endParaRPr lang="en-US" sz="1200" dirty="0"/>
+          </a:p>
+          <a:p>
+            <a:pPr marL="342900" indent="-342900">
+              <a:buFont typeface="Arial" panose="020B0604020202020204" pitchFamily="34" charset="0"/>
+              <a:buChar char="•"/>
+            </a:pPr>
+            <a:r>
+              <a:rPr lang="en-US" sz="2400" dirty="0"/>
+              <a:t>Ratio of undergraduate::graduate enrollments steady over time, generally +/- 2% points from 60%</a:t>
+            </a:r>
+          </a:p>
+          <a:p>
+            <a:endParaRPr lang="en-US" sz="1200" dirty="0"/>
+          </a:p>
+          <a:p>
+            <a:pPr marL="342900" indent="-342900">
+              <a:buFont typeface="Arial" panose="020B0604020202020204" pitchFamily="34" charset="0"/>
+              <a:buChar char="•"/>
+            </a:pPr>
+            <a:r>
+              <a:rPr lang="en-US" sz="2400" dirty="0"/>
+              <a:t>With 63% of new students coming from California, high school enrollments here will have most impact. </a:t>
+            </a:r>
+          </a:p>
+          <a:p>
+            <a:endParaRPr lang="en-US" sz="1200" dirty="0"/>
+          </a:p>
+          <a:p>
+            <a:pPr marL="342900" indent="-342900">
+              <a:buFont typeface="Arial" panose="020B0604020202020204" pitchFamily="34" charset="0"/>
+              <a:buChar char="•"/>
+            </a:pPr>
+            <a:r>
+              <a:rPr lang="en-US" sz="2400" dirty="0"/>
+              <a:t>Western Interstate Commission for Higher Education (WICHE) projects HS grads from all western states to peak in 2024 at 862,000, then decline for a few years, rebounding again around 2032. (</a:t>
+            </a:r>
+            <a:r>
+              <a:rPr lang="en-US" i="1" dirty="0"/>
+              <a:t>Knocking at the College Door, </a:t>
+            </a:r>
+            <a:r>
+              <a:rPr lang="en-US" i="1" dirty="0">
+                <a:hlinkClick r:id="rId2"/>
+              </a:rPr>
+              <a:t>https://knocking.wiche.edu</a:t>
+            </a:r>
+            <a:r>
+              <a:rPr lang="en-US" sz="2400" dirty="0"/>
+              <a:t>)</a:t>
+            </a:r>
+          </a:p>
+          <a:p>
+            <a:pPr marL="342900" indent="-342900">
+              <a:buFont typeface="Arial" panose="020B0604020202020204" pitchFamily="34" charset="0"/>
+              <a:buChar char="•"/>
+            </a:pPr>
+            <a:endParaRPr lang="en-US" sz="900" dirty="0"/>
+          </a:p>
+          <a:p>
+            <a:pPr marL="342900" indent="-342900">
+              <a:buFont typeface="Arial" panose="020B0604020202020204" pitchFamily="34" charset="0"/>
+              <a:buChar char="•"/>
+            </a:pPr>
+            <a:r>
+              <a:rPr lang="en-US" sz="2400" dirty="0"/>
+              <a:t>During 1980s the Gen X population drop mitigated by increased college-going rates – what will happen this time? </a:t>
+            </a:r>
+          </a:p>
+          <a:p>
+            <a:endParaRPr lang="en-US" dirty="0"/>
+          </a:p>
+        </p:txBody>
+      </p:sp>
+      <p:sp>
+        <p:nvSpPr>
+          <p:cNvPr id="7" name="TextBox 6"/>
           <p:cNvSpPr txBox="1"/>
           <p:nvPr/>
         </p:nvSpPr>
         <p:spPr>
           <a:xfrm>
-            <a:off x="7934131" y="5416487"/>
-            <a:ext cx="2733869" cy="307777"/>
-          </a:xfrm>
-          <a:prstGeom prst="rect">
-            <a:avLst/>
-          </a:prstGeom>
-          <a:solidFill>
-            <a:schemeClr val="bg1">
-              <a:alpha val="75000"/>
-            </a:schemeClr>
-          </a:solidFill>
+            <a:off x="3660710" y="99097"/>
+            <a:ext cx="5361991" cy="461665"/>
+          </a:xfrm>
+          <a:prstGeom prst="rect">
+            <a:avLst/>
+          </a:prstGeom>
+          <a:noFill/>
         </p:spPr>
         <p:txBody>
           <a:bodyPr wrap="square" rtlCol="0">
@@ -3380,14 +3496,8 @@
           <a:lstStyle/>
           <a:p>
             <a:r>
-              <a:rPr lang="en-US" sz="1400" i="1" dirty="0">
-                <a:solidFill>
-                  <a:schemeClr val="bg1">
-                    <a:lumMod val="65000"/>
-                  </a:schemeClr>
-                </a:solidFill>
-              </a:rPr>
-              <a:t>Sources: IPEDS &amp; Delta Cost Project</a:t>
+              <a:rPr lang="en-US" sz="2400" dirty="0"/>
+              <a:t>Total Enrollment at USF – 1987 to 2018</a:t>
             </a:r>
           </a:p>
         </p:txBody>
@@ -3395,13 +3505,20 @@
     </p:spTree>
     <p:extLst>
       <p:ext uri="{BB962C8B-B14F-4D97-AF65-F5344CB8AC3E}">
-        <p14:creationId xmlns:p14="http://schemas.microsoft.com/office/powerpoint/2010/main" val="1536730436"/>
+        <p14:creationId xmlns:p14="http://schemas.microsoft.com/office/powerpoint/2010/main" val="3608161892"/>
       </p:ext>
     </p:extLst>
   </p:cSld>
   <p:clrMapOvr>
     <a:masterClrMapping/>
   </p:clrMapOvr>
+  <p:timing>
+    <p:tnLst>
+      <p:par>
+        <p:cTn id="1" dur="indefinite" restart="never" nodeType="tmRoot"/>
+      </p:par>
+    </p:tnLst>
+  </p:timing>
 </p:sld>
 </file>
 
@@ -3542,14 +3659,14 @@
       </p:sp>
       <p:sp>
         <p:nvSpPr>
-          <p:cNvPr id="5" name="TextBox 4"/>
+          <p:cNvPr id="19" name="TextBox 18"/>
           <p:cNvSpPr txBox="1"/>
           <p:nvPr/>
         </p:nvSpPr>
         <p:spPr>
           <a:xfrm>
-            <a:off x="961053" y="699081"/>
-            <a:ext cx="9706947" cy="5678478"/>
+            <a:off x="1984443" y="71104"/>
+            <a:ext cx="8608978" cy="461665"/>
           </a:xfrm>
           <a:prstGeom prst="rect">
             <a:avLst/>
@@ -3562,126 +3679,73 @@
           </a:bodyPr>
           <a:lstStyle/>
           <a:p>
-            <a:pPr marL="342900" indent="-342900">
-              <a:buFont typeface="Arial" panose="020B0604020202020204" pitchFamily="34" charset="0"/>
-              <a:buChar char="•"/>
-            </a:pPr>
+            <a:pPr algn="ctr"/>
             <a:r>
               <a:rPr lang="en-US" sz="2400" dirty="0"/>
-              <a:t>Undergraduate enrollment has more than doubled since 1987.</a:t>
-            </a:r>
-          </a:p>
-          <a:p>
-            <a:pPr marL="342900" indent="-342900">
-              <a:buFont typeface="Arial" panose="020B0604020202020204" pitchFamily="34" charset="0"/>
-              <a:buChar char="•"/>
-            </a:pPr>
-            <a:endParaRPr lang="en-US" sz="1200" dirty="0"/>
-          </a:p>
-          <a:p>
-            <a:pPr marL="342900" indent="-342900">
-              <a:buFont typeface="Arial" panose="020B0604020202020204" pitchFamily="34" charset="0"/>
-              <a:buChar char="•"/>
-            </a:pPr>
-            <a:r>
-              <a:rPr lang="en-US" sz="2400" dirty="0"/>
-              <a:t>Graduate enrollments fluctuating over time</a:t>
-            </a:r>
-          </a:p>
-          <a:p>
-            <a:pPr marL="342900" indent="-342900">
-              <a:buFont typeface="Arial" panose="020B0604020202020204" pitchFamily="34" charset="0"/>
-              <a:buChar char="•"/>
-            </a:pPr>
-            <a:endParaRPr lang="en-US" sz="1200" dirty="0"/>
-          </a:p>
-          <a:p>
-            <a:pPr marL="342900" indent="-342900">
-              <a:buFont typeface="Arial" panose="020B0604020202020204" pitchFamily="34" charset="0"/>
-              <a:buChar char="•"/>
-            </a:pPr>
-            <a:r>
-              <a:rPr lang="en-US" sz="2400" dirty="0"/>
-              <a:t>Ratio of undergraduate::graduate enrollments steady over time, generally +/- 2% points from 60%</a:t>
-            </a:r>
-          </a:p>
-          <a:p>
-            <a:endParaRPr lang="en-US" sz="1200" dirty="0"/>
-          </a:p>
-          <a:p>
-            <a:pPr marL="342900" indent="-342900">
-              <a:buFont typeface="Arial" panose="020B0604020202020204" pitchFamily="34" charset="0"/>
-              <a:buChar char="•"/>
-            </a:pPr>
-            <a:r>
-              <a:rPr lang="en-US" sz="2400" dirty="0"/>
-              <a:t>With 63% of new students coming from California, high school enrollments here will have most impact. </a:t>
-            </a:r>
-          </a:p>
-          <a:p>
-            <a:endParaRPr lang="en-US" sz="1200" dirty="0"/>
-          </a:p>
-          <a:p>
-            <a:pPr marL="342900" indent="-342900">
-              <a:buFont typeface="Arial" panose="020B0604020202020204" pitchFamily="34" charset="0"/>
-              <a:buChar char="•"/>
-            </a:pPr>
-            <a:r>
-              <a:rPr lang="en-US" sz="2400" dirty="0"/>
-              <a:t>Western Interstate Commission for Higher Education (WICHE) projects HS grads from all western states to peak in 2024 at 862,000, then decline for a few years, rebounding again around 2032. (</a:t>
-            </a:r>
-            <a:r>
-              <a:rPr lang="en-US" i="1" dirty="0"/>
-              <a:t>Knocking at the College Door, </a:t>
-            </a:r>
-            <a:r>
-              <a:rPr lang="en-US" i="1" dirty="0">
-                <a:hlinkClick r:id="rId2"/>
-              </a:rPr>
-              <a:t>https://knocking.wiche.edu</a:t>
-            </a:r>
-            <a:r>
-              <a:rPr lang="en-US" sz="2400" dirty="0"/>
-              <a:t>)</a:t>
-            </a:r>
-          </a:p>
-          <a:p>
-            <a:pPr marL="342900" indent="-342900">
-              <a:buFont typeface="Arial" panose="020B0604020202020204" pitchFamily="34" charset="0"/>
-              <a:buChar char="•"/>
-            </a:pPr>
-            <a:endParaRPr lang="en-US" sz="900" dirty="0"/>
-          </a:p>
-          <a:p>
-            <a:pPr marL="342900" indent="-342900">
-              <a:buFont typeface="Arial" panose="020B0604020202020204" pitchFamily="34" charset="0"/>
-              <a:buChar char="•"/>
-            </a:pPr>
-            <a:r>
-              <a:rPr lang="en-US" sz="2400" dirty="0"/>
-              <a:t>During 1980s the Gen X population drop mitigated by increased college-going rates – what will happen this time? </a:t>
-            </a:r>
-          </a:p>
-          <a:p>
-            <a:endParaRPr lang="en-US" dirty="0"/>
-          </a:p>
-        </p:txBody>
-      </p:sp>
-      <p:sp>
-        <p:nvSpPr>
-          <p:cNvPr id="7" name="TextBox 6"/>
+              <a:t>Jesuit College Undergraduate Enrollment (Indexed) – 1987 to </a:t>
+            </a:r>
+            <a:r>
+              <a:rPr lang="en-US" sz="2400" dirty="0" smtClean="0"/>
+              <a:t>2018</a:t>
+            </a:r>
+            <a:endParaRPr lang="en-US" sz="2400" dirty="0"/>
+          </a:p>
+        </p:txBody>
+      </p:sp>
+      <p:pic>
+        <p:nvPicPr>
+          <p:cNvPr id="3" name="Picture 2"/>
+          <p:cNvPicPr>
+            <a:picLocks noChangeAspect="1"/>
+          </p:cNvPicPr>
+          <p:nvPr/>
+        </p:nvPicPr>
+        <p:blipFill>
+          <a:blip r:embed="rId2" cstate="print">
+            <a:extLst>
+              <a:ext uri="{28A0092B-C50C-407E-A947-70E740481C1C}">
+                <a14:useLocalDpi xmlns:a14="http://schemas.microsoft.com/office/drawing/2010/main" val="0"/>
+              </a:ext>
+            </a:extLst>
+          </a:blip>
+          <a:stretch>
+            <a:fillRect/>
+          </a:stretch>
+        </p:blipFill>
+        <p:spPr>
+          <a:xfrm>
+            <a:off x="996696" y="813816"/>
+            <a:ext cx="10058400" cy="5325426"/>
+          </a:xfrm>
+          <a:prstGeom prst="rect">
+            <a:avLst/>
+          </a:prstGeom>
+          <a:ln>
+            <a:solidFill>
+              <a:schemeClr val="tx1"/>
+            </a:solidFill>
+          </a:ln>
+        </p:spPr>
+      </p:pic>
+      <p:sp>
+        <p:nvSpPr>
+          <p:cNvPr id="20" name="TextBox 19"/>
           <p:cNvSpPr txBox="1"/>
           <p:nvPr/>
         </p:nvSpPr>
         <p:spPr>
           <a:xfrm>
-            <a:off x="3660710" y="99097"/>
-            <a:ext cx="5361991" cy="461665"/>
-          </a:xfrm>
-          <a:prstGeom prst="rect">
-            <a:avLst/>
-          </a:prstGeom>
-          <a:noFill/>
+            <a:off x="7934131" y="5416487"/>
+            <a:ext cx="2733869" cy="307777"/>
+          </a:xfrm>
+          <a:prstGeom prst="rect">
+            <a:avLst/>
+          </a:prstGeom>
+          <a:solidFill>
+            <a:schemeClr val="bg1">
+              <a:alpha val="75000"/>
+            </a:schemeClr>
+          </a:solidFill>
         </p:spPr>
         <p:txBody>
           <a:bodyPr wrap="square" rtlCol="0">
@@ -3690,22 +3754,246 @@
           <a:lstStyle/>
           <a:p>
             <a:r>
-              <a:rPr lang="en-US" sz="2400" dirty="0"/>
-              <a:t>Total Enrollment at USF – 1987 to 2018</a:t>
-            </a:r>
+              <a:rPr lang="en-US" sz="1400" i="1" dirty="0">
+                <a:solidFill>
+                  <a:schemeClr val="bg1">
+                    <a:lumMod val="65000"/>
+                  </a:schemeClr>
+                </a:solidFill>
+              </a:rPr>
+              <a:t>Sources: IPEDS &amp; Delta Cost Project</a:t>
+            </a:r>
+          </a:p>
+        </p:txBody>
+      </p:sp>
+      <p:sp>
+        <p:nvSpPr>
+          <p:cNvPr id="5" name="TextBox 4"/>
+          <p:cNvSpPr txBox="1"/>
+          <p:nvPr/>
+        </p:nvSpPr>
+        <p:spPr>
+          <a:xfrm>
+            <a:off x="1694097" y="1220256"/>
+            <a:ext cx="5565119" cy="338554"/>
+          </a:xfrm>
+          <a:prstGeom prst="rect">
+            <a:avLst/>
+          </a:prstGeom>
+          <a:noFill/>
+        </p:spPr>
+        <p:txBody>
+          <a:bodyPr wrap="square" rtlCol="0">
+            <a:spAutoFit/>
+          </a:bodyPr>
+          <a:lstStyle/>
+          <a:p>
+            <a:r>
+              <a:rPr lang="en-US" sz="1400" dirty="0" smtClean="0">
+                <a:solidFill>
+                  <a:schemeClr val="bg1">
+                    <a:lumMod val="50000"/>
+                  </a:schemeClr>
+                </a:solidFill>
+              </a:rPr>
+              <a:t>Regis University – doubled 1987 to 2006, has since reduced enrollment</a:t>
+            </a:r>
+            <a:r>
+              <a:rPr lang="en-US" sz="1600" dirty="0">
+                <a:sym typeface="Symbol" panose="05050102010706020507" pitchFamily="18" charset="2"/>
+              </a:rPr>
+              <a:t> </a:t>
+            </a:r>
+            <a:r>
+              <a:rPr lang="en-US" sz="1400" dirty="0"/>
+              <a:t> </a:t>
+            </a:r>
+            <a:endParaRPr lang="en-US" sz="1600" dirty="0">
+              <a:solidFill>
+                <a:schemeClr val="bg1">
+                  <a:lumMod val="50000"/>
+                </a:schemeClr>
+              </a:solidFill>
+            </a:endParaRPr>
+          </a:p>
+        </p:txBody>
+      </p:sp>
+      <p:sp>
+        <p:nvSpPr>
+          <p:cNvPr id="7" name="TextBox 6"/>
+          <p:cNvSpPr txBox="1"/>
+          <p:nvPr/>
+        </p:nvSpPr>
+        <p:spPr>
+          <a:xfrm>
+            <a:off x="2883159" y="4362937"/>
+            <a:ext cx="4376057" cy="307777"/>
+          </a:xfrm>
+          <a:prstGeom prst="rect">
+            <a:avLst/>
+          </a:prstGeom>
+          <a:noFill/>
+        </p:spPr>
+        <p:txBody>
+          <a:bodyPr wrap="square" rtlCol="0">
+            <a:spAutoFit/>
+          </a:bodyPr>
+          <a:lstStyle/>
+          <a:p>
+            <a:r>
+              <a:rPr lang="en-US" sz="1400" dirty="0" smtClean="0">
+                <a:solidFill>
+                  <a:schemeClr val="bg1">
+                    <a:lumMod val="50000"/>
+                  </a:schemeClr>
+                </a:solidFill>
+              </a:rPr>
+              <a:t>Loyola University in New Orleans, post-Hurricane Katrina</a:t>
+            </a:r>
+            <a:endParaRPr lang="en-US" sz="1400" dirty="0">
+              <a:solidFill>
+                <a:schemeClr val="bg1">
+                  <a:lumMod val="50000"/>
+                </a:schemeClr>
+              </a:solidFill>
+            </a:endParaRPr>
           </a:p>
         </p:txBody>
       </p:sp>
     </p:spTree>
     <p:extLst>
       <p:ext uri="{BB962C8B-B14F-4D97-AF65-F5344CB8AC3E}">
-        <p14:creationId xmlns:p14="http://schemas.microsoft.com/office/powerpoint/2010/main" val="3608161892"/>
+        <p14:creationId xmlns:p14="http://schemas.microsoft.com/office/powerpoint/2010/main" val="1331811773"/>
       </p:ext>
     </p:extLst>
   </p:cSld>
   <p:clrMapOvr>
     <a:masterClrMapping/>
   </p:clrMapOvr>
+  <p:timing>
+    <p:tnLst>
+      <p:par>
+        <p:cTn id="1" dur="indefinite" restart="never" nodeType="tmRoot">
+          <p:childTnLst>
+            <p:seq concurrent="1" nextAc="seek">
+              <p:cTn id="2" dur="indefinite" nodeType="mainSeq">
+                <p:childTnLst>
+                  <p:par>
+                    <p:cTn id="3" fill="hold">
+                      <p:stCondLst>
+                        <p:cond delay="indefinite"/>
+                      </p:stCondLst>
+                      <p:childTnLst>
+                        <p:par>
+                          <p:cTn id="4" fill="hold">
+                            <p:stCondLst>
+                              <p:cond delay="0"/>
+                            </p:stCondLst>
+                            <p:childTnLst>
+                              <p:par>
+                                <p:cTn id="5" presetID="1" presetClass="entr" presetSubtype="0" fill="hold" grpId="0" nodeType="clickEffect">
+                                  <p:stCondLst>
+                                    <p:cond delay="0"/>
+                                  </p:stCondLst>
+                                  <p:childTnLst>
+                                    <p:set>
+                                      <p:cBhvr>
+                                        <p:cTn id="6" dur="1" fill="hold">
+                                          <p:stCondLst>
+                                            <p:cond delay="0"/>
+                                          </p:stCondLst>
+                                        </p:cTn>
+                                        <p:tgtEl>
+                                          <p:spTgt spid="7"/>
+                                        </p:tgtEl>
+                                        <p:attrNameLst>
+                                          <p:attrName>style.visibility</p:attrName>
+                                        </p:attrNameLst>
+                                      </p:cBhvr>
+                                      <p:to>
+                                        <p:strVal val="visible"/>
+                                      </p:to>
+                                    </p:set>
+                                  </p:childTnLst>
+                                </p:cTn>
+                              </p:par>
+                            </p:childTnLst>
+                          </p:cTn>
+                        </p:par>
+                      </p:childTnLst>
+                    </p:cTn>
+                  </p:par>
+                  <p:par>
+                    <p:cTn id="7" fill="hold">
+                      <p:stCondLst>
+                        <p:cond delay="indefinite"/>
+                      </p:stCondLst>
+                      <p:childTnLst>
+                        <p:par>
+                          <p:cTn id="8" fill="hold">
+                            <p:stCondLst>
+                              <p:cond delay="0"/>
+                            </p:stCondLst>
+                            <p:childTnLst>
+                              <p:par>
+                                <p:cTn id="9" presetID="1" presetClass="entr" presetSubtype="0" fill="hold" grpId="0" nodeType="clickEffect">
+                                  <p:stCondLst>
+                                    <p:cond delay="0"/>
+                                  </p:stCondLst>
+                                  <p:childTnLst>
+                                    <p:set>
+                                      <p:cBhvr>
+                                        <p:cTn id="10" dur="1" fill="hold">
+                                          <p:stCondLst>
+                                            <p:cond delay="0"/>
+                                          </p:stCondLst>
+                                        </p:cTn>
+                                        <p:tgtEl>
+                                          <p:spTgt spid="5"/>
+                                        </p:tgtEl>
+                                        <p:attrNameLst>
+                                          <p:attrName>style.visibility</p:attrName>
+                                        </p:attrNameLst>
+                                      </p:cBhvr>
+                                      <p:to>
+                                        <p:strVal val="visible"/>
+                                      </p:to>
+                                    </p:set>
+                                  </p:childTnLst>
+                                </p:cTn>
+                              </p:par>
+                            </p:childTnLst>
+                          </p:cTn>
+                        </p:par>
+                      </p:childTnLst>
+                    </p:cTn>
+                  </p:par>
+                </p:childTnLst>
+              </p:cTn>
+              <p:prevCondLst>
+                <p:cond evt="onPrev" delay="0">
+                  <p:tgtEl>
+                    <p:sldTgt/>
+                  </p:tgtEl>
+                </p:cond>
+              </p:prevCondLst>
+              <p:nextCondLst>
+                <p:cond evt="onNext" delay="0">
+                  <p:tgtEl>
+                    <p:sldTgt/>
+                  </p:tgtEl>
+                </p:cond>
+              </p:nextCondLst>
+            </p:seq>
+          </p:childTnLst>
+        </p:cTn>
+      </p:par>
+    </p:tnLst>
+    <p:bldLst>
+      <p:bldP spid="5" grpId="0"/>
+      <p:bldP spid="7" grpId="0"/>
+    </p:bldLst>
+  </p:timing>
 </p:sld>
 </file>
 
@@ -3884,6 +4172,13 @@
   <p:clrMapOvr>
     <a:masterClrMapping/>
   </p:clrMapOvr>
+  <p:timing>
+    <p:tnLst>
+      <p:par>
+        <p:cTn id="1" dur="indefinite" restart="never" nodeType="tmRoot"/>
+      </p:par>
+    </p:tnLst>
+  </p:timing>
 </p:sld>
 </file>
 
@@ -4121,6 +4416,13 @@
   <p:clrMapOvr>
     <a:masterClrMapping/>
   </p:clrMapOvr>
+  <p:timing>
+    <p:tnLst>
+      <p:par>
+        <p:cTn id="1" dur="indefinite" restart="never" nodeType="tmRoot"/>
+      </p:par>
+    </p:tnLst>
+  </p:timing>
 </p:sld>
 </file>
 
@@ -4369,6 +4671,13 @@
   <p:clrMapOvr>
     <a:masterClrMapping/>
   </p:clrMapOvr>
+  <p:timing>
+    <p:tnLst>
+      <p:par>
+        <p:cTn id="1" dur="indefinite" restart="never" nodeType="tmRoot"/>
+      </p:par>
+    </p:tnLst>
+  </p:timing>
 </p:sld>
 </file>
 
@@ -4551,7 +4860,7 @@
         <p:spPr>
           <a:xfrm>
             <a:off x="1362269" y="-31589"/>
-            <a:ext cx="9467461" cy="954107"/>
+            <a:ext cx="9467461" cy="584775"/>
           </a:xfrm>
           <a:prstGeom prst="rect">
             <a:avLst/>
@@ -4567,14 +4876,19 @@
             <a:pPr algn="ctr"/>
             <a:r>
               <a:rPr lang="en-US" sz="3200" dirty="0"/>
-              <a:t>Average Tuition &amp; Fees by Sector</a:t>
-            </a:r>
-          </a:p>
-          <a:p>
-            <a:pPr algn="ctr"/>
+              <a:t>Average Tuition &amp; Fees by </a:t>
+            </a:r>
+            <a:r>
+              <a:rPr lang="en-US" sz="3200" dirty="0" smtClean="0"/>
+              <a:t>Sector  </a:t>
+            </a:r>
+            <a:r>
+              <a:rPr lang="en-US" sz="2400" i="1" dirty="0" smtClean="0"/>
+              <a:t>(current </a:t>
+            </a:r>
             <a:r>
               <a:rPr lang="en-US" sz="2400" i="1" dirty="0"/>
-              <a:t>(current $)</a:t>
+              <a:t>$)</a:t>
             </a:r>
           </a:p>
         </p:txBody>
@@ -4601,7 +4915,7 @@
         </p:blipFill>
         <p:spPr>
           <a:xfrm>
-            <a:off x="173736" y="1042416"/>
+            <a:off x="189288" y="882675"/>
             <a:ext cx="11813422" cy="4846320"/>
           </a:xfrm>
           <a:prstGeom prst="rect">
@@ -4619,6 +4933,13 @@
   <p:clrMapOvr>
     <a:masterClrMapping/>
   </p:clrMapOvr>
+  <p:timing>
+    <p:tnLst>
+      <p:par>
+        <p:cTn id="1" dur="indefinite" restart="never" nodeType="tmRoot"/>
+      </p:par>
+    </p:tnLst>
+  </p:timing>
 </p:sld>
 </file>
 
@@ -4765,8 +5086,8 @@
         </p:nvSpPr>
         <p:spPr>
           <a:xfrm>
-            <a:off x="1362269" y="211016"/>
-            <a:ext cx="9467461" cy="4031873"/>
+            <a:off x="1287624" y="696208"/>
+            <a:ext cx="9467461" cy="4770537"/>
           </a:xfrm>
           <a:prstGeom prst="rect">
             <a:avLst/>
@@ -4796,8 +5117,26 @@
             </a:pPr>
             <a:r>
               <a:rPr lang="en-US" sz="3200" dirty="0"/>
-              <a:t>Cost-of-attendance outpacing family income.</a:t>
-            </a:r>
+              <a:t>Cost-of-attendance outpacing family </a:t>
+            </a:r>
+            <a:r>
+              <a:rPr lang="en-US" sz="3200" dirty="0" smtClean="0"/>
+              <a:t>income:</a:t>
+            </a:r>
+          </a:p>
+          <a:p>
+            <a:pPr marL="800100" lvl="1" indent="-342900">
+              <a:buFont typeface="Arial" panose="020B0604020202020204" pitchFamily="34" charset="0"/>
+              <a:buChar char="•"/>
+            </a:pPr>
+            <a:r>
+              <a:rPr lang="en-US" sz="3200" dirty="0" smtClean="0"/>
+              <a:t>16% income increase 1989 to 2018 vs tuition gains from prior charts</a:t>
+            </a:r>
+          </a:p>
+          <a:p>
+            <a:pPr lvl="1"/>
+            <a:endParaRPr lang="en-US" sz="1600" dirty="0"/>
           </a:p>
           <a:p>
             <a:pPr marL="342900" indent="-342900">
@@ -4805,25 +5144,23 @@
               <a:buChar char="•"/>
             </a:pPr>
             <a:r>
+              <a:rPr lang="en-US" sz="3200" dirty="0" smtClean="0"/>
+              <a:t>Cost, debt &amp; </a:t>
+            </a:r>
+            <a:r>
+              <a:rPr lang="en-US" sz="3200" dirty="0" smtClean="0"/>
+              <a:t>other metrics</a:t>
+            </a:r>
+            <a:r>
+              <a:rPr lang="en-US" sz="3200" dirty="0" smtClean="0"/>
+              <a:t> </a:t>
+            </a:r>
+            <a:r>
               <a:rPr lang="en-US" sz="3200" dirty="0"/>
-              <a:t>Student debt v ROI (College Scorecard)</a:t>
-            </a:r>
-          </a:p>
-          <a:p>
-            <a:pPr marL="342900" indent="-342900">
-              <a:buFont typeface="Arial" panose="020B0604020202020204" pitchFamily="34" charset="0"/>
-              <a:buChar char="•"/>
-            </a:pPr>
-            <a:r>
-              <a:rPr lang="en-US" sz="3200" dirty="0"/>
-              <a:t>Tuition discounting</a:t>
-            </a:r>
-          </a:p>
-          <a:p>
-            <a:pPr marL="342900" indent="-342900">
-              <a:buFont typeface="Arial" panose="020B0604020202020204" pitchFamily="34" charset="0"/>
-              <a:buChar char="•"/>
-            </a:pPr>
+              <a:t>(College Scorecard)</a:t>
+            </a:r>
+          </a:p>
+          <a:p>
             <a:endParaRPr lang="en-US" sz="1600" dirty="0"/>
           </a:p>
           <a:p>
@@ -4847,6 +5184,13 @@
   <p:clrMapOvr>
     <a:masterClrMapping/>
   </p:clrMapOvr>
+  <p:timing>
+    <p:tnLst>
+      <p:par>
+        <p:cTn id="1" dur="indefinite" restart="never" nodeType="tmRoot"/>
+      </p:par>
+    </p:tnLst>
+  </p:timing>
 </p:sld>
 </file>
 
@@ -4985,16 +5329,46 @@
           </a:p>
         </p:txBody>
       </p:sp>
-      <p:sp>
-        <p:nvSpPr>
-          <p:cNvPr id="7" name="TextBox 6"/>
+      <p:pic>
+        <p:nvPicPr>
+          <p:cNvPr id="3" name="Picture 2"/>
+          <p:cNvPicPr>
+            <a:picLocks noChangeAspect="1"/>
+          </p:cNvPicPr>
+          <p:nvPr/>
+        </p:nvPicPr>
+        <p:blipFill>
+          <a:blip r:embed="rId2">
+            <a:extLst>
+              <a:ext uri="{28A0092B-C50C-407E-A947-70E740481C1C}">
+                <a14:useLocalDpi xmlns:a14="http://schemas.microsoft.com/office/drawing/2010/main" val="0"/>
+              </a:ext>
+            </a:extLst>
+          </a:blip>
+          <a:stretch>
+            <a:fillRect/>
+          </a:stretch>
+        </p:blipFill>
+        <p:spPr>
+          <a:xfrm>
+            <a:off x="2127380" y="0"/>
+            <a:ext cx="7305539" cy="6126480"/>
+          </a:xfrm>
+          <a:prstGeom prst="rect">
+            <a:avLst/>
+          </a:prstGeom>
+        </p:spPr>
+      </p:pic>
+      <p:sp>
+        <p:nvSpPr>
+          <p:cNvPr id="5" name="TextBox 4"/>
           <p:cNvSpPr txBox="1"/>
           <p:nvPr/>
         </p:nvSpPr>
         <p:spPr>
           <a:xfrm>
-            <a:off x="485192" y="2288254"/>
-            <a:ext cx="11038113" cy="1754326"/>
+            <a:off x="167951" y="5369061"/>
+            <a:ext cx="2202025" cy="523220"/>
           </a:xfrm>
           <a:prstGeom prst="rect">
             <a:avLst/>
@@ -5007,31 +5381,67 @@
           </a:bodyPr>
           <a:lstStyle/>
           <a:p>
-            <a:pPr algn="ctr"/>
-            <a:r>
-              <a:rPr lang="en-US" sz="5400" dirty="0"/>
-              <a:t>Endowment &amp; Institutional </a:t>
-            </a:r>
-          </a:p>
-          <a:p>
-            <a:pPr algn="ctr"/>
-            <a:r>
-              <a:rPr lang="en-US" sz="5400" dirty="0"/>
-              <a:t>Financial Stability  </a:t>
-            </a:r>
+            <a:r>
+              <a:rPr lang="en-US" sz="1400" i="1" dirty="0" smtClean="0">
+                <a:solidFill>
+                  <a:schemeClr val="bg1">
+                    <a:lumMod val="50000"/>
+                  </a:schemeClr>
+                </a:solidFill>
+              </a:rPr>
+              <a:t>Source: College Scorecard</a:t>
+            </a:r>
+          </a:p>
+          <a:p>
+            <a:r>
+              <a:rPr lang="en-US" sz="1400" i="1" dirty="0" smtClean="0">
+                <a:solidFill>
+                  <a:schemeClr val="bg1">
+                    <a:lumMod val="50000"/>
+                  </a:schemeClr>
+                </a:solidFill>
+                <a:hlinkClick r:id="rId3"/>
+              </a:rPr>
+              <a:t>collegescorecard.ed.gov</a:t>
+            </a:r>
+            <a:r>
+              <a:rPr lang="en-US" sz="1400" i="1" dirty="0">
+                <a:solidFill>
+                  <a:schemeClr val="bg1">
+                    <a:lumMod val="50000"/>
+                  </a:schemeClr>
+                </a:solidFill>
+                <a:hlinkClick r:id="rId3"/>
+              </a:rPr>
+              <a:t>/</a:t>
+            </a:r>
+            <a:endParaRPr lang="en-US" sz="1400" i="1" dirty="0">
+              <a:solidFill>
+                <a:schemeClr val="bg1">
+                  <a:lumMod val="50000"/>
+                </a:schemeClr>
+              </a:solidFill>
+            </a:endParaRPr>
           </a:p>
         </p:txBody>
       </p:sp>
     </p:spTree>
     <p:extLst>
       <p:ext uri="{BB962C8B-B14F-4D97-AF65-F5344CB8AC3E}">
-        <p14:creationId xmlns:p14="http://schemas.microsoft.com/office/powerpoint/2010/main" val="1291214687"/>
+        <p14:creationId xmlns:p14="http://schemas.microsoft.com/office/powerpoint/2010/main" val="1534675105"/>
       </p:ext>
     </p:extLst>
   </p:cSld>
   <p:clrMapOvr>
     <a:masterClrMapping/>
   </p:clrMapOvr>
+  <p:timing>
+    <p:tnLst>
+      <p:par>
+        <p:cTn id="1" dur="indefinite" restart="never" nodeType="tmRoot"/>
+      </p:par>
+    </p:tnLst>
+  </p:timing>
 </p:sld>
 </file>
 
@@ -5170,6 +5580,36 @@
           </a:p>
         </p:txBody>
       </p:sp>
+      <p:pic>
+        <p:nvPicPr>
+          <p:cNvPr id="5" name="Picture 4"/>
+          <p:cNvPicPr>
+            <a:picLocks noChangeAspect="1"/>
+          </p:cNvPicPr>
+          <p:nvPr/>
+        </p:nvPicPr>
+        <p:blipFill>
+          <a:blip r:embed="rId2">
+            <a:extLst>
+              <a:ext uri="{28A0092B-C50C-407E-A947-70E740481C1C}">
+                <a14:useLocalDpi xmlns:a14="http://schemas.microsoft.com/office/drawing/2010/main" val="0"/>
+              </a:ext>
+            </a:extLst>
+          </a:blip>
+          <a:stretch>
+            <a:fillRect/>
+          </a:stretch>
+        </p:blipFill>
+        <p:spPr>
+          <a:xfrm>
+            <a:off x="2130552" y="0"/>
+            <a:ext cx="8040034" cy="6190488"/>
+          </a:xfrm>
+          <a:prstGeom prst="rect">
+            <a:avLst/>
+          </a:prstGeom>
+        </p:spPr>
+      </p:pic>
       <p:sp>
         <p:nvSpPr>
           <p:cNvPr id="7" name="TextBox 6"/>
@@ -5178,8 +5618,8 @@
         </p:nvSpPr>
         <p:spPr>
           <a:xfrm>
-            <a:off x="485192" y="2288254"/>
-            <a:ext cx="11038113" cy="1754326"/>
+            <a:off x="10201688" y="5282886"/>
+            <a:ext cx="1865904" cy="830997"/>
           </a:xfrm>
           <a:prstGeom prst="rect">
             <a:avLst/>
@@ -5192,24 +5632,109 @@
           </a:bodyPr>
           <a:lstStyle/>
           <a:p>
-            <a:pPr algn="ctr"/>
-            <a:r>
-              <a:rPr lang="en-US" sz="5400" dirty="0"/>
-              <a:t>Chart with endowment or endowment payout per enrolled student</a:t>
-            </a:r>
+            <a:r>
+              <a:rPr lang="en-US" sz="1600" dirty="0" smtClean="0">
+                <a:solidFill>
+                  <a:schemeClr val="bg1">
+                    <a:lumMod val="50000"/>
+                  </a:schemeClr>
+                </a:solidFill>
+              </a:rPr>
+              <a:t>Students graduating within 200% of expected time</a:t>
+            </a:r>
+            <a:endParaRPr lang="en-US" sz="1600" dirty="0">
+              <a:solidFill>
+                <a:schemeClr val="bg1">
+                  <a:lumMod val="50000"/>
+                </a:schemeClr>
+              </a:solidFill>
+            </a:endParaRPr>
+          </a:p>
+        </p:txBody>
+      </p:sp>
+      <p:sp>
+        <p:nvSpPr>
+          <p:cNvPr id="8" name="TextBox 7"/>
+          <p:cNvSpPr txBox="1"/>
+          <p:nvPr/>
+        </p:nvSpPr>
+        <p:spPr>
+          <a:xfrm>
+            <a:off x="167951" y="5369061"/>
+            <a:ext cx="2202025" cy="523220"/>
+          </a:xfrm>
+          <a:prstGeom prst="rect">
+            <a:avLst/>
+          </a:prstGeom>
+          <a:noFill/>
+        </p:spPr>
+        <p:txBody>
+          <a:bodyPr wrap="square" rtlCol="0">
+            <a:spAutoFit/>
+          </a:bodyPr>
+          <a:lstStyle/>
+          <a:p>
+            <a:r>
+              <a:rPr lang="en-US" sz="1400" i="1" dirty="0" smtClean="0">
+                <a:solidFill>
+                  <a:schemeClr val="bg1">
+                    <a:lumMod val="50000"/>
+                  </a:schemeClr>
+                </a:solidFill>
+              </a:rPr>
+              <a:t>Source: College Scorecard</a:t>
+            </a:r>
+          </a:p>
+          <a:p>
+            <a:r>
+              <a:rPr lang="en-US" sz="1400" i="1" dirty="0" smtClean="0">
+                <a:solidFill>
+                  <a:schemeClr val="bg1">
+                    <a:lumMod val="50000"/>
+                  </a:schemeClr>
+                </a:solidFill>
+                <a:hlinkClick r:id="rId3"/>
+              </a:rPr>
+              <a:t>collegescorecard.ed.gov</a:t>
+            </a:r>
+            <a:r>
+              <a:rPr lang="en-US" sz="1400" i="1" dirty="0">
+                <a:solidFill>
+                  <a:schemeClr val="bg1">
+                    <a:lumMod val="50000"/>
+                  </a:schemeClr>
+                </a:solidFill>
+                <a:hlinkClick r:id="rId3"/>
+              </a:rPr>
+              <a:t>/</a:t>
+            </a:r>
+            <a:endParaRPr lang="en-US" sz="1400" i="1" dirty="0">
+              <a:solidFill>
+                <a:schemeClr val="bg1">
+                  <a:lumMod val="50000"/>
+                </a:schemeClr>
+              </a:solidFill>
+            </a:endParaRPr>
           </a:p>
         </p:txBody>
       </p:sp>
     </p:spTree>
     <p:extLst>
       <p:ext uri="{BB962C8B-B14F-4D97-AF65-F5344CB8AC3E}">
-        <p14:creationId xmlns:p14="http://schemas.microsoft.com/office/powerpoint/2010/main" val="4122689334"/>
+        <p14:creationId xmlns:p14="http://schemas.microsoft.com/office/powerpoint/2010/main" val="2828594854"/>
       </p:ext>
     </p:extLst>
   </p:cSld>
   <p:clrMapOvr>
     <a:masterClrMapping/>
   </p:clrMapOvr>
+  <p:timing>
+    <p:tnLst>
+      <p:par>
+        <p:cTn id="1" dur="indefinite" restart="never" nodeType="tmRoot"/>
+      </p:par>
+    </p:tnLst>
+  </p:timing>
 </p:sld>
 </file>
 
@@ -5348,6 +5873,36 @@
           </a:p>
         </p:txBody>
       </p:sp>
+      <p:pic>
+        <p:nvPicPr>
+          <p:cNvPr id="5" name="Picture 4"/>
+          <p:cNvPicPr>
+            <a:picLocks noChangeAspect="1"/>
+          </p:cNvPicPr>
+          <p:nvPr/>
+        </p:nvPicPr>
+        <p:blipFill>
+          <a:blip r:embed="rId2">
+            <a:extLst>
+              <a:ext uri="{28A0092B-C50C-407E-A947-70E740481C1C}">
+                <a14:useLocalDpi xmlns:a14="http://schemas.microsoft.com/office/drawing/2010/main" val="0"/>
+              </a:ext>
+            </a:extLst>
+          </a:blip>
+          <a:stretch>
+            <a:fillRect/>
+          </a:stretch>
+        </p:blipFill>
+        <p:spPr>
+          <a:xfrm>
+            <a:off x="2286000" y="91440"/>
+            <a:ext cx="6909509" cy="6126480"/>
+          </a:xfrm>
+          <a:prstGeom prst="rect">
+            <a:avLst/>
+          </a:prstGeom>
+        </p:spPr>
+      </p:pic>
       <p:sp>
         <p:nvSpPr>
           <p:cNvPr id="7" name="TextBox 6"/>
@@ -5356,8 +5911,8 @@
         </p:nvSpPr>
         <p:spPr>
           <a:xfrm>
-            <a:off x="485192" y="2288254"/>
-            <a:ext cx="11038113" cy="923330"/>
+            <a:off x="83975" y="5369061"/>
+            <a:ext cx="2202025" cy="523220"/>
           </a:xfrm>
           <a:prstGeom prst="rect">
             <a:avLst/>
@@ -5370,24 +5925,67 @@
           </a:bodyPr>
           <a:lstStyle/>
           <a:p>
-            <a:pPr algn="ctr"/>
-            <a:r>
-              <a:rPr lang="en-US" sz="5400" dirty="0"/>
-              <a:t>Social &amp; political trends</a:t>
-            </a:r>
+            <a:r>
+              <a:rPr lang="en-US" sz="1400" i="1" dirty="0" smtClean="0">
+                <a:solidFill>
+                  <a:schemeClr val="bg1">
+                    <a:lumMod val="50000"/>
+                  </a:schemeClr>
+                </a:solidFill>
+              </a:rPr>
+              <a:t>Source: College Scorecard</a:t>
+            </a:r>
+          </a:p>
+          <a:p>
+            <a:r>
+              <a:rPr lang="en-US" sz="1400" i="1" dirty="0" smtClean="0">
+                <a:solidFill>
+                  <a:schemeClr val="bg1">
+                    <a:lumMod val="50000"/>
+                  </a:schemeClr>
+                </a:solidFill>
+                <a:hlinkClick r:id="rId3"/>
+              </a:rPr>
+              <a:t>collegescorecard.ed.gov</a:t>
+            </a:r>
+            <a:r>
+              <a:rPr lang="en-US" sz="1400" i="1" dirty="0">
+                <a:solidFill>
+                  <a:schemeClr val="bg1">
+                    <a:lumMod val="50000"/>
+                  </a:schemeClr>
+                </a:solidFill>
+                <a:hlinkClick r:id="rId3"/>
+              </a:rPr>
+              <a:t>/</a:t>
+            </a:r>
+            <a:endParaRPr lang="en-US" sz="1400" i="1" dirty="0">
+              <a:solidFill>
+                <a:schemeClr val="bg1">
+                  <a:lumMod val="50000"/>
+                </a:schemeClr>
+              </a:solidFill>
+            </a:endParaRPr>
           </a:p>
         </p:txBody>
       </p:sp>
     </p:spTree>
     <p:extLst>
       <p:ext uri="{BB962C8B-B14F-4D97-AF65-F5344CB8AC3E}">
-        <p14:creationId xmlns:p14="http://schemas.microsoft.com/office/powerpoint/2010/main" val="2515461501"/>
+        <p14:creationId xmlns:p14="http://schemas.microsoft.com/office/powerpoint/2010/main" val="1969692107"/>
       </p:ext>
     </p:extLst>
   </p:cSld>
   <p:clrMapOvr>
     <a:masterClrMapping/>
   </p:clrMapOvr>
+  <p:timing>
+    <p:tnLst>
+      <p:par>
+        <p:cTn id="1" dur="indefinite" restart="never" nodeType="tmRoot"/>
+      </p:par>
+    </p:tnLst>
+  </p:timing>
 </p:sld>
 </file>
 
@@ -5798,6 +6396,13 @@
   <p:clrMapOvr>
     <a:masterClrMapping/>
   </p:clrMapOvr>
+  <p:timing>
+    <p:tnLst>
+      <p:par>
+        <p:cTn id="1" dur="indefinite" restart="never" nodeType="tmRoot"/>
+      </p:par>
+    </p:tnLst>
+  </p:timing>
 </p:sld>
 </file>
 
@@ -5936,6 +6541,36 @@
           </a:p>
         </p:txBody>
       </p:sp>
+      <p:pic>
+        <p:nvPicPr>
+          <p:cNvPr id="3" name="Picture 2"/>
+          <p:cNvPicPr>
+            <a:picLocks noChangeAspect="1"/>
+          </p:cNvPicPr>
+          <p:nvPr/>
+        </p:nvPicPr>
+        <p:blipFill>
+          <a:blip r:embed="rId2">
+            <a:extLst>
+              <a:ext uri="{28A0092B-C50C-407E-A947-70E740481C1C}">
+                <a14:useLocalDpi xmlns:a14="http://schemas.microsoft.com/office/drawing/2010/main" val="0"/>
+              </a:ext>
+            </a:extLst>
+          </a:blip>
+          <a:stretch>
+            <a:fillRect/>
+          </a:stretch>
+        </p:blipFill>
+        <p:spPr>
+          <a:xfrm>
+            <a:off x="2130552" y="91440"/>
+            <a:ext cx="6868865" cy="6126480"/>
+          </a:xfrm>
+          <a:prstGeom prst="rect">
+            <a:avLst/>
+          </a:prstGeom>
+        </p:spPr>
+      </p:pic>
       <p:sp>
         <p:nvSpPr>
           <p:cNvPr id="7" name="TextBox 6"/>
@@ -5944,8 +6579,8 @@
         </p:nvSpPr>
         <p:spPr>
           <a:xfrm>
-            <a:off x="576943" y="795791"/>
-            <a:ext cx="11038113" cy="4524315"/>
+            <a:off x="121298" y="5369061"/>
+            <a:ext cx="2202025" cy="523220"/>
           </a:xfrm>
           <a:prstGeom prst="rect">
             <a:avLst/>
@@ -5959,49 +6594,66 @@
           <a:lstStyle/>
           <a:p>
             <a:r>
-              <a:rPr lang="en-US" sz="3200" dirty="0"/>
-              <a:t>International student enrollment – immigration policy, </a:t>
-            </a:r>
-          </a:p>
-          <a:p>
-            <a:endParaRPr lang="en-US" sz="3200" dirty="0"/>
-          </a:p>
-          <a:p>
-            <a:r>
-              <a:rPr lang="en-US" sz="3200" dirty="0"/>
-              <a:t>Cost of attendance, especially for publics. What happens if next recession is as bad as 2008-09</a:t>
-            </a:r>
-          </a:p>
-          <a:p>
-            <a:endParaRPr lang="en-US" sz="3200" dirty="0"/>
-          </a:p>
-          <a:p>
-            <a:r>
-              <a:rPr lang="en-US" sz="3200" dirty="0"/>
-              <a:t>For public institutions relying on International &amp; out-of-state, is there a maximum cost-of-attendance point </a:t>
-            </a:r>
-          </a:p>
-          <a:p>
-            <a:endParaRPr lang="en-US" sz="3200" dirty="0"/>
-          </a:p>
-          <a:p>
-            <a:r>
-              <a:rPr lang="en-US" sz="3200" dirty="0"/>
-              <a:t>Competition from boot-camp and other credentialing programs</a:t>
-            </a:r>
+              <a:rPr lang="en-US" sz="1400" i="1" dirty="0" smtClean="0">
+                <a:solidFill>
+                  <a:schemeClr val="bg1">
+                    <a:lumMod val="50000"/>
+                  </a:schemeClr>
+                </a:solidFill>
+              </a:rPr>
+              <a:t>Source: College Scorecard</a:t>
+            </a:r>
+          </a:p>
+          <a:p>
+            <a:r>
+              <a:rPr lang="en-US" sz="1400" i="1" dirty="0" smtClean="0">
+                <a:solidFill>
+                  <a:schemeClr val="bg1">
+                    <a:lumMod val="50000"/>
+                  </a:schemeClr>
+                </a:solidFill>
+                <a:hlinkClick r:id="rId3"/>
+              </a:rPr>
+              <a:t>collegescorecard.ed.gov</a:t>
+            </a:r>
+            <a:r>
+              <a:rPr lang="en-US" sz="1400" i="1" dirty="0">
+                <a:solidFill>
+                  <a:schemeClr val="bg1">
+                    <a:lumMod val="50000"/>
+                  </a:schemeClr>
+                </a:solidFill>
+                <a:hlinkClick r:id="rId3"/>
+              </a:rPr>
+              <a:t>/</a:t>
+            </a:r>
+            <a:endParaRPr lang="en-US" sz="1400" i="1" dirty="0">
+              <a:solidFill>
+                <a:schemeClr val="bg1">
+                  <a:lumMod val="50000"/>
+                </a:schemeClr>
+              </a:solidFill>
+            </a:endParaRPr>
           </a:p>
         </p:txBody>
       </p:sp>
     </p:spTree>
     <p:extLst>
       <p:ext uri="{BB962C8B-B14F-4D97-AF65-F5344CB8AC3E}">
-        <p14:creationId xmlns:p14="http://schemas.microsoft.com/office/powerpoint/2010/main" val="651822648"/>
+        <p14:creationId xmlns:p14="http://schemas.microsoft.com/office/powerpoint/2010/main" val="598771672"/>
       </p:ext>
     </p:extLst>
   </p:cSld>
   <p:clrMapOvr>
     <a:masterClrMapping/>
   </p:clrMapOvr>
+  <p:timing>
+    <p:tnLst>
+      <p:par>
+        <p:cTn id="1" dur="indefinite" restart="never" nodeType="tmRoot"/>
+      </p:par>
+    </p:tnLst>
+  </p:timing>
 </p:sld>
 </file>
 
@@ -6032,19 +6684,14 @@
             <p:ph type="ctrTitle"/>
           </p:nvPr>
         </p:nvSpPr>
-        <p:spPr>
-          <a:xfrm>
-            <a:off x="606489" y="2146040"/>
-            <a:ext cx="10453396" cy="981367"/>
-          </a:xfrm>
-        </p:spPr>
+        <p:spPr/>
         <p:txBody>
           <a:bodyPr/>
           <a:lstStyle/>
           <a:p>
             <a:r>
               <a:rPr lang="en-US" dirty="0"/>
-              <a:t>What questions do you have?</a:t>
+              <a:t>	</a:t>
             </a:r>
           </a:p>
         </p:txBody>
@@ -6145,16 +6792,53 @@
           </a:p>
         </p:txBody>
       </p:sp>
+      <p:sp>
+        <p:nvSpPr>
+          <p:cNvPr id="7" name="TextBox 6"/>
+          <p:cNvSpPr txBox="1"/>
+          <p:nvPr/>
+        </p:nvSpPr>
+        <p:spPr>
+          <a:xfrm>
+            <a:off x="485192" y="2288254"/>
+            <a:ext cx="11038113" cy="923330"/>
+          </a:xfrm>
+          <a:prstGeom prst="rect">
+            <a:avLst/>
+          </a:prstGeom>
+          <a:noFill/>
+        </p:spPr>
+        <p:txBody>
+          <a:bodyPr wrap="square" rtlCol="0">
+            <a:spAutoFit/>
+          </a:bodyPr>
+          <a:lstStyle/>
+          <a:p>
+            <a:pPr algn="ctr"/>
+            <a:r>
+              <a:rPr lang="en-US" sz="5400" dirty="0"/>
+              <a:t>Social &amp; political trends</a:t>
+            </a:r>
+          </a:p>
+        </p:txBody>
+      </p:sp>
     </p:spTree>
     <p:extLst>
       <p:ext uri="{BB962C8B-B14F-4D97-AF65-F5344CB8AC3E}">
-        <p14:creationId xmlns:p14="http://schemas.microsoft.com/office/powerpoint/2010/main" val="367660017"/>
+        <p14:creationId xmlns:p14="http://schemas.microsoft.com/office/powerpoint/2010/main" val="2515461501"/>
       </p:ext>
     </p:extLst>
   </p:cSld>
   <p:clrMapOvr>
     <a:masterClrMapping/>
   </p:clrMapOvr>
+  <p:timing>
+    <p:tnLst>
+      <p:par>
+        <p:cTn id="1" dur="indefinite" restart="never" nodeType="tmRoot"/>
+      </p:par>
+    </p:tnLst>
+  </p:timing>
 </p:sld>
 </file>
 
@@ -6301,6 +6985,1306 @@
         </p:nvSpPr>
         <p:spPr>
           <a:xfrm>
+            <a:off x="487524" y="450557"/>
+            <a:ext cx="11216951" cy="5509200"/>
+          </a:xfrm>
+          <a:prstGeom prst="rect">
+            <a:avLst/>
+          </a:prstGeom>
+          <a:noFill/>
+        </p:spPr>
+        <p:txBody>
+          <a:bodyPr wrap="square" rtlCol="0">
+            <a:spAutoFit/>
+          </a:bodyPr>
+          <a:lstStyle/>
+          <a:p>
+            <a:pPr marL="457200" indent="-457200">
+              <a:buFont typeface="Arial" panose="020B0604020202020204" pitchFamily="34" charset="0"/>
+              <a:buChar char="•"/>
+            </a:pPr>
+            <a:r>
+              <a:rPr lang="en-US" sz="3200" dirty="0"/>
+              <a:t>International student enrollment – immigration </a:t>
+            </a:r>
+            <a:r>
+              <a:rPr lang="en-US" sz="3200" dirty="0" smtClean="0"/>
+              <a:t>policy</a:t>
+            </a:r>
+            <a:r>
+              <a:rPr lang="en-US" sz="3200" dirty="0"/>
+              <a:t> </a:t>
+            </a:r>
+            <a:r>
+              <a:rPr lang="en-US" sz="3200" dirty="0" smtClean="0"/>
+              <a:t>&amp; climate</a:t>
+            </a:r>
+            <a:r>
+              <a:rPr lang="en-US" sz="3200" dirty="0" smtClean="0"/>
+              <a:t> </a:t>
+            </a:r>
+            <a:endParaRPr lang="en-US" sz="3200" dirty="0"/>
+          </a:p>
+          <a:p>
+            <a:pPr marL="457200" indent="-457200">
+              <a:buFont typeface="Arial" panose="020B0604020202020204" pitchFamily="34" charset="0"/>
+              <a:buChar char="•"/>
+            </a:pPr>
+            <a:endParaRPr lang="en-US" sz="3200" dirty="0"/>
+          </a:p>
+          <a:p>
+            <a:pPr marL="457200" indent="-457200">
+              <a:buFont typeface="Arial" panose="020B0604020202020204" pitchFamily="34" charset="0"/>
+              <a:buChar char="•"/>
+            </a:pPr>
+            <a:r>
+              <a:rPr lang="en-US" sz="3200" dirty="0"/>
+              <a:t>Cost of attendance, especially for publics. What happens </a:t>
+            </a:r>
+            <a:r>
+              <a:rPr lang="en-US" sz="3200" dirty="0" smtClean="0"/>
+              <a:t>to appropriations if </a:t>
+            </a:r>
+            <a:r>
+              <a:rPr lang="en-US" sz="3200" dirty="0"/>
+              <a:t>next recession is as bad as </a:t>
+            </a:r>
+            <a:r>
+              <a:rPr lang="en-US" sz="3200" dirty="0" smtClean="0"/>
+              <a:t>2008-09</a:t>
+            </a:r>
+          </a:p>
+          <a:p>
+            <a:pPr marL="457200" indent="-457200">
+              <a:buFont typeface="Arial" panose="020B0604020202020204" pitchFamily="34" charset="0"/>
+              <a:buChar char="•"/>
+            </a:pPr>
+            <a:endParaRPr lang="en-US" sz="3200" dirty="0" smtClean="0"/>
+          </a:p>
+          <a:p>
+            <a:pPr marL="457200" indent="-457200">
+              <a:buFont typeface="Arial" panose="020B0604020202020204" pitchFamily="34" charset="0"/>
+              <a:buChar char="•"/>
+            </a:pPr>
+            <a:r>
+              <a:rPr lang="en-US" sz="3200" dirty="0" smtClean="0"/>
+              <a:t>For privates, what happens to demand in a tight economy</a:t>
+            </a:r>
+            <a:endParaRPr lang="en-US" sz="3200" dirty="0"/>
+          </a:p>
+          <a:p>
+            <a:pPr marL="457200" indent="-457200">
+              <a:buFont typeface="Arial" panose="020B0604020202020204" pitchFamily="34" charset="0"/>
+              <a:buChar char="•"/>
+            </a:pPr>
+            <a:endParaRPr lang="en-US" sz="3200" dirty="0"/>
+          </a:p>
+          <a:p>
+            <a:pPr marL="457200" indent="-457200">
+              <a:buFont typeface="Arial" panose="020B0604020202020204" pitchFamily="34" charset="0"/>
+              <a:buChar char="•"/>
+            </a:pPr>
+            <a:r>
+              <a:rPr lang="en-US" sz="3200" dirty="0"/>
+              <a:t>For public institutions relying on International &amp; out-of-state, is there a maximum cost-of-attendance point </a:t>
+            </a:r>
+          </a:p>
+          <a:p>
+            <a:pPr marL="457200" indent="-457200">
+              <a:buFont typeface="Arial" panose="020B0604020202020204" pitchFamily="34" charset="0"/>
+              <a:buChar char="•"/>
+            </a:pPr>
+            <a:endParaRPr lang="en-US" sz="3200" dirty="0"/>
+          </a:p>
+          <a:p>
+            <a:pPr marL="457200" indent="-457200">
+              <a:buFont typeface="Arial" panose="020B0604020202020204" pitchFamily="34" charset="0"/>
+              <a:buChar char="•"/>
+            </a:pPr>
+            <a:r>
+              <a:rPr lang="en-US" sz="3200" dirty="0"/>
+              <a:t>Competition from boot-camp and other credentialing programs</a:t>
+            </a:r>
+          </a:p>
+        </p:txBody>
+      </p:sp>
+    </p:spTree>
+    <p:extLst>
+      <p:ext uri="{BB962C8B-B14F-4D97-AF65-F5344CB8AC3E}">
+        <p14:creationId xmlns:p14="http://schemas.microsoft.com/office/powerpoint/2010/main" val="651822648"/>
+      </p:ext>
+    </p:extLst>
+  </p:cSld>
+  <p:clrMapOvr>
+    <a:masterClrMapping/>
+  </p:clrMapOvr>
+  <p:timing>
+    <p:tnLst>
+      <p:par>
+        <p:cTn id="1" dur="indefinite" restart="never" nodeType="tmRoot">
+          <p:childTnLst>
+            <p:seq concurrent="1" nextAc="seek">
+              <p:cTn id="2" dur="indefinite" nodeType="mainSeq">
+                <p:childTnLst>
+                  <p:par>
+                    <p:cTn id="3" fill="hold">
+                      <p:stCondLst>
+                        <p:cond delay="indefinite"/>
+                      </p:stCondLst>
+                      <p:childTnLst>
+                        <p:par>
+                          <p:cTn id="4" fill="hold">
+                            <p:stCondLst>
+                              <p:cond delay="0"/>
+                            </p:stCondLst>
+                            <p:childTnLst>
+                              <p:par>
+                                <p:cTn id="5" presetID="1" presetClass="entr" presetSubtype="0" fill="hold" nodeType="clickEffect">
+                                  <p:stCondLst>
+                                    <p:cond delay="0"/>
+                                  </p:stCondLst>
+                                  <p:childTnLst>
+                                    <p:set>
+                                      <p:cBhvr>
+                                        <p:cTn id="6" dur="1" fill="hold">
+                                          <p:stCondLst>
+                                            <p:cond delay="0"/>
+                                          </p:stCondLst>
+                                        </p:cTn>
+                                        <p:tgtEl>
+                                          <p:spTgt spid="7">
+                                            <p:txEl>
+                                              <p:pRg st="2" end="2"/>
+                                            </p:txEl>
+                                          </p:spTgt>
+                                        </p:tgtEl>
+                                        <p:attrNameLst>
+                                          <p:attrName>style.visibility</p:attrName>
+                                        </p:attrNameLst>
+                                      </p:cBhvr>
+                                      <p:to>
+                                        <p:strVal val="visible"/>
+                                      </p:to>
+                                    </p:set>
+                                  </p:childTnLst>
+                                </p:cTn>
+                              </p:par>
+                            </p:childTnLst>
+                          </p:cTn>
+                        </p:par>
+                      </p:childTnLst>
+                    </p:cTn>
+                  </p:par>
+                  <p:par>
+                    <p:cTn id="7" fill="hold">
+                      <p:stCondLst>
+                        <p:cond delay="indefinite"/>
+                      </p:stCondLst>
+                      <p:childTnLst>
+                        <p:par>
+                          <p:cTn id="8" fill="hold">
+                            <p:stCondLst>
+                              <p:cond delay="0"/>
+                            </p:stCondLst>
+                            <p:childTnLst>
+                              <p:par>
+                                <p:cTn id="9" presetID="1" presetClass="entr" presetSubtype="0" fill="hold" nodeType="clickEffect">
+                                  <p:stCondLst>
+                                    <p:cond delay="0"/>
+                                  </p:stCondLst>
+                                  <p:childTnLst>
+                                    <p:set>
+                                      <p:cBhvr>
+                                        <p:cTn id="10" dur="1" fill="hold">
+                                          <p:stCondLst>
+                                            <p:cond delay="0"/>
+                                          </p:stCondLst>
+                                        </p:cTn>
+                                        <p:tgtEl>
+                                          <p:spTgt spid="7">
+                                            <p:txEl>
+                                              <p:pRg st="4" end="4"/>
+                                            </p:txEl>
+                                          </p:spTgt>
+                                        </p:tgtEl>
+                                        <p:attrNameLst>
+                                          <p:attrName>style.visibility</p:attrName>
+                                        </p:attrNameLst>
+                                      </p:cBhvr>
+                                      <p:to>
+                                        <p:strVal val="visible"/>
+                                      </p:to>
+                                    </p:set>
+                                  </p:childTnLst>
+                                </p:cTn>
+                              </p:par>
+                            </p:childTnLst>
+                          </p:cTn>
+                        </p:par>
+                      </p:childTnLst>
+                    </p:cTn>
+                  </p:par>
+                  <p:par>
+                    <p:cTn id="11" fill="hold">
+                      <p:stCondLst>
+                        <p:cond delay="indefinite"/>
+                      </p:stCondLst>
+                      <p:childTnLst>
+                        <p:par>
+                          <p:cTn id="12" fill="hold">
+                            <p:stCondLst>
+                              <p:cond delay="0"/>
+                            </p:stCondLst>
+                            <p:childTnLst>
+                              <p:par>
+                                <p:cTn id="13" presetID="1" presetClass="entr" presetSubtype="0" fill="hold" nodeType="clickEffect">
+                                  <p:stCondLst>
+                                    <p:cond delay="0"/>
+                                  </p:stCondLst>
+                                  <p:childTnLst>
+                                    <p:set>
+                                      <p:cBhvr>
+                                        <p:cTn id="14" dur="1" fill="hold">
+                                          <p:stCondLst>
+                                            <p:cond delay="0"/>
+                                          </p:stCondLst>
+                                        </p:cTn>
+                                        <p:tgtEl>
+                                          <p:spTgt spid="7">
+                                            <p:txEl>
+                                              <p:pRg st="6" end="6"/>
+                                            </p:txEl>
+                                          </p:spTgt>
+                                        </p:tgtEl>
+                                        <p:attrNameLst>
+                                          <p:attrName>style.visibility</p:attrName>
+                                        </p:attrNameLst>
+                                      </p:cBhvr>
+                                      <p:to>
+                                        <p:strVal val="visible"/>
+                                      </p:to>
+                                    </p:set>
+                                  </p:childTnLst>
+                                </p:cTn>
+                              </p:par>
+                            </p:childTnLst>
+                          </p:cTn>
+                        </p:par>
+                      </p:childTnLst>
+                    </p:cTn>
+                  </p:par>
+                  <p:par>
+                    <p:cTn id="15" fill="hold">
+                      <p:stCondLst>
+                        <p:cond delay="indefinite"/>
+                      </p:stCondLst>
+                      <p:childTnLst>
+                        <p:par>
+                          <p:cTn id="16" fill="hold">
+                            <p:stCondLst>
+                              <p:cond delay="0"/>
+                            </p:stCondLst>
+                            <p:childTnLst>
+                              <p:par>
+                                <p:cTn id="17" presetID="1" presetClass="entr" presetSubtype="0" fill="hold" nodeType="clickEffect">
+                                  <p:stCondLst>
+                                    <p:cond delay="0"/>
+                                  </p:stCondLst>
+                                  <p:childTnLst>
+                                    <p:set>
+                                      <p:cBhvr>
+                                        <p:cTn id="18" dur="1" fill="hold">
+                                          <p:stCondLst>
+                                            <p:cond delay="0"/>
+                                          </p:stCondLst>
+                                        </p:cTn>
+                                        <p:tgtEl>
+                                          <p:spTgt spid="7">
+                                            <p:txEl>
+                                              <p:pRg st="8" end="8"/>
+                                            </p:txEl>
+                                          </p:spTgt>
+                                        </p:tgtEl>
+                                        <p:attrNameLst>
+                                          <p:attrName>style.visibility</p:attrName>
+                                        </p:attrNameLst>
+                                      </p:cBhvr>
+                                      <p:to>
+                                        <p:strVal val="visible"/>
+                                      </p:to>
+                                    </p:set>
+                                  </p:childTnLst>
+                                </p:cTn>
+                              </p:par>
+                            </p:childTnLst>
+                          </p:cTn>
+                        </p:par>
+                      </p:childTnLst>
+                    </p:cTn>
+                  </p:par>
+                </p:childTnLst>
+              </p:cTn>
+              <p:prevCondLst>
+                <p:cond evt="onPrev" delay="0">
+                  <p:tgtEl>
+                    <p:sldTgt/>
+                  </p:tgtEl>
+                </p:cond>
+              </p:prevCondLst>
+              <p:nextCondLst>
+                <p:cond evt="onNext" delay="0">
+                  <p:tgtEl>
+                    <p:sldTgt/>
+                  </p:tgtEl>
+                </p:cond>
+              </p:nextCondLst>
+            </p:seq>
+          </p:childTnLst>
+        </p:cTn>
+      </p:par>
+    </p:tnLst>
+  </p:timing>
+</p:sld>
+</file>
+
+<file path=ppt/slides/slide23.xml><?xml version="1.0" encoding="utf-8"?>
+<p:sld xmlns:a="http://schemas.openxmlformats.org/drawingml/2006/main" xmlns:r="http://schemas.openxmlformats.org/officeDocument/2006/relationships" xmlns:p="http://schemas.openxmlformats.org/presentationml/2006/main">
+  <p:cSld>
+    <p:spTree>
+      <p:nvGrpSpPr>
+        <p:cNvPr id="1" name=""/>
+        <p:cNvGrpSpPr/>
+        <p:nvPr/>
+      </p:nvGrpSpPr>
+      <p:grpSpPr>
+        <a:xfrm>
+          <a:off x="0" y="0"/>
+          <a:ext cx="0" cy="0"/>
+          <a:chOff x="0" y="0"/>
+          <a:chExt cx="0" cy="0"/>
+        </a:xfrm>
+      </p:grpSpPr>
+      <p:sp>
+        <p:nvSpPr>
+          <p:cNvPr id="2" name="Title 1"/>
+          <p:cNvSpPr>
+            <a:spLocks noGrp="1"/>
+          </p:cNvSpPr>
+          <p:nvPr>
+            <p:ph type="ctrTitle"/>
+          </p:nvPr>
+        </p:nvSpPr>
+        <p:spPr/>
+        <p:txBody>
+          <a:bodyPr/>
+          <a:lstStyle/>
+          <a:p>
+            <a:r>
+              <a:rPr lang="en-US" dirty="0"/>
+              <a:t>	</a:t>
+            </a:r>
+          </a:p>
+        </p:txBody>
+      </p:sp>
+      <p:sp>
+        <p:nvSpPr>
+          <p:cNvPr id="4" name="Rectangle 3"/>
+          <p:cNvSpPr/>
+          <p:nvPr/>
+        </p:nvSpPr>
+        <p:spPr>
+          <a:xfrm>
+            <a:off x="0" y="6428792"/>
+            <a:ext cx="12192000" cy="419878"/>
+          </a:xfrm>
+          <a:prstGeom prst="rect">
+            <a:avLst/>
+          </a:prstGeom>
+          <a:solidFill>
+            <a:srgbClr val="FDBB30"/>
+          </a:solidFill>
+          <a:ln>
+            <a:solidFill>
+              <a:schemeClr val="tx1"/>
+            </a:solidFill>
+          </a:ln>
+        </p:spPr>
+        <p:style>
+          <a:lnRef idx="2">
+            <a:schemeClr val="accent1">
+              <a:shade val="50000"/>
+            </a:schemeClr>
+          </a:lnRef>
+          <a:fillRef idx="1">
+            <a:schemeClr val="accent1"/>
+          </a:fillRef>
+          <a:effectRef idx="0">
+            <a:schemeClr val="accent1"/>
+          </a:effectRef>
+          <a:fontRef idx="minor">
+            <a:schemeClr val="lt1"/>
+          </a:fontRef>
+        </p:style>
+        <p:txBody>
+          <a:bodyPr rtlCol="0" anchor="ctr"/>
+          <a:lstStyle/>
+          <a:p>
+            <a:pPr algn="ctr"/>
+            <a:endParaRPr lang="en-US"/>
+          </a:p>
+        </p:txBody>
+      </p:sp>
+      <p:sp>
+        <p:nvSpPr>
+          <p:cNvPr id="6" name="Rectangle 5"/>
+          <p:cNvSpPr/>
+          <p:nvPr/>
+        </p:nvSpPr>
+        <p:spPr>
+          <a:xfrm>
+            <a:off x="0" y="6218853"/>
+            <a:ext cx="12192000" cy="303245"/>
+          </a:xfrm>
+          <a:prstGeom prst="rect">
+            <a:avLst/>
+          </a:prstGeom>
+          <a:solidFill>
+            <a:srgbClr val="00543C"/>
+          </a:solidFill>
+          <a:ln>
+            <a:solidFill>
+              <a:schemeClr val="tx1"/>
+            </a:solidFill>
+          </a:ln>
+        </p:spPr>
+        <p:style>
+          <a:lnRef idx="2">
+            <a:schemeClr val="accent1">
+              <a:shade val="50000"/>
+            </a:schemeClr>
+          </a:lnRef>
+          <a:fillRef idx="1">
+            <a:schemeClr val="accent1"/>
+          </a:fillRef>
+          <a:effectRef idx="0">
+            <a:schemeClr val="accent1"/>
+          </a:effectRef>
+          <a:fontRef idx="minor">
+            <a:schemeClr val="lt1"/>
+          </a:fontRef>
+        </p:style>
+        <p:txBody>
+          <a:bodyPr rtlCol="0" anchor="ctr"/>
+          <a:lstStyle/>
+          <a:p>
+            <a:pPr algn="ctr"/>
+            <a:endParaRPr lang="en-US"/>
+          </a:p>
+        </p:txBody>
+      </p:sp>
+      <p:sp>
+        <p:nvSpPr>
+          <p:cNvPr id="7" name="TextBox 6"/>
+          <p:cNvSpPr txBox="1"/>
+          <p:nvPr/>
+        </p:nvSpPr>
+        <p:spPr>
+          <a:xfrm>
+            <a:off x="485192" y="2288254"/>
+            <a:ext cx="11038113" cy="923330"/>
+          </a:xfrm>
+          <a:prstGeom prst="rect">
+            <a:avLst/>
+          </a:prstGeom>
+          <a:noFill/>
+        </p:spPr>
+        <p:txBody>
+          <a:bodyPr wrap="square" rtlCol="0">
+            <a:spAutoFit/>
+          </a:bodyPr>
+          <a:lstStyle/>
+          <a:p>
+            <a:pPr algn="ctr"/>
+            <a:r>
+              <a:rPr lang="en-US" sz="5400" dirty="0" smtClean="0"/>
+              <a:t>Further Discussion</a:t>
+            </a:r>
+            <a:endParaRPr lang="en-US" sz="5400" dirty="0"/>
+          </a:p>
+        </p:txBody>
+      </p:sp>
+      <p:sp>
+        <p:nvSpPr>
+          <p:cNvPr id="3" name="TextBox 2"/>
+          <p:cNvSpPr txBox="1"/>
+          <p:nvPr/>
+        </p:nvSpPr>
+        <p:spPr>
+          <a:xfrm>
+            <a:off x="3694922" y="3722914"/>
+            <a:ext cx="4488025" cy="461665"/>
+          </a:xfrm>
+          <a:prstGeom prst="rect">
+            <a:avLst/>
+          </a:prstGeom>
+          <a:noFill/>
+        </p:spPr>
+        <p:txBody>
+          <a:bodyPr wrap="square" rtlCol="0">
+            <a:spAutoFit/>
+          </a:bodyPr>
+          <a:lstStyle/>
+          <a:p>
+            <a:r>
+              <a:rPr lang="en-US" sz="2400" dirty="0" smtClean="0">
+                <a:solidFill>
+                  <a:schemeClr val="bg1">
+                    <a:lumMod val="50000"/>
+                  </a:schemeClr>
+                </a:solidFill>
+              </a:rPr>
+              <a:t>If I had the time…</a:t>
+            </a:r>
+            <a:endParaRPr lang="en-US" sz="2400" dirty="0">
+              <a:solidFill>
+                <a:schemeClr val="bg1">
+                  <a:lumMod val="50000"/>
+                </a:schemeClr>
+              </a:solidFill>
+            </a:endParaRPr>
+          </a:p>
+        </p:txBody>
+      </p:sp>
+    </p:spTree>
+    <p:extLst>
+      <p:ext uri="{BB962C8B-B14F-4D97-AF65-F5344CB8AC3E}">
+        <p14:creationId xmlns:p14="http://schemas.microsoft.com/office/powerpoint/2010/main" val="1528139638"/>
+      </p:ext>
+    </p:extLst>
+  </p:cSld>
+  <p:clrMapOvr>
+    <a:masterClrMapping/>
+  </p:clrMapOvr>
+  <p:timing>
+    <p:tnLst>
+      <p:par>
+        <p:cTn id="1" dur="indefinite" restart="never" nodeType="tmRoot">
+          <p:childTnLst>
+            <p:seq concurrent="1" nextAc="seek">
+              <p:cTn id="2" dur="indefinite" nodeType="mainSeq">
+                <p:childTnLst>
+                  <p:par>
+                    <p:cTn id="3" fill="hold">
+                      <p:stCondLst>
+                        <p:cond delay="indefinite"/>
+                      </p:stCondLst>
+                      <p:childTnLst>
+                        <p:par>
+                          <p:cTn id="4" fill="hold">
+                            <p:stCondLst>
+                              <p:cond delay="0"/>
+                            </p:stCondLst>
+                            <p:childTnLst>
+                              <p:par>
+                                <p:cTn id="5" presetID="1" presetClass="entr" presetSubtype="0" fill="hold" grpId="0" nodeType="clickEffect">
+                                  <p:stCondLst>
+                                    <p:cond delay="0"/>
+                                  </p:stCondLst>
+                                  <p:childTnLst>
+                                    <p:set>
+                                      <p:cBhvr>
+                                        <p:cTn id="6" dur="1" fill="hold">
+                                          <p:stCondLst>
+                                            <p:cond delay="0"/>
+                                          </p:stCondLst>
+                                        </p:cTn>
+                                        <p:tgtEl>
+                                          <p:spTgt spid="3"/>
+                                        </p:tgtEl>
+                                        <p:attrNameLst>
+                                          <p:attrName>style.visibility</p:attrName>
+                                        </p:attrNameLst>
+                                      </p:cBhvr>
+                                      <p:to>
+                                        <p:strVal val="visible"/>
+                                      </p:to>
+                                    </p:set>
+                                  </p:childTnLst>
+                                </p:cTn>
+                              </p:par>
+                            </p:childTnLst>
+                          </p:cTn>
+                        </p:par>
+                      </p:childTnLst>
+                    </p:cTn>
+                  </p:par>
+                </p:childTnLst>
+              </p:cTn>
+              <p:prevCondLst>
+                <p:cond evt="onPrev" delay="0">
+                  <p:tgtEl>
+                    <p:sldTgt/>
+                  </p:tgtEl>
+                </p:cond>
+              </p:prevCondLst>
+              <p:nextCondLst>
+                <p:cond evt="onNext" delay="0">
+                  <p:tgtEl>
+                    <p:sldTgt/>
+                  </p:tgtEl>
+                </p:cond>
+              </p:nextCondLst>
+            </p:seq>
+          </p:childTnLst>
+        </p:cTn>
+      </p:par>
+    </p:tnLst>
+    <p:bldLst>
+      <p:bldP spid="3" grpId="0"/>
+    </p:bldLst>
+  </p:timing>
+</p:sld>
+</file>
+
+<file path=ppt/slides/slide24.xml><?xml version="1.0" encoding="utf-8"?>
+<p:sld xmlns:a="http://schemas.openxmlformats.org/drawingml/2006/main" xmlns:r="http://schemas.openxmlformats.org/officeDocument/2006/relationships" xmlns:p="http://schemas.openxmlformats.org/presentationml/2006/main">
+  <p:cSld>
+    <p:spTree>
+      <p:nvGrpSpPr>
+        <p:cNvPr id="1" name=""/>
+        <p:cNvGrpSpPr/>
+        <p:nvPr/>
+      </p:nvGrpSpPr>
+      <p:grpSpPr>
+        <a:xfrm>
+          <a:off x="0" y="0"/>
+          <a:ext cx="0" cy="0"/>
+          <a:chOff x="0" y="0"/>
+          <a:chExt cx="0" cy="0"/>
+        </a:xfrm>
+      </p:grpSpPr>
+      <p:sp>
+        <p:nvSpPr>
+          <p:cNvPr id="2" name="Title 1"/>
+          <p:cNvSpPr>
+            <a:spLocks noGrp="1"/>
+          </p:cNvSpPr>
+          <p:nvPr>
+            <p:ph type="ctrTitle"/>
+          </p:nvPr>
+        </p:nvSpPr>
+        <p:spPr/>
+        <p:txBody>
+          <a:bodyPr/>
+          <a:lstStyle/>
+          <a:p>
+            <a:r>
+              <a:rPr lang="en-US" dirty="0"/>
+              <a:t>	</a:t>
+            </a:r>
+          </a:p>
+        </p:txBody>
+      </p:sp>
+      <p:sp>
+        <p:nvSpPr>
+          <p:cNvPr id="4" name="Rectangle 3"/>
+          <p:cNvSpPr/>
+          <p:nvPr/>
+        </p:nvSpPr>
+        <p:spPr>
+          <a:xfrm>
+            <a:off x="0" y="6428792"/>
+            <a:ext cx="12192000" cy="419878"/>
+          </a:xfrm>
+          <a:prstGeom prst="rect">
+            <a:avLst/>
+          </a:prstGeom>
+          <a:solidFill>
+            <a:srgbClr val="FDBB30"/>
+          </a:solidFill>
+          <a:ln>
+            <a:solidFill>
+              <a:schemeClr val="tx1"/>
+            </a:solidFill>
+          </a:ln>
+        </p:spPr>
+        <p:style>
+          <a:lnRef idx="2">
+            <a:schemeClr val="accent1">
+              <a:shade val="50000"/>
+            </a:schemeClr>
+          </a:lnRef>
+          <a:fillRef idx="1">
+            <a:schemeClr val="accent1"/>
+          </a:fillRef>
+          <a:effectRef idx="0">
+            <a:schemeClr val="accent1"/>
+          </a:effectRef>
+          <a:fontRef idx="minor">
+            <a:schemeClr val="lt1"/>
+          </a:fontRef>
+        </p:style>
+        <p:txBody>
+          <a:bodyPr rtlCol="0" anchor="ctr"/>
+          <a:lstStyle/>
+          <a:p>
+            <a:pPr algn="ctr"/>
+            <a:endParaRPr lang="en-US"/>
+          </a:p>
+        </p:txBody>
+      </p:sp>
+      <p:sp>
+        <p:nvSpPr>
+          <p:cNvPr id="6" name="Rectangle 5"/>
+          <p:cNvSpPr/>
+          <p:nvPr/>
+        </p:nvSpPr>
+        <p:spPr>
+          <a:xfrm>
+            <a:off x="0" y="6218853"/>
+            <a:ext cx="12192000" cy="303245"/>
+          </a:xfrm>
+          <a:prstGeom prst="rect">
+            <a:avLst/>
+          </a:prstGeom>
+          <a:solidFill>
+            <a:srgbClr val="00543C"/>
+          </a:solidFill>
+          <a:ln>
+            <a:solidFill>
+              <a:schemeClr val="tx1"/>
+            </a:solidFill>
+          </a:ln>
+        </p:spPr>
+        <p:style>
+          <a:lnRef idx="2">
+            <a:schemeClr val="accent1">
+              <a:shade val="50000"/>
+            </a:schemeClr>
+          </a:lnRef>
+          <a:fillRef idx="1">
+            <a:schemeClr val="accent1"/>
+          </a:fillRef>
+          <a:effectRef idx="0">
+            <a:schemeClr val="accent1"/>
+          </a:effectRef>
+          <a:fontRef idx="minor">
+            <a:schemeClr val="lt1"/>
+          </a:fontRef>
+        </p:style>
+        <p:txBody>
+          <a:bodyPr rtlCol="0" anchor="ctr"/>
+          <a:lstStyle/>
+          <a:p>
+            <a:pPr algn="ctr"/>
+            <a:endParaRPr lang="en-US"/>
+          </a:p>
+        </p:txBody>
+      </p:sp>
+      <p:sp>
+        <p:nvSpPr>
+          <p:cNvPr id="7" name="TextBox 6"/>
+          <p:cNvSpPr txBox="1"/>
+          <p:nvPr/>
+        </p:nvSpPr>
+        <p:spPr>
+          <a:xfrm>
+            <a:off x="979714" y="1207771"/>
+            <a:ext cx="8901404" cy="3046988"/>
+          </a:xfrm>
+          <a:prstGeom prst="rect">
+            <a:avLst/>
+          </a:prstGeom>
+          <a:noFill/>
+        </p:spPr>
+        <p:txBody>
+          <a:bodyPr wrap="square" rtlCol="0">
+            <a:spAutoFit/>
+          </a:bodyPr>
+          <a:lstStyle/>
+          <a:p>
+            <a:pPr marL="457200" indent="-457200">
+              <a:buFont typeface="Arial" panose="020B0604020202020204" pitchFamily="34" charset="0"/>
+              <a:buChar char="•"/>
+            </a:pPr>
+            <a:r>
+              <a:rPr lang="en-US" sz="3200" dirty="0" smtClean="0"/>
+              <a:t>Tuition discounting and affect on budget &amp; enrollment planning</a:t>
+            </a:r>
+          </a:p>
+          <a:p>
+            <a:pPr marL="457200" indent="-457200">
+              <a:buFont typeface="Arial" panose="020B0604020202020204" pitchFamily="34" charset="0"/>
+              <a:buChar char="•"/>
+            </a:pPr>
+            <a:endParaRPr lang="en-US" sz="3200" dirty="0" smtClean="0"/>
+          </a:p>
+          <a:p>
+            <a:pPr marL="457200" indent="-457200">
+              <a:buFont typeface="Arial" panose="020B0604020202020204" pitchFamily="34" charset="0"/>
+              <a:buChar char="•"/>
+            </a:pPr>
+            <a:r>
+              <a:rPr lang="en-US" sz="3200" dirty="0" smtClean="0"/>
+              <a:t>Retention &amp; graduation rates</a:t>
+            </a:r>
+            <a:endParaRPr lang="en-US" sz="3200" dirty="0"/>
+          </a:p>
+          <a:p>
+            <a:pPr marL="457200" indent="-457200">
+              <a:buFont typeface="Arial" panose="020B0604020202020204" pitchFamily="34" charset="0"/>
+              <a:buChar char="•"/>
+            </a:pPr>
+            <a:endParaRPr lang="en-US" sz="3200" dirty="0"/>
+          </a:p>
+          <a:p>
+            <a:pPr marL="457200" indent="-457200">
+              <a:buFont typeface="Arial" panose="020B0604020202020204" pitchFamily="34" charset="0"/>
+              <a:buChar char="•"/>
+            </a:pPr>
+            <a:r>
+              <a:rPr lang="en-US" sz="3200" dirty="0" smtClean="0"/>
+              <a:t>Endowments and budget stability</a:t>
+            </a:r>
+          </a:p>
+        </p:txBody>
+      </p:sp>
+      <p:sp>
+        <p:nvSpPr>
+          <p:cNvPr id="3" name="TextBox 2"/>
+          <p:cNvSpPr txBox="1"/>
+          <p:nvPr/>
+        </p:nvSpPr>
+        <p:spPr>
+          <a:xfrm>
+            <a:off x="1632857" y="4867474"/>
+            <a:ext cx="5495731" cy="461665"/>
+          </a:xfrm>
+          <a:prstGeom prst="rect">
+            <a:avLst/>
+          </a:prstGeom>
+          <a:noFill/>
+        </p:spPr>
+        <p:txBody>
+          <a:bodyPr wrap="square" rtlCol="0">
+            <a:spAutoFit/>
+          </a:bodyPr>
+          <a:lstStyle/>
+          <a:p>
+            <a:r>
+              <a:rPr lang="en-US" sz="2400" dirty="0" smtClean="0">
+                <a:solidFill>
+                  <a:schemeClr val="bg1">
+                    <a:lumMod val="50000"/>
+                  </a:schemeClr>
+                </a:solidFill>
+              </a:rPr>
+              <a:t>…and much, much more…</a:t>
+            </a:r>
+            <a:endParaRPr lang="en-US" sz="2400" dirty="0">
+              <a:solidFill>
+                <a:schemeClr val="bg1">
+                  <a:lumMod val="50000"/>
+                </a:schemeClr>
+              </a:solidFill>
+            </a:endParaRPr>
+          </a:p>
+        </p:txBody>
+      </p:sp>
+    </p:spTree>
+    <p:extLst>
+      <p:ext uri="{BB962C8B-B14F-4D97-AF65-F5344CB8AC3E}">
+        <p14:creationId xmlns:p14="http://schemas.microsoft.com/office/powerpoint/2010/main" val="1663916467"/>
+      </p:ext>
+    </p:extLst>
+  </p:cSld>
+  <p:clrMapOvr>
+    <a:masterClrMapping/>
+  </p:clrMapOvr>
+  <p:timing>
+    <p:tnLst>
+      <p:par>
+        <p:cTn id="1" dur="indefinite" restart="never" nodeType="tmRoot">
+          <p:childTnLst>
+            <p:seq concurrent="1" nextAc="seek">
+              <p:cTn id="2" dur="indefinite" nodeType="mainSeq">
+                <p:childTnLst>
+                  <p:par>
+                    <p:cTn id="3" fill="hold">
+                      <p:stCondLst>
+                        <p:cond delay="indefinite"/>
+                      </p:stCondLst>
+                      <p:childTnLst>
+                        <p:par>
+                          <p:cTn id="4" fill="hold">
+                            <p:stCondLst>
+                              <p:cond delay="0"/>
+                            </p:stCondLst>
+                            <p:childTnLst>
+                              <p:par>
+                                <p:cTn id="5" presetID="1" presetClass="entr" presetSubtype="0" fill="hold" grpId="0" nodeType="clickEffect">
+                                  <p:stCondLst>
+                                    <p:cond delay="0"/>
+                                  </p:stCondLst>
+                                  <p:childTnLst>
+                                    <p:set>
+                                      <p:cBhvr>
+                                        <p:cTn id="6" dur="1" fill="hold">
+                                          <p:stCondLst>
+                                            <p:cond delay="0"/>
+                                          </p:stCondLst>
+                                        </p:cTn>
+                                        <p:tgtEl>
+                                          <p:spTgt spid="3"/>
+                                        </p:tgtEl>
+                                        <p:attrNameLst>
+                                          <p:attrName>style.visibility</p:attrName>
+                                        </p:attrNameLst>
+                                      </p:cBhvr>
+                                      <p:to>
+                                        <p:strVal val="visible"/>
+                                      </p:to>
+                                    </p:set>
+                                  </p:childTnLst>
+                                </p:cTn>
+                              </p:par>
+                            </p:childTnLst>
+                          </p:cTn>
+                        </p:par>
+                      </p:childTnLst>
+                    </p:cTn>
+                  </p:par>
+                </p:childTnLst>
+              </p:cTn>
+              <p:prevCondLst>
+                <p:cond evt="onPrev" delay="0">
+                  <p:tgtEl>
+                    <p:sldTgt/>
+                  </p:tgtEl>
+                </p:cond>
+              </p:prevCondLst>
+              <p:nextCondLst>
+                <p:cond evt="onNext" delay="0">
+                  <p:tgtEl>
+                    <p:sldTgt/>
+                  </p:tgtEl>
+                </p:cond>
+              </p:nextCondLst>
+            </p:seq>
+          </p:childTnLst>
+        </p:cTn>
+      </p:par>
+    </p:tnLst>
+    <p:bldLst>
+      <p:bldP spid="3" grpId="0"/>
+    </p:bldLst>
+  </p:timing>
+</p:sld>
+</file>
+
+<file path=ppt/slides/slide25.xml><?xml version="1.0" encoding="utf-8"?>
+<p:sld xmlns:a="http://schemas.openxmlformats.org/drawingml/2006/main" xmlns:r="http://schemas.openxmlformats.org/officeDocument/2006/relationships" xmlns:p="http://schemas.openxmlformats.org/presentationml/2006/main">
+  <p:cSld>
+    <p:spTree>
+      <p:nvGrpSpPr>
+        <p:cNvPr id="1" name=""/>
+        <p:cNvGrpSpPr/>
+        <p:nvPr/>
+      </p:nvGrpSpPr>
+      <p:grpSpPr>
+        <a:xfrm>
+          <a:off x="0" y="0"/>
+          <a:ext cx="0" cy="0"/>
+          <a:chOff x="0" y="0"/>
+          <a:chExt cx="0" cy="0"/>
+        </a:xfrm>
+      </p:grpSpPr>
+      <p:sp>
+        <p:nvSpPr>
+          <p:cNvPr id="2" name="Title 1"/>
+          <p:cNvSpPr>
+            <a:spLocks noGrp="1"/>
+          </p:cNvSpPr>
+          <p:nvPr>
+            <p:ph type="ctrTitle"/>
+          </p:nvPr>
+        </p:nvSpPr>
+        <p:spPr>
+          <a:xfrm>
+            <a:off x="606489" y="2146040"/>
+            <a:ext cx="10453396" cy="981367"/>
+          </a:xfrm>
+        </p:spPr>
+        <p:txBody>
+          <a:bodyPr/>
+          <a:lstStyle/>
+          <a:p>
+            <a:r>
+              <a:rPr lang="en-US" dirty="0"/>
+              <a:t>What questions do you have?</a:t>
+            </a:r>
+          </a:p>
+        </p:txBody>
+      </p:sp>
+      <p:sp>
+        <p:nvSpPr>
+          <p:cNvPr id="4" name="Rectangle 3"/>
+          <p:cNvSpPr/>
+          <p:nvPr/>
+        </p:nvSpPr>
+        <p:spPr>
+          <a:xfrm>
+            <a:off x="0" y="6428792"/>
+            <a:ext cx="12192000" cy="419878"/>
+          </a:xfrm>
+          <a:prstGeom prst="rect">
+            <a:avLst/>
+          </a:prstGeom>
+          <a:solidFill>
+            <a:srgbClr val="FDBB30"/>
+          </a:solidFill>
+          <a:ln>
+            <a:solidFill>
+              <a:schemeClr val="tx1"/>
+            </a:solidFill>
+          </a:ln>
+        </p:spPr>
+        <p:style>
+          <a:lnRef idx="2">
+            <a:schemeClr val="accent1">
+              <a:shade val="50000"/>
+            </a:schemeClr>
+          </a:lnRef>
+          <a:fillRef idx="1">
+            <a:schemeClr val="accent1"/>
+          </a:fillRef>
+          <a:effectRef idx="0">
+            <a:schemeClr val="accent1"/>
+          </a:effectRef>
+          <a:fontRef idx="minor">
+            <a:schemeClr val="lt1"/>
+          </a:fontRef>
+        </p:style>
+        <p:txBody>
+          <a:bodyPr rtlCol="0" anchor="ctr"/>
+          <a:lstStyle/>
+          <a:p>
+            <a:pPr algn="ctr"/>
+            <a:endParaRPr lang="en-US"/>
+          </a:p>
+        </p:txBody>
+      </p:sp>
+      <p:sp>
+        <p:nvSpPr>
+          <p:cNvPr id="6" name="Rectangle 5"/>
+          <p:cNvSpPr/>
+          <p:nvPr/>
+        </p:nvSpPr>
+        <p:spPr>
+          <a:xfrm>
+            <a:off x="0" y="6218853"/>
+            <a:ext cx="12192000" cy="303245"/>
+          </a:xfrm>
+          <a:prstGeom prst="rect">
+            <a:avLst/>
+          </a:prstGeom>
+          <a:solidFill>
+            <a:srgbClr val="00543C"/>
+          </a:solidFill>
+          <a:ln>
+            <a:solidFill>
+              <a:schemeClr val="tx1"/>
+            </a:solidFill>
+          </a:ln>
+        </p:spPr>
+        <p:style>
+          <a:lnRef idx="2">
+            <a:schemeClr val="accent1">
+              <a:shade val="50000"/>
+            </a:schemeClr>
+          </a:lnRef>
+          <a:fillRef idx="1">
+            <a:schemeClr val="accent1"/>
+          </a:fillRef>
+          <a:effectRef idx="0">
+            <a:schemeClr val="accent1"/>
+          </a:effectRef>
+          <a:fontRef idx="minor">
+            <a:schemeClr val="lt1"/>
+          </a:fontRef>
+        </p:style>
+        <p:txBody>
+          <a:bodyPr rtlCol="0" anchor="ctr"/>
+          <a:lstStyle/>
+          <a:p>
+            <a:pPr algn="ctr"/>
+            <a:endParaRPr lang="en-US"/>
+          </a:p>
+        </p:txBody>
+      </p:sp>
+    </p:spTree>
+    <p:extLst>
+      <p:ext uri="{BB962C8B-B14F-4D97-AF65-F5344CB8AC3E}">
+        <p14:creationId xmlns:p14="http://schemas.microsoft.com/office/powerpoint/2010/main" val="367660017"/>
+      </p:ext>
+    </p:extLst>
+  </p:cSld>
+  <p:clrMapOvr>
+    <a:masterClrMapping/>
+  </p:clrMapOvr>
+  <p:timing>
+    <p:tnLst>
+      <p:par>
+        <p:cTn id="1" dur="indefinite" restart="never" nodeType="tmRoot"/>
+      </p:par>
+    </p:tnLst>
+  </p:timing>
+</p:sld>
+</file>
+
+<file path=ppt/slides/slide26.xml><?xml version="1.0" encoding="utf-8"?>
+<p:sld xmlns:a="http://schemas.openxmlformats.org/drawingml/2006/main" xmlns:r="http://schemas.openxmlformats.org/officeDocument/2006/relationships" xmlns:p="http://schemas.openxmlformats.org/presentationml/2006/main">
+  <p:cSld>
+    <p:spTree>
+      <p:nvGrpSpPr>
+        <p:cNvPr id="1" name=""/>
+        <p:cNvGrpSpPr/>
+        <p:nvPr/>
+      </p:nvGrpSpPr>
+      <p:grpSpPr>
+        <a:xfrm>
+          <a:off x="0" y="0"/>
+          <a:ext cx="0" cy="0"/>
+          <a:chOff x="0" y="0"/>
+          <a:chExt cx="0" cy="0"/>
+        </a:xfrm>
+      </p:grpSpPr>
+      <p:sp>
+        <p:nvSpPr>
+          <p:cNvPr id="2" name="Title 1"/>
+          <p:cNvSpPr>
+            <a:spLocks noGrp="1"/>
+          </p:cNvSpPr>
+          <p:nvPr>
+            <p:ph type="ctrTitle"/>
+          </p:nvPr>
+        </p:nvSpPr>
+        <p:spPr/>
+        <p:txBody>
+          <a:bodyPr/>
+          <a:lstStyle/>
+          <a:p>
+            <a:r>
+              <a:rPr lang="en-US" dirty="0"/>
+              <a:t>	</a:t>
+            </a:r>
+          </a:p>
+        </p:txBody>
+      </p:sp>
+      <p:sp>
+        <p:nvSpPr>
+          <p:cNvPr id="4" name="Rectangle 3"/>
+          <p:cNvSpPr/>
+          <p:nvPr/>
+        </p:nvSpPr>
+        <p:spPr>
+          <a:xfrm>
+            <a:off x="0" y="6428792"/>
+            <a:ext cx="12192000" cy="419878"/>
+          </a:xfrm>
+          <a:prstGeom prst="rect">
+            <a:avLst/>
+          </a:prstGeom>
+          <a:solidFill>
+            <a:srgbClr val="FDBB30"/>
+          </a:solidFill>
+          <a:ln>
+            <a:solidFill>
+              <a:schemeClr val="tx1"/>
+            </a:solidFill>
+          </a:ln>
+        </p:spPr>
+        <p:style>
+          <a:lnRef idx="2">
+            <a:schemeClr val="accent1">
+              <a:shade val="50000"/>
+            </a:schemeClr>
+          </a:lnRef>
+          <a:fillRef idx="1">
+            <a:schemeClr val="accent1"/>
+          </a:fillRef>
+          <a:effectRef idx="0">
+            <a:schemeClr val="accent1"/>
+          </a:effectRef>
+          <a:fontRef idx="minor">
+            <a:schemeClr val="lt1"/>
+          </a:fontRef>
+        </p:style>
+        <p:txBody>
+          <a:bodyPr rtlCol="0" anchor="ctr"/>
+          <a:lstStyle/>
+          <a:p>
+            <a:pPr algn="ctr"/>
+            <a:endParaRPr lang="en-US"/>
+          </a:p>
+        </p:txBody>
+      </p:sp>
+      <p:sp>
+        <p:nvSpPr>
+          <p:cNvPr id="6" name="Rectangle 5"/>
+          <p:cNvSpPr/>
+          <p:nvPr/>
+        </p:nvSpPr>
+        <p:spPr>
+          <a:xfrm>
+            <a:off x="0" y="6218853"/>
+            <a:ext cx="12192000" cy="303245"/>
+          </a:xfrm>
+          <a:prstGeom prst="rect">
+            <a:avLst/>
+          </a:prstGeom>
+          <a:solidFill>
+            <a:srgbClr val="00543C"/>
+          </a:solidFill>
+          <a:ln>
+            <a:solidFill>
+              <a:schemeClr val="tx1"/>
+            </a:solidFill>
+          </a:ln>
+        </p:spPr>
+        <p:style>
+          <a:lnRef idx="2">
+            <a:schemeClr val="accent1">
+              <a:shade val="50000"/>
+            </a:schemeClr>
+          </a:lnRef>
+          <a:fillRef idx="1">
+            <a:schemeClr val="accent1"/>
+          </a:fillRef>
+          <a:effectRef idx="0">
+            <a:schemeClr val="accent1"/>
+          </a:effectRef>
+          <a:fontRef idx="minor">
+            <a:schemeClr val="lt1"/>
+          </a:fontRef>
+        </p:style>
+        <p:txBody>
+          <a:bodyPr rtlCol="0" anchor="ctr"/>
+          <a:lstStyle/>
+          <a:p>
+            <a:pPr algn="ctr"/>
+            <a:endParaRPr lang="en-US"/>
+          </a:p>
+        </p:txBody>
+      </p:sp>
+      <p:sp>
+        <p:nvSpPr>
+          <p:cNvPr id="7" name="TextBox 6"/>
+          <p:cNvSpPr txBox="1"/>
+          <p:nvPr/>
+        </p:nvSpPr>
+        <p:spPr>
+          <a:xfrm>
             <a:off x="298579" y="2159559"/>
             <a:ext cx="11038113" cy="923330"/>
           </a:xfrm>
@@ -6516,6 +8500,13 @@
   <p:clrMapOvr>
     <a:masterClrMapping/>
   </p:clrMapOvr>
+  <p:timing>
+    <p:tnLst>
+      <p:par>
+        <p:cTn id="1" dur="indefinite" restart="never" nodeType="tmRoot"/>
+      </p:par>
+    </p:tnLst>
+  </p:timing>
 </p:sld>
 </file>
 
@@ -6663,7 +8654,7 @@
         <p:spPr>
           <a:xfrm>
             <a:off x="429208" y="781537"/>
-            <a:ext cx="11038113" cy="4216539"/>
+            <a:ext cx="11038113" cy="3785652"/>
           </a:xfrm>
           <a:prstGeom prst="rect">
             <a:avLst/>
@@ -6680,6 +8671,9 @@
               <a:rPr lang="en-US" sz="2800" dirty="0"/>
               <a:t>What are the major trends affecting the higher education landscape in the US today, particularly traditional liberal arts colleges?</a:t>
             </a:r>
+          </a:p>
+          <a:p>
+            <a:endParaRPr lang="en-US" dirty="0" smtClean="0"/>
           </a:p>
           <a:p>
             <a:endParaRPr lang="en-US" dirty="0"/>
@@ -6704,29 +8698,17 @@
               <a:buChar char="•"/>
             </a:pPr>
             <a:r>
-              <a:rPr lang="en-US" sz="2800" dirty="0"/>
-              <a:t>How much is affordability a factor for liberal arts colleges? </a:t>
-            </a:r>
+              <a:rPr lang="en-US" sz="2800" dirty="0" smtClean="0"/>
+              <a:t>Affordability </a:t>
+            </a:r>
+            <a:r>
+              <a:rPr lang="en-US" sz="2800" dirty="0" smtClean="0"/>
+              <a:t> </a:t>
+            </a:r>
+            <a:endParaRPr lang="en-US" sz="2800" dirty="0"/>
           </a:p>
           <a:p>
             <a:pPr lvl="1"/>
-            <a:endParaRPr lang="en-US" dirty="0"/>
-          </a:p>
-          <a:p>
-            <a:pPr marL="742950" lvl="1" indent="-285750">
-              <a:buFont typeface="Arial" panose="020B0604020202020204" pitchFamily="34" charset="0"/>
-              <a:buChar char="•"/>
-            </a:pPr>
-            <a:r>
-              <a:rPr lang="en-US" sz="2800" dirty="0"/>
-              <a:t>The role of endowments in ensuring long-term financial security?</a:t>
-            </a:r>
-          </a:p>
-          <a:p>
-            <a:pPr marL="742950" lvl="1" indent="-285750">
-              <a:buFont typeface="Arial" panose="020B0604020202020204" pitchFamily="34" charset="0"/>
-              <a:buChar char="•"/>
-            </a:pPr>
             <a:endParaRPr lang="en-US" dirty="0"/>
           </a:p>
           <a:p>
@@ -6751,6 +8733,13 @@
   <p:clrMapOvr>
     <a:masterClrMapping/>
   </p:clrMapOvr>
+  <p:timing>
+    <p:tnLst>
+      <p:par>
+        <p:cTn id="1" dur="indefinite" restart="never" nodeType="tmRoot"/>
+      </p:par>
+    </p:tnLst>
+  </p:timing>
 </p:sld>
 </file>
 
@@ -6929,6 +8918,13 @@
   <p:clrMapOvr>
     <a:masterClrMapping/>
   </p:clrMapOvr>
+  <p:timing>
+    <p:tnLst>
+      <p:par>
+        <p:cTn id="1" dur="indefinite" restart="never" nodeType="tmRoot"/>
+      </p:par>
+    </p:tnLst>
+  </p:timing>
 </p:sld>
 </file>
 
@@ -7110,14 +9106,16 @@
         </p:nvSpPr>
         <p:spPr>
           <a:xfrm>
-            <a:off x="1119672" y="3919388"/>
+            <a:off x="1110341" y="4036391"/>
             <a:ext cx="7725748" cy="1384995"/>
           </a:xfrm>
           <a:prstGeom prst="rect">
             <a:avLst/>
           </a:prstGeom>
           <a:solidFill>
-            <a:schemeClr val="bg1"/>
+            <a:schemeClr val="bg1">
+              <a:alpha val="87000"/>
+            </a:schemeClr>
           </a:solidFill>
         </p:spPr>
         <p:txBody>
@@ -7248,6 +9246,13 @@
   <p:clrMapOvr>
     <a:masterClrMapping/>
   </p:clrMapOvr>
+  <p:timing>
+    <p:tnLst>
+      <p:par>
+        <p:cTn id="1" dur="indefinite" restart="never" nodeType="tmRoot"/>
+      </p:par>
+    </p:tnLst>
+  </p:timing>
 </p:sld>
 </file>
 
@@ -8093,6 +10098,13 @@
   <p:clrMapOvr>
     <a:masterClrMapping/>
   </p:clrMapOvr>
+  <p:timing>
+    <p:tnLst>
+      <p:par>
+        <p:cTn id="1" dur="indefinite" restart="never" nodeType="tmRoot"/>
+      </p:par>
+    </p:tnLst>
+  </p:timing>
 </p:sld>
 </file>
 
@@ -8271,6 +10283,13 @@
   <p:clrMapOvr>
     <a:masterClrMapping/>
   </p:clrMapOvr>
+  <p:timing>
+    <p:tnLst>
+      <p:par>
+        <p:cTn id="1" dur="indefinite" restart="never" nodeType="tmRoot"/>
+      </p:par>
+    </p:tnLst>
+  </p:timing>
 </p:sld>
 </file>
 
@@ -8587,6 +10606,13 @@
   <p:clrMapOvr>
     <a:masterClrMapping/>
   </p:clrMapOvr>
+  <p:timing>
+    <p:tnLst>
+      <p:par>
+        <p:cTn id="1" dur="indefinite" restart="never" nodeType="tmRoot"/>
+      </p:par>
+    </p:tnLst>
+  </p:timing>
 </p:sld>
 </file>
 

</xml_diff>

<commit_message>
fixed academic years in enrol & tuition
</commit_message>
<xml_diff>
--- a/usf_presentation_0220_gdubrow.pptx
+++ b/usf_presentation_0220_gdubrow.pptx
@@ -266,7 +266,7 @@
           <a:p>
             <a:fld id="{4E83AA21-0DC2-40CE-923B-A76D48AC771F}" type="datetimeFigureOut">
               <a:rPr lang="en-US" smtClean="0"/>
-              <a:t>2/25/2020</a:t>
+              <a:t>2/26/2020</a:t>
             </a:fld>
             <a:endParaRPr lang="en-US"/>
           </a:p>
@@ -434,7 +434,7 @@
           <a:p>
             <a:fld id="{4E83AA21-0DC2-40CE-923B-A76D48AC771F}" type="datetimeFigureOut">
               <a:rPr lang="en-US" smtClean="0"/>
-              <a:t>2/25/2020</a:t>
+              <a:t>2/26/2020</a:t>
             </a:fld>
             <a:endParaRPr lang="en-US"/>
           </a:p>
@@ -612,7 +612,7 @@
           <a:p>
             <a:fld id="{4E83AA21-0DC2-40CE-923B-A76D48AC771F}" type="datetimeFigureOut">
               <a:rPr lang="en-US" smtClean="0"/>
-              <a:t>2/25/2020</a:t>
+              <a:t>2/26/2020</a:t>
             </a:fld>
             <a:endParaRPr lang="en-US"/>
           </a:p>
@@ -780,7 +780,7 @@
           <a:p>
             <a:fld id="{4E83AA21-0DC2-40CE-923B-A76D48AC771F}" type="datetimeFigureOut">
               <a:rPr lang="en-US" smtClean="0"/>
-              <a:t>2/25/2020</a:t>
+              <a:t>2/26/2020</a:t>
             </a:fld>
             <a:endParaRPr lang="en-US"/>
           </a:p>
@@ -1025,7 +1025,7 @@
           <a:p>
             <a:fld id="{4E83AA21-0DC2-40CE-923B-A76D48AC771F}" type="datetimeFigureOut">
               <a:rPr lang="en-US" smtClean="0"/>
-              <a:t>2/25/2020</a:t>
+              <a:t>2/26/2020</a:t>
             </a:fld>
             <a:endParaRPr lang="en-US"/>
           </a:p>
@@ -1254,7 +1254,7 @@
           <a:p>
             <a:fld id="{4E83AA21-0DC2-40CE-923B-A76D48AC771F}" type="datetimeFigureOut">
               <a:rPr lang="en-US" smtClean="0"/>
-              <a:t>2/25/2020</a:t>
+              <a:t>2/26/2020</a:t>
             </a:fld>
             <a:endParaRPr lang="en-US"/>
           </a:p>
@@ -1618,7 +1618,7 @@
           <a:p>
             <a:fld id="{4E83AA21-0DC2-40CE-923B-A76D48AC771F}" type="datetimeFigureOut">
               <a:rPr lang="en-US" smtClean="0"/>
-              <a:t>2/25/2020</a:t>
+              <a:t>2/26/2020</a:t>
             </a:fld>
             <a:endParaRPr lang="en-US"/>
           </a:p>
@@ -1735,7 +1735,7 @@
           <a:p>
             <a:fld id="{4E83AA21-0DC2-40CE-923B-A76D48AC771F}" type="datetimeFigureOut">
               <a:rPr lang="en-US" smtClean="0"/>
-              <a:t>2/25/2020</a:t>
+              <a:t>2/26/2020</a:t>
             </a:fld>
             <a:endParaRPr lang="en-US"/>
           </a:p>
@@ -1830,7 +1830,7 @@
           <a:p>
             <a:fld id="{4E83AA21-0DC2-40CE-923B-A76D48AC771F}" type="datetimeFigureOut">
               <a:rPr lang="en-US" smtClean="0"/>
-              <a:t>2/25/2020</a:t>
+              <a:t>2/26/2020</a:t>
             </a:fld>
             <a:endParaRPr lang="en-US"/>
           </a:p>
@@ -2105,7 +2105,7 @@
           <a:p>
             <a:fld id="{4E83AA21-0DC2-40CE-923B-A76D48AC771F}" type="datetimeFigureOut">
               <a:rPr lang="en-US" smtClean="0"/>
-              <a:t>2/25/2020</a:t>
+              <a:t>2/26/2020</a:t>
             </a:fld>
             <a:endParaRPr lang="en-US"/>
           </a:p>
@@ -2357,7 +2357,7 @@
           <a:p>
             <a:fld id="{4E83AA21-0DC2-40CE-923B-A76D48AC771F}" type="datetimeFigureOut">
               <a:rPr lang="en-US" smtClean="0"/>
-              <a:t>2/25/2020</a:t>
+              <a:t>2/26/2020</a:t>
             </a:fld>
             <a:endParaRPr lang="en-US"/>
           </a:p>
@@ -2568,7 +2568,7 @@
           <a:p>
             <a:fld id="{4E83AA21-0DC2-40CE-923B-A76D48AC771F}" type="datetimeFigureOut">
               <a:rPr lang="en-US" smtClean="0"/>
-              <a:t>2/25/2020</a:t>
+              <a:t>2/26/2020</a:t>
             </a:fld>
             <a:endParaRPr lang="en-US"/>
           </a:p>
@@ -3374,7 +3374,15 @@
             </a:pPr>
             <a:r>
               <a:rPr lang="en-US" sz="2400" dirty="0"/>
-              <a:t>Undergraduate enrollment has more than doubled since </a:t>
+              <a:t>Undergraduate enrollment </a:t>
+            </a:r>
+            <a:r>
+              <a:rPr lang="en-US" sz="2400" dirty="0" smtClean="0"/>
+              <a:t>have increased by 60% </a:t>
+            </a:r>
+            <a:r>
+              <a:rPr lang="en-US" sz="2400" dirty="0"/>
+              <a:t>since </a:t>
             </a:r>
             <a:r>
               <a:rPr lang="en-US" sz="2400" dirty="0" smtClean="0"/>
@@ -3400,7 +3408,11 @@
             </a:r>
             <a:r>
               <a:rPr lang="en-US" sz="2400" dirty="0" smtClean="0"/>
-              <a:t>time.</a:t>
+              <a:t>time</a:t>
+            </a:r>
+            <a:r>
+              <a:rPr lang="en-US" sz="2400" smtClean="0"/>
+              <a:t>, over 4,000 since 2016.</a:t>
             </a:r>
             <a:endParaRPr lang="en-US" sz="2400" dirty="0"/>
           </a:p>
@@ -3712,9 +3724,48 @@
           </a:p>
         </p:txBody>
       </p:sp>
+      <p:sp>
+        <p:nvSpPr>
+          <p:cNvPr id="20" name="TextBox 19"/>
+          <p:cNvSpPr txBox="1"/>
+          <p:nvPr/>
+        </p:nvSpPr>
+        <p:spPr>
+          <a:xfrm>
+            <a:off x="1857528" y="6526630"/>
+            <a:ext cx="2733869" cy="307777"/>
+          </a:xfrm>
+          <a:prstGeom prst="rect">
+            <a:avLst/>
+          </a:prstGeom>
+          <a:solidFill>
+            <a:schemeClr val="bg1">
+              <a:alpha val="75000"/>
+            </a:schemeClr>
+          </a:solidFill>
+        </p:spPr>
+        <p:txBody>
+          <a:bodyPr wrap="square" rtlCol="0">
+            <a:spAutoFit/>
+          </a:bodyPr>
+          <a:lstStyle/>
+          <a:p>
+            <a:r>
+              <a:rPr lang="en-US" sz="1400" i="1" dirty="0">
+                <a:solidFill>
+                  <a:schemeClr val="bg1">
+                    <a:lumMod val="65000"/>
+                  </a:schemeClr>
+                </a:solidFill>
+              </a:rPr>
+              <a:t>Sources: IPEDS &amp; Delta Cost Project</a:t>
+            </a:r>
+          </a:p>
+        </p:txBody>
+      </p:sp>
       <p:pic>
         <p:nvPicPr>
-          <p:cNvPr id="3" name="Picture 2"/>
+          <p:cNvPr id="8" name="Picture 7"/>
           <p:cNvPicPr>
             <a:picLocks noChangeAspect="1"/>
           </p:cNvPicPr>
@@ -3734,38 +3785,29 @@
         </p:blipFill>
         <p:spPr>
           <a:xfrm>
-            <a:off x="996696" y="813816"/>
-            <a:ext cx="10058400" cy="5325426"/>
-          </a:xfrm>
-          <a:prstGeom prst="rect">
-            <a:avLst/>
-          </a:prstGeom>
-          <a:ln>
-            <a:solidFill>
-              <a:schemeClr val="tx1"/>
-            </a:solidFill>
-          </a:ln>
+            <a:off x="996696" y="484632"/>
+            <a:ext cx="10590414" cy="5607101"/>
+          </a:xfrm>
+          <a:prstGeom prst="rect">
+            <a:avLst/>
+          </a:prstGeom>
         </p:spPr>
       </p:pic>
       <p:sp>
         <p:nvSpPr>
-          <p:cNvPr id="20" name="TextBox 19"/>
+          <p:cNvPr id="10" name="TextBox 9"/>
           <p:cNvSpPr txBox="1"/>
           <p:nvPr/>
         </p:nvSpPr>
         <p:spPr>
           <a:xfrm>
-            <a:off x="7934131" y="5416487"/>
-            <a:ext cx="2733869" cy="307777"/>
-          </a:xfrm>
-          <a:prstGeom prst="rect">
-            <a:avLst/>
-          </a:prstGeom>
-          <a:solidFill>
-            <a:schemeClr val="bg1">
-              <a:alpha val="75000"/>
-            </a:schemeClr>
-          </a:solidFill>
+            <a:off x="1641997" y="653507"/>
+            <a:ext cx="1480780" cy="307777"/>
+          </a:xfrm>
+          <a:prstGeom prst="rect">
+            <a:avLst/>
+          </a:prstGeom>
+          <a:noFill/>
         </p:spPr>
         <p:txBody>
           <a:bodyPr wrap="square" rtlCol="0">
@@ -3774,15 +3816,80 @@
           <a:lstStyle/>
           <a:p>
             <a:r>
-              <a:rPr lang="en-US" sz="1400" i="1" dirty="0">
+              <a:rPr lang="en-US" sz="1400" i="1" dirty="0" smtClean="0">
+                <a:solidFill>
+                  <a:srgbClr val="00543C"/>
+                </a:solidFill>
+              </a:rPr>
+              <a:t>Green line is USF</a:t>
+            </a:r>
+            <a:endParaRPr lang="en-US" sz="1400" i="1" dirty="0">
+              <a:solidFill>
+                <a:srgbClr val="00543C"/>
+              </a:solidFill>
+            </a:endParaRPr>
+          </a:p>
+        </p:txBody>
+      </p:sp>
+      <p:sp>
+        <p:nvSpPr>
+          <p:cNvPr id="7" name="TextBox 6"/>
+          <p:cNvSpPr txBox="1"/>
+          <p:nvPr/>
+        </p:nvSpPr>
+        <p:spPr>
+          <a:xfrm>
+            <a:off x="2771193" y="4236297"/>
+            <a:ext cx="4385388" cy="307777"/>
+          </a:xfrm>
+          <a:prstGeom prst="rect">
+            <a:avLst/>
+          </a:prstGeom>
+          <a:noFill/>
+        </p:spPr>
+        <p:txBody>
+          <a:bodyPr wrap="square" rtlCol="0">
+            <a:spAutoFit/>
+          </a:bodyPr>
+          <a:lstStyle/>
+          <a:p>
+            <a:r>
+              <a:rPr lang="en-US" sz="1400" dirty="0" smtClean="0">
                 <a:solidFill>
                   <a:schemeClr val="bg1">
-                    <a:lumMod val="65000"/>
+                    <a:lumMod val="50000"/>
                   </a:schemeClr>
                 </a:solidFill>
               </a:rPr>
-              <a:t>Sources: IPEDS &amp; Delta Cost Project</a:t>
-            </a:r>
+              <a:t>Loyola University in New Orleans, </a:t>
+            </a:r>
+            <a:r>
+              <a:rPr lang="en-US" sz="1400" dirty="0" smtClean="0">
+                <a:solidFill>
+                  <a:schemeClr val="bg1">
+                    <a:lumMod val="50000"/>
+                  </a:schemeClr>
+                </a:solidFill>
+              </a:rPr>
+              <a:t>Fall of Hurricane </a:t>
+            </a:r>
+            <a:r>
+              <a:rPr lang="en-US" sz="1400" dirty="0" smtClean="0">
+                <a:solidFill>
+                  <a:schemeClr val="bg1">
+                    <a:lumMod val="50000"/>
+                  </a:schemeClr>
+                </a:solidFill>
+              </a:rPr>
+              <a:t>Katrina</a:t>
+            </a:r>
+            <a:endParaRPr lang="en-US" sz="1400" dirty="0">
+              <a:solidFill>
+                <a:schemeClr val="bg1">
+                  <a:lumMod val="50000"/>
+                </a:schemeClr>
+              </a:solidFill>
+            </a:endParaRPr>
           </a:p>
         </p:txBody>
       </p:sp>
@@ -3794,7 +3901,7 @@
         </p:nvSpPr>
         <p:spPr>
           <a:xfrm>
-            <a:off x="1694097" y="1220256"/>
+            <a:off x="1327094" y="1108100"/>
             <a:ext cx="5565119" cy="338554"/>
           </a:xfrm>
           <a:prstGeom prst="rect">
@@ -3840,14 +3947,14 @@
       </p:sp>
       <p:sp>
         <p:nvSpPr>
-          <p:cNvPr id="7" name="TextBox 6"/>
+          <p:cNvPr id="12" name="TextBox 11"/>
           <p:cNvSpPr txBox="1"/>
           <p:nvPr/>
         </p:nvSpPr>
         <p:spPr>
           <a:xfrm>
-            <a:off x="2883159" y="4362937"/>
-            <a:ext cx="4376057" cy="307777"/>
+            <a:off x="9381930" y="841354"/>
+            <a:ext cx="1742449" cy="307777"/>
           </a:xfrm>
           <a:prstGeom prst="rect">
             <a:avLst/>
@@ -3868,7 +3975,13 @@
                   </a:schemeClr>
                 </a:solidFill>
               </a:rPr>
-              <a:t>Loyola University in New Orleans, post-Hurricane Katrina</a:t>
+              <a:t>Gonzaga University </a:t>
+            </a:r>
+            <a:r>
+              <a:rPr lang="en-US" sz="1400" dirty="0">
+                <a:sym typeface="Symbol" panose="05050102010706020507" pitchFamily="18" charset="2"/>
+              </a:rPr>
+              <a:t></a:t>
             </a:r>
             <a:endParaRPr lang="en-US" sz="1400" dirty="0">
               <a:solidFill>
@@ -3882,14 +3995,14 @@
       </p:sp>
       <p:sp>
         <p:nvSpPr>
-          <p:cNvPr id="10" name="TextBox 9"/>
+          <p:cNvPr id="13" name="TextBox 12"/>
           <p:cNvSpPr txBox="1"/>
           <p:nvPr/>
         </p:nvSpPr>
         <p:spPr>
           <a:xfrm>
-            <a:off x="996697" y="502762"/>
-            <a:ext cx="1480780" cy="307777"/>
+            <a:off x="10546136" y="1204520"/>
+            <a:ext cx="1568278" cy="307777"/>
           </a:xfrm>
           <a:prstGeom prst="rect">
             <a:avLst/>
@@ -3903,16 +4016,30 @@
           <a:lstStyle/>
           <a:p>
             <a:r>
-              <a:rPr lang="en-US" sz="1400" i="1" dirty="0" smtClean="0">
+              <a:rPr lang="en-US" sz="1400" dirty="0" smtClean="0">
                 <a:solidFill>
-                  <a:srgbClr val="00543C"/>
+                  <a:schemeClr val="bg1">
+                    <a:lumMod val="50000"/>
+                  </a:schemeClr>
                 </a:solidFill>
               </a:rPr>
-              <a:t>Green line is USF</a:t>
-            </a:r>
-            <a:endParaRPr lang="en-US" sz="1400" i="1" dirty="0">
+              <a:t>St. Louis</a:t>
+            </a:r>
+            <a:r>
+              <a:rPr lang="en-US" sz="1400" dirty="0" smtClean="0">
+                <a:solidFill>
+                  <a:schemeClr val="bg1">
+                    <a:lumMod val="50000"/>
+                  </a:schemeClr>
+                </a:solidFill>
+              </a:rPr>
+              <a:t> University</a:t>
+            </a:r>
+            <a:endParaRPr lang="en-US" sz="1400" dirty="0">
               <a:solidFill>
-                <a:srgbClr val="00543C"/>
+                <a:schemeClr val="bg1">
+                  <a:lumMod val="50000"/>
+                </a:schemeClr>
               </a:solidFill>
             </a:endParaRPr>
           </a:p>
@@ -4026,6 +4153,96 @@
                       </p:childTnLst>
                     </p:cTn>
                   </p:par>
+                  <p:par>
+                    <p:cTn id="11" fill="hold">
+                      <p:stCondLst>
+                        <p:cond delay="indefinite"/>
+                      </p:stCondLst>
+                      <p:childTnLst>
+                        <p:par>
+                          <p:cTn id="12" fill="hold">
+                            <p:stCondLst>
+                              <p:cond delay="0"/>
+                            </p:stCondLst>
+                            <p:childTnLst>
+                              <p:par>
+                                <p:cTn id="13" presetID="1" presetClass="entr" presetSubtype="0" fill="hold" grpId="0" nodeType="clickEffect">
+                                  <p:stCondLst>
+                                    <p:cond delay="0"/>
+                                  </p:stCondLst>
+                                  <p:childTnLst>
+                                    <p:set>
+                                      <p:cBhvr>
+                                        <p:cTn id="14" dur="1" fill="hold">
+                                          <p:stCondLst>
+                                            <p:cond delay="0"/>
+                                          </p:stCondLst>
+                                        </p:cTn>
+                                        <p:tgtEl>
+                                          <p:spTgt spid="12"/>
+                                        </p:tgtEl>
+                                        <p:attrNameLst>
+                                          <p:attrName>style.visibility</p:attrName>
+                                        </p:attrNameLst>
+                                      </p:cBhvr>
+                                      <p:to>
+                                        <p:strVal val="visible"/>
+                                      </p:to>
+                                    </p:set>
+                                  </p:childTnLst>
+                                </p:cTn>
+                              </p:par>
+                            </p:childTnLst>
+                          </p:cTn>
+                        </p:par>
+                      </p:childTnLst>
+                    </p:cTn>
+                  </p:par>
+                  <p:par>
+                    <p:cTn id="15" fill="hold">
+                      <p:stCondLst>
+                        <p:cond delay="indefinite"/>
+                      </p:stCondLst>
+                      <p:childTnLst>
+                        <p:par>
+                          <p:cTn id="16" fill="hold">
+                            <p:stCondLst>
+                              <p:cond delay="0"/>
+                            </p:stCondLst>
+                            <p:childTnLst>
+                              <p:par>
+                                <p:cTn id="17" presetID="1" presetClass="entr" presetSubtype="0" fill="hold" grpId="0" nodeType="clickEffect">
+                                  <p:stCondLst>
+                                    <p:cond delay="0"/>
+                                  </p:stCondLst>
+                                  <p:childTnLst>
+                                    <p:set>
+                                      <p:cBhvr>
+                                        <p:cTn id="18" dur="1" fill="hold">
+                                          <p:stCondLst>
+                                            <p:cond delay="0"/>
+                                          </p:stCondLst>
+                                        </p:cTn>
+                                        <p:tgtEl>
+                                          <p:spTgt spid="13"/>
+                                        </p:tgtEl>
+                                        <p:attrNameLst>
+                                          <p:attrName>style.visibility</p:attrName>
+                                        </p:attrNameLst>
+                                      </p:cBhvr>
+                                      <p:to>
+                                        <p:strVal val="visible"/>
+                                      </p:to>
+                                    </p:set>
+                                  </p:childTnLst>
+                                </p:cTn>
+                              </p:par>
+                            </p:childTnLst>
+                          </p:cTn>
+                        </p:par>
+                      </p:childTnLst>
+                    </p:cTn>
+                  </p:par>
                 </p:childTnLst>
               </p:cTn>
               <p:prevCondLst>
@@ -4048,8 +4265,10 @@
       </p:par>
     </p:tnLst>
     <p:bldLst>
+      <p:bldP spid="7" grpId="0"/>
       <p:bldP spid="5" grpId="0"/>
-      <p:bldP spid="7" grpId="0"/>
+      <p:bldP spid="12" grpId="0"/>
+      <p:bldP spid="13" grpId="0"/>
     </p:bldLst>
   </p:timing>
 </p:sld>
@@ -5189,11 +5408,7 @@
             </a:pPr>
             <a:r>
               <a:rPr lang="en-US" sz="3200" dirty="0" smtClean="0"/>
-              <a:t>16% income increase 1989 to 2018 vs tuition gains from prior </a:t>
-            </a:r>
-            <a:r>
-              <a:rPr lang="en-US" sz="3200" dirty="0" smtClean="0"/>
-              <a:t>charts</a:t>
+              <a:t>16% income increase 1989 to 2018 vs tuition gains from prior charts</a:t>
             </a:r>
           </a:p>
           <a:p>
@@ -10488,9 +10703,38 @@
           </a:p>
         </p:txBody>
       </p:sp>
+      <p:sp>
+        <p:nvSpPr>
+          <p:cNvPr id="19" name="TextBox 18"/>
+          <p:cNvSpPr txBox="1"/>
+          <p:nvPr/>
+        </p:nvSpPr>
+        <p:spPr>
+          <a:xfrm>
+            <a:off x="3660710" y="99097"/>
+            <a:ext cx="5361991" cy="461665"/>
+          </a:xfrm>
+          <a:prstGeom prst="rect">
+            <a:avLst/>
+          </a:prstGeom>
+          <a:noFill/>
+        </p:spPr>
+        <p:txBody>
+          <a:bodyPr wrap="square" rtlCol="0">
+            <a:spAutoFit/>
+          </a:bodyPr>
+          <a:lstStyle/>
+          <a:p>
+            <a:r>
+              <a:rPr lang="en-US" sz="2400" dirty="0"/>
+              <a:t>Total Enrollment at USF – 1987 to 2018</a:t>
+            </a:r>
+          </a:p>
+        </p:txBody>
+      </p:sp>
       <p:pic>
         <p:nvPicPr>
-          <p:cNvPr id="16" name="Picture 15"/>
+          <p:cNvPr id="3" name="Picture 2"/>
           <p:cNvPicPr>
             <a:picLocks noChangeAspect="1"/>
           </p:cNvPicPr>
@@ -10510,8 +10754,8 @@
         </p:blipFill>
         <p:spPr>
           <a:xfrm>
-            <a:off x="615820" y="229459"/>
-            <a:ext cx="11103428" cy="5878717"/>
+            <a:off x="793074" y="513159"/>
+            <a:ext cx="10862723" cy="5640842"/>
           </a:xfrm>
           <a:prstGeom prst="rect">
             <a:avLst/>
@@ -10584,35 +10828,6 @@
                 </a:solidFill>
               </a:rPr>
               <a:t>Undergraduate students</a:t>
-            </a:r>
-          </a:p>
-        </p:txBody>
-      </p:sp>
-      <p:sp>
-        <p:nvSpPr>
-          <p:cNvPr id="19" name="TextBox 18"/>
-          <p:cNvSpPr txBox="1"/>
-          <p:nvPr/>
-        </p:nvSpPr>
-        <p:spPr>
-          <a:xfrm>
-            <a:off x="3660710" y="99097"/>
-            <a:ext cx="5361991" cy="461665"/>
-          </a:xfrm>
-          <a:prstGeom prst="rect">
-            <a:avLst/>
-          </a:prstGeom>
-          <a:noFill/>
-        </p:spPr>
-        <p:txBody>
-          <a:bodyPr wrap="square" rtlCol="0">
-            <a:spAutoFit/>
-          </a:bodyPr>
-          <a:lstStyle/>
-          <a:p>
-            <a:r>
-              <a:rPr lang="en-US" sz="2400" dirty="0"/>
-              <a:t>Total Enrollment at USF – 1987 to 2018</a:t>
             </a:r>
           </a:p>
         </p:txBody>

</xml_diff>